<commit_message>
Remake framework + eq chapter 1
</commit_message>
<xml_diff>
--- a/figures/illustrations.pptx
+++ b/figures/illustrations.pptx
@@ -6,7 +6,8 @@
   </p:sldMasterIdLst>
   <p:sldIdLst>
     <p:sldId id="257" r:id="rId2"/>
-    <p:sldId id="256" r:id="rId3"/>
+    <p:sldId id="258" r:id="rId3"/>
+    <p:sldId id="256" r:id="rId4"/>
   </p:sldIdLst>
   <p:sldSz cx="12192000" cy="6858000"/>
   <p:notesSz cx="6858000" cy="9144000"/>
@@ -105,6 +106,11 @@
       </a:defRPr>
     </a:lvl9pPr>
   </p:defaultTextStyle>
+  <p:extLst>
+    <p:ext uri="{EFAFB233-063F-42B5-8137-9DF3F51BA10A}">
+      <p15:sldGuideLst xmlns:p15="http://schemas.microsoft.com/office/powerpoint/2012/main"/>
+    </p:ext>
+  </p:extLst>
 </p:presentation>
 </file>
 
@@ -255,7 +261,7 @@
           <a:p>
             <a:fld id="{E0E97E3A-7EAE-AE47-B84C-E0DE5DFF029A}" type="datetimeFigureOut">
               <a:rPr lang="en-US" smtClean="0"/>
-              <a:t>2/21/25</a:t>
+              <a:t>2/24/25</a:t>
             </a:fld>
             <a:endParaRPr lang="en-US"/>
           </a:p>
@@ -453,7 +459,7 @@
           <a:p>
             <a:fld id="{E0E97E3A-7EAE-AE47-B84C-E0DE5DFF029A}" type="datetimeFigureOut">
               <a:rPr lang="en-US" smtClean="0"/>
-              <a:t>2/21/25</a:t>
+              <a:t>2/24/25</a:t>
             </a:fld>
             <a:endParaRPr lang="en-US"/>
           </a:p>
@@ -661,7 +667,7 @@
           <a:p>
             <a:fld id="{E0E97E3A-7EAE-AE47-B84C-E0DE5DFF029A}" type="datetimeFigureOut">
               <a:rPr lang="en-US" smtClean="0"/>
-              <a:t>2/21/25</a:t>
+              <a:t>2/24/25</a:t>
             </a:fld>
             <a:endParaRPr lang="en-US"/>
           </a:p>
@@ -859,7 +865,7 @@
           <a:p>
             <a:fld id="{E0E97E3A-7EAE-AE47-B84C-E0DE5DFF029A}" type="datetimeFigureOut">
               <a:rPr lang="en-US" smtClean="0"/>
-              <a:t>2/21/25</a:t>
+              <a:t>2/24/25</a:t>
             </a:fld>
             <a:endParaRPr lang="en-US"/>
           </a:p>
@@ -1134,7 +1140,7 @@
           <a:p>
             <a:fld id="{E0E97E3A-7EAE-AE47-B84C-E0DE5DFF029A}" type="datetimeFigureOut">
               <a:rPr lang="en-US" smtClean="0"/>
-              <a:t>2/21/25</a:t>
+              <a:t>2/24/25</a:t>
             </a:fld>
             <a:endParaRPr lang="en-US"/>
           </a:p>
@@ -1399,7 +1405,7 @@
           <a:p>
             <a:fld id="{E0E97E3A-7EAE-AE47-B84C-E0DE5DFF029A}" type="datetimeFigureOut">
               <a:rPr lang="en-US" smtClean="0"/>
-              <a:t>2/21/25</a:t>
+              <a:t>2/24/25</a:t>
             </a:fld>
             <a:endParaRPr lang="en-US"/>
           </a:p>
@@ -1811,7 +1817,7 @@
           <a:p>
             <a:fld id="{E0E97E3A-7EAE-AE47-B84C-E0DE5DFF029A}" type="datetimeFigureOut">
               <a:rPr lang="en-US" smtClean="0"/>
-              <a:t>2/21/25</a:t>
+              <a:t>2/24/25</a:t>
             </a:fld>
             <a:endParaRPr lang="en-US"/>
           </a:p>
@@ -1952,7 +1958,7 @@
           <a:p>
             <a:fld id="{E0E97E3A-7EAE-AE47-B84C-E0DE5DFF029A}" type="datetimeFigureOut">
               <a:rPr lang="en-US" smtClean="0"/>
-              <a:t>2/21/25</a:t>
+              <a:t>2/24/25</a:t>
             </a:fld>
             <a:endParaRPr lang="en-US"/>
           </a:p>
@@ -2065,7 +2071,7 @@
           <a:p>
             <a:fld id="{E0E97E3A-7EAE-AE47-B84C-E0DE5DFF029A}" type="datetimeFigureOut">
               <a:rPr lang="en-US" smtClean="0"/>
-              <a:t>2/21/25</a:t>
+              <a:t>2/24/25</a:t>
             </a:fld>
             <a:endParaRPr lang="en-US"/>
           </a:p>
@@ -2376,7 +2382,7 @@
           <a:p>
             <a:fld id="{E0E97E3A-7EAE-AE47-B84C-E0DE5DFF029A}" type="datetimeFigureOut">
               <a:rPr lang="en-US" smtClean="0"/>
-              <a:t>2/21/25</a:t>
+              <a:t>2/24/25</a:t>
             </a:fld>
             <a:endParaRPr lang="en-US"/>
           </a:p>
@@ -2664,7 +2670,7 @@
           <a:p>
             <a:fld id="{E0E97E3A-7EAE-AE47-B84C-E0DE5DFF029A}" type="datetimeFigureOut">
               <a:rPr lang="en-US" smtClean="0"/>
-              <a:t>2/21/25</a:t>
+              <a:t>2/24/25</a:t>
             </a:fld>
             <a:endParaRPr lang="en-US"/>
           </a:p>
@@ -2905,7 +2911,7 @@
           <a:p>
             <a:fld id="{E0E97E3A-7EAE-AE47-B84C-E0DE5DFF029A}" type="datetimeFigureOut">
               <a:rPr lang="en-US" smtClean="0"/>
-              <a:t>2/21/25</a:t>
+              <a:t>2/24/25</a:t>
             </a:fld>
             <a:endParaRPr lang="en-US"/>
           </a:p>
@@ -3364,8 +3370,8 @@
               <a:chExt cx="12936253" cy="6189551"/>
             </a:xfrm>
           </p:grpSpPr>
-          <mc:AlternateContent xmlns:mc="http://schemas.openxmlformats.org/markup-compatibility/2006">
-            <mc:Choice xmlns:a14="http://schemas.microsoft.com/office/drawing/2010/main" Requires="a14">
+          <mc:AlternateContent xmlns:mc="http://schemas.openxmlformats.org/markup-compatibility/2006" xmlns:a14="http://schemas.microsoft.com/office/drawing/2010/main">
+            <mc:Choice Requires="a14">
               <p:sp>
                 <p:nvSpPr>
                   <p:cNvPr id="15" name="Rectangle : coins arrondis 4">
@@ -3438,7 +3444,7 @@
                 </p:txBody>
               </p:sp>
             </mc:Choice>
-            <mc:Fallback>
+            <mc:Fallback xmlns="">
               <p:sp>
                 <p:nvSpPr>
                   <p:cNvPr id="15" name="Rectangle : coins arrondis 4">
@@ -5661,6 +5667,2819 @@
   <p:cSld>
     <p:spTree>
       <p:nvGrpSpPr>
+        <p:cNvPr id="1" name="">
+          <a:extLst>
+            <a:ext uri="{FF2B5EF4-FFF2-40B4-BE49-F238E27FC236}">
+              <a16:creationId xmlns:a16="http://schemas.microsoft.com/office/drawing/2014/main" id="{25EA8145-73ED-8F6C-85FC-623B2FB20D45}"/>
+            </a:ext>
+          </a:extLst>
+        </p:cNvPr>
+        <p:cNvGrpSpPr/>
+        <p:nvPr/>
+      </p:nvGrpSpPr>
+      <p:grpSpPr>
+        <a:xfrm>
+          <a:off x="0" y="0"/>
+          <a:ext cx="0" cy="0"/>
+          <a:chOff x="0" y="0"/>
+          <a:chExt cx="0" cy="0"/>
+        </a:xfrm>
+      </p:grpSpPr>
+      <p:sp>
+        <p:nvSpPr>
+          <p:cNvPr id="9" name="Rounded Rectangle 8">
+            <a:extLst>
+              <a:ext uri="{FF2B5EF4-FFF2-40B4-BE49-F238E27FC236}">
+                <a16:creationId xmlns:a16="http://schemas.microsoft.com/office/drawing/2014/main" id="{91FD2BCF-3BE3-54B6-C77E-70A2E231CFBE}"/>
+              </a:ext>
+            </a:extLst>
+          </p:cNvPr>
+          <p:cNvSpPr/>
+          <p:nvPr/>
+        </p:nvSpPr>
+        <p:spPr>
+          <a:xfrm>
+            <a:off x="5177117" y="4904369"/>
+            <a:ext cx="6156000" cy="828000"/>
+          </a:xfrm>
+          <a:prstGeom prst="roundRect">
+            <a:avLst/>
+          </a:prstGeom>
+          <a:solidFill>
+            <a:srgbClr val="7030A0">
+              <a:alpha val="9804"/>
+            </a:srgbClr>
+          </a:solidFill>
+          <a:ln>
+            <a:solidFill>
+              <a:schemeClr val="accent5"/>
+            </a:solidFill>
+          </a:ln>
+        </p:spPr>
+        <p:style>
+          <a:lnRef idx="2">
+            <a:schemeClr val="accent1">
+              <a:shade val="15000"/>
+            </a:schemeClr>
+          </a:lnRef>
+          <a:fillRef idx="1">
+            <a:schemeClr val="accent1"/>
+          </a:fillRef>
+          <a:effectRef idx="0">
+            <a:schemeClr val="accent1"/>
+          </a:effectRef>
+          <a:fontRef idx="minor">
+            <a:schemeClr val="lt1"/>
+          </a:fontRef>
+        </p:style>
+        <p:txBody>
+          <a:bodyPr rtlCol="0" anchor="ctr"/>
+          <a:lstStyle/>
+          <a:p>
+            <a:pPr algn="ctr"/>
+            <a:endParaRPr lang="en-US"/>
+          </a:p>
+        </p:txBody>
+      </p:sp>
+      <mc:AlternateContent xmlns:mc="http://schemas.openxmlformats.org/markup-compatibility/2006">
+        <mc:Choice xmlns:a14="http://schemas.microsoft.com/office/drawing/2010/main" Requires="a14">
+          <p:sp>
+            <p:nvSpPr>
+              <p:cNvPr id="15" name="Rectangle : coins arrondis 4">
+                <a:extLst>
+                  <a:ext uri="{FF2B5EF4-FFF2-40B4-BE49-F238E27FC236}">
+                    <a16:creationId xmlns:a16="http://schemas.microsoft.com/office/drawing/2014/main" id="{92F00C21-E6D4-FE48-57D9-A0D36686D540}"/>
+                  </a:ext>
+                </a:extLst>
+              </p:cNvPr>
+              <p:cNvSpPr>
+                <a:spLocks noChangeAspect="1"/>
+              </p:cNvSpPr>
+              <p:nvPr/>
+            </p:nvSpPr>
+            <p:spPr>
+              <a:xfrm>
+                <a:off x="7017124" y="3449276"/>
+                <a:ext cx="2463817" cy="617387"/>
+              </a:xfrm>
+              <a:prstGeom prst="roundRect">
+                <a:avLst/>
+              </a:prstGeom>
+              <a:solidFill>
+                <a:schemeClr val="accent1">
+                  <a:alpha val="50196"/>
+                </a:schemeClr>
+              </a:solidFill>
+              <a:ln w="38100"/>
+            </p:spPr>
+            <p:style>
+              <a:lnRef idx="2">
+                <a:schemeClr val="accent1">
+                  <a:shade val="15000"/>
+                </a:schemeClr>
+              </a:lnRef>
+              <a:fillRef idx="1">
+                <a:schemeClr val="accent1"/>
+              </a:fillRef>
+              <a:effectRef idx="0">
+                <a:schemeClr val="accent1"/>
+              </a:effectRef>
+              <a:fontRef idx="minor">
+                <a:schemeClr val="lt1"/>
+              </a:fontRef>
+            </p:style>
+            <p:txBody>
+              <a:bodyPr rtlCol="0" anchor="ctr"/>
+              <a:lstStyle/>
+              <a:p>
+                <a:pPr algn="ctr"/>
+                <a:r>
+                  <a:rPr lang="en-CA" sz="2800" b="1" noProof="0" dirty="0">
+                    <a:latin typeface="Avenir Next LT Pro" panose="020B0504020202020204" pitchFamily="34" charset="77"/>
+                  </a:rPr>
+                  <a:t>Body mass </a:t>
+                </a:r>
+                <a14:m>
+                  <m:oMath xmlns:m="http://schemas.openxmlformats.org/officeDocument/2006/math">
+                    <m:r>
+                      <a:rPr lang="en-CA" sz="2800" b="1" i="0" noProof="0" smtClean="0">
+                        <a:latin typeface="Cambria Math" panose="02040503050406030204" pitchFamily="18" charset="0"/>
+                        <a:ea typeface="Cambria Math" panose="02040503050406030204" pitchFamily="18" charset="0"/>
+                      </a:rPr>
+                      <m:t>↗</m:t>
+                    </m:r>
+                  </m:oMath>
+                </a14:m>
+                <a:endParaRPr lang="en-CA" sz="2800" b="1" noProof="0" dirty="0"/>
+              </a:p>
+            </p:txBody>
+          </p:sp>
+        </mc:Choice>
+        <mc:Fallback>
+          <p:sp>
+            <p:nvSpPr>
+              <p:cNvPr id="15" name="Rectangle : coins arrondis 4">
+                <a:extLst>
+                  <a:ext uri="{FF2B5EF4-FFF2-40B4-BE49-F238E27FC236}">
+                    <a16:creationId xmlns:a16="http://schemas.microsoft.com/office/drawing/2014/main" id="{92F00C21-E6D4-FE48-57D9-A0D36686D540}"/>
+                  </a:ext>
+                </a:extLst>
+              </p:cNvPr>
+              <p:cNvSpPr>
+                <a:spLocks noRot="1" noChangeAspect="1" noMove="1" noResize="1" noEditPoints="1" noAdjustHandles="1" noChangeArrowheads="1" noChangeShapeType="1" noTextEdit="1"/>
+              </p:cNvSpPr>
+              <p:nvPr/>
+            </p:nvSpPr>
+            <p:spPr>
+              <a:xfrm>
+                <a:off x="7017124" y="3449276"/>
+                <a:ext cx="2463817" cy="617387"/>
+              </a:xfrm>
+              <a:prstGeom prst="roundRect">
+                <a:avLst/>
+              </a:prstGeom>
+              <a:blipFill>
+                <a:blip r:embed="rId2"/>
+                <a:stretch>
+                  <a:fillRect l="-2538" t="-1923" b="-15385"/>
+                </a:stretch>
+              </a:blipFill>
+              <a:ln w="38100"/>
+            </p:spPr>
+            <p:txBody>
+              <a:bodyPr/>
+              <a:lstStyle/>
+              <a:p>
+                <a:r>
+                  <a:rPr lang="en-US">
+                    <a:noFill/>
+                  </a:rPr>
+                  <a:t> </a:t>
+                </a:r>
+              </a:p>
+            </p:txBody>
+          </p:sp>
+        </mc:Fallback>
+      </mc:AlternateContent>
+      <p:sp>
+        <p:nvSpPr>
+          <p:cNvPr id="16" name="Explosion 1 15">
+            <a:extLst>
+              <a:ext uri="{FF2B5EF4-FFF2-40B4-BE49-F238E27FC236}">
+                <a16:creationId xmlns:a16="http://schemas.microsoft.com/office/drawing/2014/main" id="{3DD66839-27F2-10D1-CE96-55206CD535B8}"/>
+              </a:ext>
+            </a:extLst>
+          </p:cNvPr>
+          <p:cNvSpPr/>
+          <p:nvPr/>
+        </p:nvSpPr>
+        <p:spPr>
+          <a:xfrm>
+            <a:off x="0" y="115714"/>
+            <a:ext cx="3657599" cy="1736365"/>
+          </a:xfrm>
+          <a:prstGeom prst="irregularSeal1">
+            <a:avLst/>
+          </a:prstGeom>
+          <a:solidFill>
+            <a:schemeClr val="accent1">
+              <a:alpha val="50000"/>
+            </a:schemeClr>
+          </a:solidFill>
+        </p:spPr>
+        <p:style>
+          <a:lnRef idx="2">
+            <a:schemeClr val="accent1">
+              <a:shade val="15000"/>
+            </a:schemeClr>
+          </a:lnRef>
+          <a:fillRef idx="1">
+            <a:schemeClr val="accent1"/>
+          </a:fillRef>
+          <a:effectRef idx="0">
+            <a:schemeClr val="accent1"/>
+          </a:effectRef>
+          <a:fontRef idx="minor">
+            <a:schemeClr val="lt1"/>
+          </a:fontRef>
+        </p:style>
+        <p:txBody>
+          <a:bodyPr rtlCol="0" anchor="ctr"/>
+          <a:lstStyle/>
+          <a:p>
+            <a:pPr algn="ctr"/>
+            <a:r>
+              <a:rPr lang="en-CA" sz="2300" b="1" noProof="0" dirty="0">
+                <a:latin typeface="Avenir Next LT Pro" panose="020B0504020202020204" pitchFamily="34" charset="77"/>
+              </a:rPr>
+              <a:t>Climate change</a:t>
+            </a:r>
+          </a:p>
+        </p:txBody>
+      </p:sp>
+      <p:sp>
+        <p:nvSpPr>
+          <p:cNvPr id="17" name="Rectangle : coins arrondis 22">
+            <a:extLst>
+              <a:ext uri="{FF2B5EF4-FFF2-40B4-BE49-F238E27FC236}">
+                <a16:creationId xmlns:a16="http://schemas.microsoft.com/office/drawing/2014/main" id="{E060FA8C-0D54-674D-F3D3-02F191AE0F94}"/>
+              </a:ext>
+            </a:extLst>
+          </p:cNvPr>
+          <p:cNvSpPr>
+            <a:spLocks noChangeAspect="1"/>
+          </p:cNvSpPr>
+          <p:nvPr/>
+        </p:nvSpPr>
+        <p:spPr>
+          <a:xfrm>
+            <a:off x="7273221" y="2031694"/>
+            <a:ext cx="1839453" cy="617384"/>
+          </a:xfrm>
+          <a:prstGeom prst="roundRect">
+            <a:avLst/>
+          </a:prstGeom>
+          <a:solidFill>
+            <a:schemeClr val="accent1">
+              <a:alpha val="50196"/>
+            </a:schemeClr>
+          </a:solidFill>
+        </p:spPr>
+        <p:style>
+          <a:lnRef idx="2">
+            <a:schemeClr val="accent1">
+              <a:shade val="15000"/>
+            </a:schemeClr>
+          </a:lnRef>
+          <a:fillRef idx="1">
+            <a:schemeClr val="accent1"/>
+          </a:fillRef>
+          <a:effectRef idx="0">
+            <a:schemeClr val="accent1"/>
+          </a:effectRef>
+          <a:fontRef idx="minor">
+            <a:schemeClr val="lt1"/>
+          </a:fontRef>
+        </p:style>
+        <p:txBody>
+          <a:bodyPr rtlCol="0" anchor="ctr"/>
+          <a:lstStyle/>
+          <a:p>
+            <a:pPr algn="ctr"/>
+            <a:r>
+              <a:rPr lang="en-CA" sz="2800" b="1" noProof="0" dirty="0">
+                <a:latin typeface="Avenir Next LT Pro" panose="020B0504020202020204" pitchFamily="34" charset="77"/>
+              </a:rPr>
+              <a:t>Plasticity</a:t>
+            </a:r>
+            <a:endParaRPr lang="en-CA" sz="2800" b="1" noProof="0" dirty="0"/>
+          </a:p>
+        </p:txBody>
+      </p:sp>
+      <p:sp>
+        <p:nvSpPr>
+          <p:cNvPr id="18" name="Rectangle : coins arrondis 23">
+            <a:extLst>
+              <a:ext uri="{FF2B5EF4-FFF2-40B4-BE49-F238E27FC236}">
+                <a16:creationId xmlns:a16="http://schemas.microsoft.com/office/drawing/2014/main" id="{A7BB87B7-0970-B1C1-A9C5-468D24217FC9}"/>
+              </a:ext>
+            </a:extLst>
+          </p:cNvPr>
+          <p:cNvSpPr>
+            <a:spLocks noChangeAspect="1"/>
+          </p:cNvSpPr>
+          <p:nvPr/>
+        </p:nvSpPr>
+        <p:spPr>
+          <a:xfrm>
+            <a:off x="4468983" y="3115668"/>
+            <a:ext cx="1897531" cy="627675"/>
+          </a:xfrm>
+          <a:prstGeom prst="roundRect">
+            <a:avLst/>
+          </a:prstGeom>
+          <a:solidFill>
+            <a:schemeClr val="accent1">
+              <a:alpha val="50196"/>
+            </a:schemeClr>
+          </a:solidFill>
+        </p:spPr>
+        <p:style>
+          <a:lnRef idx="2">
+            <a:schemeClr val="accent1">
+              <a:shade val="15000"/>
+            </a:schemeClr>
+          </a:lnRef>
+          <a:fillRef idx="1">
+            <a:schemeClr val="accent1"/>
+          </a:fillRef>
+          <a:effectRef idx="0">
+            <a:schemeClr val="accent1"/>
+          </a:effectRef>
+          <a:fontRef idx="minor">
+            <a:schemeClr val="lt1"/>
+          </a:fontRef>
+        </p:style>
+        <p:txBody>
+          <a:bodyPr rtlCol="0" anchor="ctr"/>
+          <a:lstStyle/>
+          <a:p>
+            <a:pPr algn="ctr"/>
+            <a:r>
+              <a:rPr lang="en-CA" sz="2800" b="1" noProof="0" dirty="0">
+                <a:latin typeface="Avenir Next LT Pro" panose="020B0504020202020204" pitchFamily="34" charset="77"/>
+              </a:rPr>
+              <a:t>Evolution</a:t>
+            </a:r>
+            <a:endParaRPr lang="en-CA" b="1" noProof="0" dirty="0"/>
+          </a:p>
+        </p:txBody>
+      </p:sp>
+      <p:sp>
+        <p:nvSpPr>
+          <p:cNvPr id="19" name="Forme libre 26">
+            <a:extLst>
+              <a:ext uri="{FF2B5EF4-FFF2-40B4-BE49-F238E27FC236}">
+                <a16:creationId xmlns:a16="http://schemas.microsoft.com/office/drawing/2014/main" id="{987B8484-9FFB-F4C0-814F-EF382F2AD91B}"/>
+              </a:ext>
+            </a:extLst>
+          </p:cNvPr>
+          <p:cNvSpPr/>
+          <p:nvPr/>
+        </p:nvSpPr>
+        <p:spPr>
+          <a:xfrm>
+            <a:off x="8259987" y="2684907"/>
+            <a:ext cx="45719" cy="715698"/>
+          </a:xfrm>
+          <a:custGeom>
+            <a:avLst/>
+            <a:gdLst>
+              <a:gd name="connsiteX0" fmla="*/ 0 w 573206"/>
+              <a:gd name="connsiteY0" fmla="*/ 0 h 887105"/>
+              <a:gd name="connsiteX1" fmla="*/ 477671 w 573206"/>
+              <a:gd name="connsiteY1" fmla="*/ 368490 h 887105"/>
+              <a:gd name="connsiteX2" fmla="*/ 573206 w 573206"/>
+              <a:gd name="connsiteY2" fmla="*/ 887105 h 887105"/>
+            </a:gdLst>
+            <a:ahLst/>
+            <a:cxnLst>
+              <a:cxn ang="0">
+                <a:pos x="connsiteX0" y="connsiteY0"/>
+              </a:cxn>
+              <a:cxn ang="0">
+                <a:pos x="connsiteX1" y="connsiteY1"/>
+              </a:cxn>
+              <a:cxn ang="0">
+                <a:pos x="connsiteX2" y="connsiteY2"/>
+              </a:cxn>
+            </a:cxnLst>
+            <a:rect l="l" t="t" r="r" b="b"/>
+            <a:pathLst>
+              <a:path w="573206" h="887105">
+                <a:moveTo>
+                  <a:pt x="0" y="0"/>
+                </a:moveTo>
+                <a:cubicBezTo>
+                  <a:pt x="191068" y="110319"/>
+                  <a:pt x="382137" y="220639"/>
+                  <a:pt x="477671" y="368490"/>
+                </a:cubicBezTo>
+                <a:cubicBezTo>
+                  <a:pt x="573205" y="516341"/>
+                  <a:pt x="573205" y="701723"/>
+                  <a:pt x="573206" y="887105"/>
+                </a:cubicBezTo>
+              </a:path>
+            </a:pathLst>
+          </a:custGeom>
+          <a:noFill/>
+          <a:ln w="76200">
+            <a:solidFill>
+              <a:schemeClr val="accent1"/>
+            </a:solidFill>
+            <a:headEnd type="none" w="med" len="med"/>
+            <a:tailEnd type="triangle" w="med" len="med"/>
+            <a:extLst>
+              <a:ext uri="{C807C97D-BFC1-408E-A445-0C87EB9F89A2}">
+                <ask:lineSketchStyleProps xmlns:ask="http://schemas.microsoft.com/office/drawing/2018/sketchyshapes" sd="1219033472">
+                  <a:custGeom>
+                    <a:avLst/>
+                    <a:gdLst>
+                      <a:gd name="connsiteX0" fmla="*/ 0 w 573206"/>
+                      <a:gd name="connsiteY0" fmla="*/ 0 h 887105"/>
+                      <a:gd name="connsiteX1" fmla="*/ 477671 w 573206"/>
+                      <a:gd name="connsiteY1" fmla="*/ 368490 h 887105"/>
+                      <a:gd name="connsiteX2" fmla="*/ 573206 w 573206"/>
+                      <a:gd name="connsiteY2" fmla="*/ 887105 h 887105"/>
+                    </a:gdLst>
+                    <a:ahLst/>
+                    <a:cxnLst>
+                      <a:cxn ang="0">
+                        <a:pos x="connsiteX0" y="connsiteY0"/>
+                      </a:cxn>
+                      <a:cxn ang="0">
+                        <a:pos x="connsiteX1" y="connsiteY1"/>
+                      </a:cxn>
+                      <a:cxn ang="0">
+                        <a:pos x="connsiteX2" y="connsiteY2"/>
+                      </a:cxn>
+                    </a:cxnLst>
+                    <a:rect l="l" t="t" r="r" b="b"/>
+                    <a:pathLst>
+                      <a:path w="573206" h="887105" extrusionOk="0">
+                        <a:moveTo>
+                          <a:pt x="0" y="0"/>
+                        </a:moveTo>
+                        <a:cubicBezTo>
+                          <a:pt x="166656" y="95261"/>
+                          <a:pt x="363541" y="227618"/>
+                          <a:pt x="477671" y="368490"/>
+                        </a:cubicBezTo>
+                        <a:cubicBezTo>
+                          <a:pt x="586088" y="519053"/>
+                          <a:pt x="553187" y="702360"/>
+                          <a:pt x="573206" y="887105"/>
+                        </a:cubicBezTo>
+                      </a:path>
+                    </a:pathLst>
+                  </a:custGeom>
+                  <ask:type>
+                    <ask:lineSketchNone/>
+                  </ask:type>
+                </ask:lineSketchStyleProps>
+              </a:ext>
+            </a:extLst>
+          </a:ln>
+        </p:spPr>
+        <p:style>
+          <a:lnRef idx="2">
+            <a:schemeClr val="accent1">
+              <a:shade val="15000"/>
+            </a:schemeClr>
+          </a:lnRef>
+          <a:fillRef idx="1">
+            <a:schemeClr val="accent1"/>
+          </a:fillRef>
+          <a:effectRef idx="0">
+            <a:schemeClr val="accent1"/>
+          </a:effectRef>
+          <a:fontRef idx="minor">
+            <a:schemeClr val="lt1"/>
+          </a:fontRef>
+        </p:style>
+        <p:txBody>
+          <a:bodyPr rtlCol="0" anchor="ctr"/>
+          <a:lstStyle/>
+          <a:p>
+            <a:pPr algn="ctr"/>
+            <a:endParaRPr lang="en-CA" sz="1050" noProof="0" dirty="0"/>
+          </a:p>
+        </p:txBody>
+      </p:sp>
+      <p:sp>
+        <p:nvSpPr>
+          <p:cNvPr id="20" name="Forme libre 27">
+            <a:extLst>
+              <a:ext uri="{FF2B5EF4-FFF2-40B4-BE49-F238E27FC236}">
+                <a16:creationId xmlns:a16="http://schemas.microsoft.com/office/drawing/2014/main" id="{F8B164FE-6AFF-E0FD-709C-3C71C4F635C1}"/>
+              </a:ext>
+            </a:extLst>
+          </p:cNvPr>
+          <p:cNvSpPr/>
+          <p:nvPr/>
+        </p:nvSpPr>
+        <p:spPr>
+          <a:xfrm>
+            <a:off x="6344816" y="3662780"/>
+            <a:ext cx="667619" cy="148461"/>
+          </a:xfrm>
+          <a:custGeom>
+            <a:avLst/>
+            <a:gdLst>
+              <a:gd name="connsiteX0" fmla="*/ 0 w 1487606"/>
+              <a:gd name="connsiteY0" fmla="*/ 0 h 437519"/>
+              <a:gd name="connsiteX1" fmla="*/ 518615 w 1487606"/>
+              <a:gd name="connsiteY1" fmla="*/ 368489 h 437519"/>
+              <a:gd name="connsiteX2" fmla="*/ 1487606 w 1487606"/>
+              <a:gd name="connsiteY2" fmla="*/ 436728 h 437519"/>
+            </a:gdLst>
+            <a:ahLst/>
+            <a:cxnLst>
+              <a:cxn ang="0">
+                <a:pos x="connsiteX0" y="connsiteY0"/>
+              </a:cxn>
+              <a:cxn ang="0">
+                <a:pos x="connsiteX1" y="connsiteY1"/>
+              </a:cxn>
+              <a:cxn ang="0">
+                <a:pos x="connsiteX2" y="connsiteY2"/>
+              </a:cxn>
+            </a:cxnLst>
+            <a:rect l="l" t="t" r="r" b="b"/>
+            <a:pathLst>
+              <a:path w="1487606" h="437519">
+                <a:moveTo>
+                  <a:pt x="0" y="0"/>
+                </a:moveTo>
+                <a:cubicBezTo>
+                  <a:pt x="135340" y="147850"/>
+                  <a:pt x="270681" y="295701"/>
+                  <a:pt x="518615" y="368489"/>
+                </a:cubicBezTo>
+                <a:cubicBezTo>
+                  <a:pt x="766549" y="441277"/>
+                  <a:pt x="1127077" y="439002"/>
+                  <a:pt x="1487606" y="436728"/>
+                </a:cubicBezTo>
+              </a:path>
+            </a:pathLst>
+          </a:custGeom>
+          <a:noFill/>
+          <a:ln w="76200">
+            <a:solidFill>
+              <a:schemeClr val="accent1"/>
+            </a:solidFill>
+            <a:prstDash val="solid"/>
+            <a:headEnd type="none" w="med" len="med"/>
+            <a:tailEnd type="triangle" w="med" len="med"/>
+          </a:ln>
+        </p:spPr>
+        <p:style>
+          <a:lnRef idx="2">
+            <a:schemeClr val="accent1">
+              <a:shade val="15000"/>
+            </a:schemeClr>
+          </a:lnRef>
+          <a:fillRef idx="1">
+            <a:schemeClr val="accent1"/>
+          </a:fillRef>
+          <a:effectRef idx="0">
+            <a:schemeClr val="accent1"/>
+          </a:effectRef>
+          <a:fontRef idx="minor">
+            <a:schemeClr val="lt1"/>
+          </a:fontRef>
+        </p:style>
+        <p:txBody>
+          <a:bodyPr rtlCol="0" anchor="ctr"/>
+          <a:lstStyle/>
+          <a:p>
+            <a:pPr algn="ctr"/>
+            <a:endParaRPr lang="en-CA" sz="1050" noProof="0" dirty="0"/>
+          </a:p>
+        </p:txBody>
+      </p:sp>
+      <p:sp>
+        <p:nvSpPr>
+          <p:cNvPr id="21" name="Forme libre 7">
+            <a:extLst>
+              <a:ext uri="{FF2B5EF4-FFF2-40B4-BE49-F238E27FC236}">
+                <a16:creationId xmlns:a16="http://schemas.microsoft.com/office/drawing/2014/main" id="{FD6CF61B-6CCC-2FB6-BC8A-AD167F2B47D7}"/>
+              </a:ext>
+            </a:extLst>
+          </p:cNvPr>
+          <p:cNvSpPr/>
+          <p:nvPr/>
+        </p:nvSpPr>
+        <p:spPr>
+          <a:xfrm>
+            <a:off x="198951" y="1521325"/>
+            <a:ext cx="575676" cy="2270062"/>
+          </a:xfrm>
+          <a:custGeom>
+            <a:avLst/>
+            <a:gdLst>
+              <a:gd name="connsiteX0" fmla="*/ 463790 w 463790"/>
+              <a:gd name="connsiteY0" fmla="*/ 0 h 846162"/>
+              <a:gd name="connsiteX1" fmla="*/ 40710 w 463790"/>
+              <a:gd name="connsiteY1" fmla="*/ 286603 h 846162"/>
+              <a:gd name="connsiteX2" fmla="*/ 40710 w 463790"/>
+              <a:gd name="connsiteY2" fmla="*/ 846162 h 846162"/>
+            </a:gdLst>
+            <a:ahLst/>
+            <a:cxnLst>
+              <a:cxn ang="0">
+                <a:pos x="connsiteX0" y="connsiteY0"/>
+              </a:cxn>
+              <a:cxn ang="0">
+                <a:pos x="connsiteX1" y="connsiteY1"/>
+              </a:cxn>
+              <a:cxn ang="0">
+                <a:pos x="connsiteX2" y="connsiteY2"/>
+              </a:cxn>
+            </a:cxnLst>
+            <a:rect l="l" t="t" r="r" b="b"/>
+            <a:pathLst>
+              <a:path w="463790" h="846162">
+                <a:moveTo>
+                  <a:pt x="463790" y="0"/>
+                </a:moveTo>
+                <a:cubicBezTo>
+                  <a:pt x="287506" y="72788"/>
+                  <a:pt x="111223" y="145576"/>
+                  <a:pt x="40710" y="286603"/>
+                </a:cubicBezTo>
+                <a:cubicBezTo>
+                  <a:pt x="-29803" y="427630"/>
+                  <a:pt x="5453" y="636896"/>
+                  <a:pt x="40710" y="846162"/>
+                </a:cubicBezTo>
+              </a:path>
+            </a:pathLst>
+          </a:custGeom>
+          <a:noFill/>
+          <a:ln w="38100">
+            <a:solidFill>
+              <a:schemeClr val="accent6"/>
+            </a:solidFill>
+            <a:prstDash val="dash"/>
+            <a:headEnd type="none" w="med" len="med"/>
+            <a:tailEnd type="triangle" w="med" len="med"/>
+          </a:ln>
+        </p:spPr>
+        <p:style>
+          <a:lnRef idx="2">
+            <a:schemeClr val="accent1">
+              <a:shade val="15000"/>
+            </a:schemeClr>
+          </a:lnRef>
+          <a:fillRef idx="1">
+            <a:schemeClr val="accent1"/>
+          </a:fillRef>
+          <a:effectRef idx="0">
+            <a:schemeClr val="accent1"/>
+          </a:effectRef>
+          <a:fontRef idx="minor">
+            <a:schemeClr val="lt1"/>
+          </a:fontRef>
+        </p:style>
+        <p:txBody>
+          <a:bodyPr rtlCol="0" anchor="ctr"/>
+          <a:lstStyle/>
+          <a:p>
+            <a:pPr algn="ctr"/>
+            <a:endParaRPr lang="en-CA" sz="1050" noProof="0" dirty="0"/>
+          </a:p>
+        </p:txBody>
+      </p:sp>
+      <p:sp>
+        <p:nvSpPr>
+          <p:cNvPr id="22" name="Rectangle : coins arrondis 10">
+            <a:extLst>
+              <a:ext uri="{FF2B5EF4-FFF2-40B4-BE49-F238E27FC236}">
+                <a16:creationId xmlns:a16="http://schemas.microsoft.com/office/drawing/2014/main" id="{7AB70C59-4BBC-B51D-8E10-2489D4045969}"/>
+              </a:ext>
+            </a:extLst>
+          </p:cNvPr>
+          <p:cNvSpPr>
+            <a:spLocks/>
+          </p:cNvSpPr>
+          <p:nvPr/>
+        </p:nvSpPr>
+        <p:spPr>
+          <a:xfrm>
+            <a:off x="27199" y="3833016"/>
+            <a:ext cx="2384793" cy="749194"/>
+          </a:xfrm>
+          <a:prstGeom prst="roundRect">
+            <a:avLst/>
+          </a:prstGeom>
+          <a:solidFill>
+            <a:schemeClr val="accent6">
+              <a:alpha val="50196"/>
+            </a:schemeClr>
+          </a:solidFill>
+          <a:ln>
+            <a:noFill/>
+          </a:ln>
+        </p:spPr>
+        <p:style>
+          <a:lnRef idx="2">
+            <a:schemeClr val="accent1">
+              <a:shade val="15000"/>
+            </a:schemeClr>
+          </a:lnRef>
+          <a:fillRef idx="1">
+            <a:schemeClr val="accent1"/>
+          </a:fillRef>
+          <a:effectRef idx="0">
+            <a:schemeClr val="accent1"/>
+          </a:effectRef>
+          <a:fontRef idx="minor">
+            <a:schemeClr val="lt1"/>
+          </a:fontRef>
+        </p:style>
+        <p:txBody>
+          <a:bodyPr rtlCol="0" anchor="ctr"/>
+          <a:lstStyle/>
+          <a:p>
+            <a:pPr algn="ctr"/>
+            <a:r>
+              <a:rPr lang="en-CA" sz="2000" b="1" noProof="0" dirty="0">
+                <a:latin typeface="Avenir Next LT Pro" panose="020B0504020202020204" pitchFamily="34" charset="77"/>
+              </a:rPr>
+              <a:t>Growing season conditions</a:t>
+            </a:r>
+            <a:endParaRPr lang="en-CA" sz="2000" b="1" noProof="0" dirty="0">
+              <a:latin typeface="Avenir Next LT Pro" panose="020B0504020202020204" pitchFamily="34" charset="77"/>
+              <a:ea typeface="Cambria Math" panose="02040503050406030204" pitchFamily="18" charset="0"/>
+            </a:endParaRPr>
+          </a:p>
+        </p:txBody>
+      </p:sp>
+      <p:sp>
+        <p:nvSpPr>
+          <p:cNvPr id="23" name="Rectangle : coins arrondis 13">
+            <a:extLst>
+              <a:ext uri="{FF2B5EF4-FFF2-40B4-BE49-F238E27FC236}">
+                <a16:creationId xmlns:a16="http://schemas.microsoft.com/office/drawing/2014/main" id="{DE145953-AE02-B713-250F-73E39616A639}"/>
+              </a:ext>
+            </a:extLst>
+          </p:cNvPr>
+          <p:cNvSpPr>
+            <a:spLocks/>
+          </p:cNvSpPr>
+          <p:nvPr/>
+        </p:nvSpPr>
+        <p:spPr>
+          <a:xfrm>
+            <a:off x="417519" y="2656395"/>
+            <a:ext cx="2642883" cy="673787"/>
+          </a:xfrm>
+          <a:prstGeom prst="roundRect">
+            <a:avLst/>
+          </a:prstGeom>
+          <a:solidFill>
+            <a:schemeClr val="accent6">
+              <a:alpha val="50196"/>
+            </a:schemeClr>
+          </a:solidFill>
+          <a:ln>
+            <a:noFill/>
+          </a:ln>
+        </p:spPr>
+        <p:style>
+          <a:lnRef idx="2">
+            <a:schemeClr val="accent1">
+              <a:shade val="15000"/>
+            </a:schemeClr>
+          </a:lnRef>
+          <a:fillRef idx="1">
+            <a:schemeClr val="accent1"/>
+          </a:fillRef>
+          <a:effectRef idx="0">
+            <a:schemeClr val="accent1"/>
+          </a:effectRef>
+          <a:fontRef idx="minor">
+            <a:schemeClr val="lt1"/>
+          </a:fontRef>
+        </p:style>
+        <p:txBody>
+          <a:bodyPr rtlCol="0" anchor="ctr"/>
+          <a:lstStyle/>
+          <a:p>
+            <a:pPr algn="ctr"/>
+            <a:r>
+              <a:rPr lang="en-CA" sz="2000" b="1" noProof="0" dirty="0">
+                <a:latin typeface="Avenir Next LT Pro" panose="020B0504020202020204" pitchFamily="34" charset="77"/>
+              </a:rPr>
+              <a:t>Hibernation season conditions</a:t>
+            </a:r>
+            <a:endParaRPr lang="en-CA" sz="2000" b="1" noProof="0" dirty="0">
+              <a:latin typeface="Avenir Next LT Pro" panose="020B0504020202020204" pitchFamily="34" charset="77"/>
+              <a:ea typeface="Cambria Math" panose="02040503050406030204" pitchFamily="18" charset="0"/>
+            </a:endParaRPr>
+          </a:p>
+        </p:txBody>
+      </p:sp>
+      <p:sp>
+        <p:nvSpPr>
+          <p:cNvPr id="24" name="Forme libre 14">
+            <a:extLst>
+              <a:ext uri="{FF2B5EF4-FFF2-40B4-BE49-F238E27FC236}">
+                <a16:creationId xmlns:a16="http://schemas.microsoft.com/office/drawing/2014/main" id="{E945DDD7-4E87-A234-2545-D541A1454CCE}"/>
+              </a:ext>
+            </a:extLst>
+          </p:cNvPr>
+          <p:cNvSpPr/>
+          <p:nvPr/>
+        </p:nvSpPr>
+        <p:spPr>
+          <a:xfrm>
+            <a:off x="1428188" y="1831497"/>
+            <a:ext cx="152142" cy="824899"/>
+          </a:xfrm>
+          <a:custGeom>
+            <a:avLst/>
+            <a:gdLst>
+              <a:gd name="connsiteX0" fmla="*/ 17416 w 686157"/>
+              <a:gd name="connsiteY0" fmla="*/ 0 h 1542197"/>
+              <a:gd name="connsiteX1" fmla="*/ 85655 w 686157"/>
+              <a:gd name="connsiteY1" fmla="*/ 900753 h 1542197"/>
+              <a:gd name="connsiteX2" fmla="*/ 686157 w 686157"/>
+              <a:gd name="connsiteY2" fmla="*/ 1542197 h 1542197"/>
+            </a:gdLst>
+            <a:ahLst/>
+            <a:cxnLst>
+              <a:cxn ang="0">
+                <a:pos x="connsiteX0" y="connsiteY0"/>
+              </a:cxn>
+              <a:cxn ang="0">
+                <a:pos x="connsiteX1" y="connsiteY1"/>
+              </a:cxn>
+              <a:cxn ang="0">
+                <a:pos x="connsiteX2" y="connsiteY2"/>
+              </a:cxn>
+            </a:cxnLst>
+            <a:rect l="l" t="t" r="r" b="b"/>
+            <a:pathLst>
+              <a:path w="686157" h="1542197">
+                <a:moveTo>
+                  <a:pt x="17416" y="0"/>
+                </a:moveTo>
+                <a:cubicBezTo>
+                  <a:pt x="-4193" y="321860"/>
+                  <a:pt x="-25802" y="643720"/>
+                  <a:pt x="85655" y="900753"/>
+                </a:cubicBezTo>
+                <a:cubicBezTo>
+                  <a:pt x="197112" y="1157786"/>
+                  <a:pt x="441634" y="1349991"/>
+                  <a:pt x="686157" y="1542197"/>
+                </a:cubicBezTo>
+              </a:path>
+            </a:pathLst>
+          </a:custGeom>
+          <a:noFill/>
+          <a:ln w="38100">
+            <a:solidFill>
+              <a:schemeClr val="accent6"/>
+            </a:solidFill>
+            <a:prstDash val="dash"/>
+            <a:headEnd type="none" w="med" len="med"/>
+            <a:tailEnd type="triangle" w="med" len="med"/>
+          </a:ln>
+        </p:spPr>
+        <p:style>
+          <a:lnRef idx="2">
+            <a:schemeClr val="accent1">
+              <a:shade val="15000"/>
+            </a:schemeClr>
+          </a:lnRef>
+          <a:fillRef idx="1">
+            <a:schemeClr val="accent1"/>
+          </a:fillRef>
+          <a:effectRef idx="0">
+            <a:schemeClr val="accent1"/>
+          </a:effectRef>
+          <a:fontRef idx="minor">
+            <a:schemeClr val="lt1"/>
+          </a:fontRef>
+        </p:style>
+        <p:txBody>
+          <a:bodyPr rtlCol="0" anchor="ctr"/>
+          <a:lstStyle/>
+          <a:p>
+            <a:pPr algn="ctr"/>
+            <a:endParaRPr lang="en-CA" sz="1050" noProof="0" dirty="0"/>
+          </a:p>
+        </p:txBody>
+      </p:sp>
+      <p:sp>
+        <p:nvSpPr>
+          <p:cNvPr id="25" name="Rectangle : coins arrondis 15">
+            <a:extLst>
+              <a:ext uri="{FF2B5EF4-FFF2-40B4-BE49-F238E27FC236}">
+                <a16:creationId xmlns:a16="http://schemas.microsoft.com/office/drawing/2014/main" id="{C3AD7FE4-71C7-C5C5-AF58-9334CE0561C2}"/>
+              </a:ext>
+            </a:extLst>
+          </p:cNvPr>
+          <p:cNvSpPr>
+            <a:spLocks/>
+          </p:cNvSpPr>
+          <p:nvPr/>
+        </p:nvSpPr>
+        <p:spPr>
+          <a:xfrm>
+            <a:off x="2991571" y="1806918"/>
+            <a:ext cx="1982288" cy="665064"/>
+          </a:xfrm>
+          <a:prstGeom prst="roundRect">
+            <a:avLst/>
+          </a:prstGeom>
+          <a:solidFill>
+            <a:schemeClr val="accent6">
+              <a:alpha val="50196"/>
+            </a:schemeClr>
+          </a:solidFill>
+          <a:ln>
+            <a:noFill/>
+          </a:ln>
+        </p:spPr>
+        <p:style>
+          <a:lnRef idx="2">
+            <a:schemeClr val="accent1">
+              <a:shade val="15000"/>
+            </a:schemeClr>
+          </a:lnRef>
+          <a:fillRef idx="1">
+            <a:schemeClr val="accent1"/>
+          </a:fillRef>
+          <a:effectRef idx="0">
+            <a:schemeClr val="accent1"/>
+          </a:effectRef>
+          <a:fontRef idx="minor">
+            <a:schemeClr val="lt1"/>
+          </a:fontRef>
+        </p:style>
+        <p:txBody>
+          <a:bodyPr rtlCol="0" anchor="ctr"/>
+          <a:lstStyle/>
+          <a:p>
+            <a:pPr algn="ctr"/>
+            <a:r>
+              <a:rPr lang="en-CA" sz="2000" b="1" noProof="0" dirty="0">
+                <a:latin typeface="Avenir Next LT Pro" panose="020B0504020202020204" pitchFamily="34" charset="77"/>
+              </a:rPr>
+              <a:t>Seasons length</a:t>
+            </a:r>
+            <a:endParaRPr lang="en-CA" sz="2000" b="1" noProof="0" dirty="0">
+              <a:latin typeface="Avenir Next LT Pro" panose="020B0504020202020204" pitchFamily="34" charset="77"/>
+              <a:ea typeface="Cambria Math" panose="02040503050406030204" pitchFamily="18" charset="0"/>
+            </a:endParaRPr>
+          </a:p>
+        </p:txBody>
+      </p:sp>
+      <p:sp>
+        <p:nvSpPr>
+          <p:cNvPr id="26" name="Forme libre 16">
+            <a:extLst>
+              <a:ext uri="{FF2B5EF4-FFF2-40B4-BE49-F238E27FC236}">
+                <a16:creationId xmlns:a16="http://schemas.microsoft.com/office/drawing/2014/main" id="{25C06D60-8524-CDA7-3544-90749FC0C39B}"/>
+              </a:ext>
+            </a:extLst>
+          </p:cNvPr>
+          <p:cNvSpPr/>
+          <p:nvPr/>
+        </p:nvSpPr>
+        <p:spPr>
+          <a:xfrm flipH="1">
+            <a:off x="4132796" y="1478719"/>
+            <a:ext cx="1237134" cy="328199"/>
+          </a:xfrm>
+          <a:custGeom>
+            <a:avLst/>
+            <a:gdLst>
+              <a:gd name="connsiteX0" fmla="*/ 0 w 2606722"/>
+              <a:gd name="connsiteY0" fmla="*/ 0 h 1173707"/>
+              <a:gd name="connsiteX1" fmla="*/ 982639 w 2606722"/>
+              <a:gd name="connsiteY1" fmla="*/ 272955 h 1173707"/>
+              <a:gd name="connsiteX2" fmla="*/ 2279176 w 2606722"/>
+              <a:gd name="connsiteY2" fmla="*/ 818865 h 1173707"/>
+              <a:gd name="connsiteX3" fmla="*/ 2606722 w 2606722"/>
+              <a:gd name="connsiteY3" fmla="*/ 1173707 h 1173707"/>
+            </a:gdLst>
+            <a:ahLst/>
+            <a:cxnLst>
+              <a:cxn ang="0">
+                <a:pos x="connsiteX0" y="connsiteY0"/>
+              </a:cxn>
+              <a:cxn ang="0">
+                <a:pos x="connsiteX1" y="connsiteY1"/>
+              </a:cxn>
+              <a:cxn ang="0">
+                <a:pos x="connsiteX2" y="connsiteY2"/>
+              </a:cxn>
+              <a:cxn ang="0">
+                <a:pos x="connsiteX3" y="connsiteY3"/>
+              </a:cxn>
+            </a:cxnLst>
+            <a:rect l="l" t="t" r="r" b="b"/>
+            <a:pathLst>
+              <a:path w="2606722" h="1173707">
+                <a:moveTo>
+                  <a:pt x="0" y="0"/>
+                </a:moveTo>
+                <a:cubicBezTo>
+                  <a:pt x="301388" y="68239"/>
+                  <a:pt x="602776" y="136478"/>
+                  <a:pt x="982639" y="272955"/>
+                </a:cubicBezTo>
+                <a:cubicBezTo>
+                  <a:pt x="1362502" y="409432"/>
+                  <a:pt x="2008496" y="668740"/>
+                  <a:pt x="2279176" y="818865"/>
+                </a:cubicBezTo>
+                <a:cubicBezTo>
+                  <a:pt x="2549856" y="968990"/>
+                  <a:pt x="2578289" y="1071348"/>
+                  <a:pt x="2606722" y="1173707"/>
+                </a:cubicBezTo>
+              </a:path>
+            </a:pathLst>
+          </a:custGeom>
+          <a:noFill/>
+          <a:ln w="38100">
+            <a:solidFill>
+              <a:schemeClr val="accent6"/>
+            </a:solidFill>
+            <a:prstDash val="dash"/>
+            <a:headEnd type="none" w="med" len="med"/>
+            <a:tailEnd type="triangle" w="med" len="med"/>
+          </a:ln>
+        </p:spPr>
+        <p:style>
+          <a:lnRef idx="2">
+            <a:schemeClr val="accent1">
+              <a:shade val="15000"/>
+            </a:schemeClr>
+          </a:lnRef>
+          <a:fillRef idx="1">
+            <a:schemeClr val="accent1"/>
+          </a:fillRef>
+          <a:effectRef idx="0">
+            <a:schemeClr val="accent1"/>
+          </a:effectRef>
+          <a:fontRef idx="minor">
+            <a:schemeClr val="lt1"/>
+          </a:fontRef>
+        </p:style>
+        <p:txBody>
+          <a:bodyPr rtlCol="0" anchor="ctr"/>
+          <a:lstStyle/>
+          <a:p>
+            <a:pPr algn="ctr"/>
+            <a:endParaRPr lang="en-CA" sz="1050" noProof="0" dirty="0"/>
+          </a:p>
+        </p:txBody>
+      </p:sp>
+      <p:grpSp>
+        <p:nvGrpSpPr>
+          <p:cNvPr id="27" name="Groupe 12">
+            <a:extLst>
+              <a:ext uri="{FF2B5EF4-FFF2-40B4-BE49-F238E27FC236}">
+                <a16:creationId xmlns:a16="http://schemas.microsoft.com/office/drawing/2014/main" id="{8D66143F-CF09-4FBA-8E3D-D0D289F74EDC}"/>
+              </a:ext>
+            </a:extLst>
+          </p:cNvPr>
+          <p:cNvGrpSpPr/>
+          <p:nvPr/>
+        </p:nvGrpSpPr>
+        <p:grpSpPr>
+          <a:xfrm>
+            <a:off x="4343396" y="141428"/>
+            <a:ext cx="2955899" cy="1710650"/>
+            <a:chOff x="5079593" y="481424"/>
+            <a:chExt cx="4667216" cy="2092545"/>
+          </a:xfrm>
+        </p:grpSpPr>
+        <p:sp>
+          <p:nvSpPr>
+            <p:cNvPr id="30" name="Rectangle : coins arrondis 6">
+              <a:extLst>
+                <a:ext uri="{FF2B5EF4-FFF2-40B4-BE49-F238E27FC236}">
+                  <a16:creationId xmlns:a16="http://schemas.microsoft.com/office/drawing/2014/main" id="{E5E7079C-4EFA-A3AC-90F8-6A092D1CE009}"/>
+                </a:ext>
+              </a:extLst>
+            </p:cNvPr>
+            <p:cNvSpPr>
+              <a:spLocks/>
+            </p:cNvSpPr>
+            <p:nvPr/>
+          </p:nvSpPr>
+          <p:spPr>
+            <a:xfrm>
+              <a:off x="5079593" y="481424"/>
+              <a:ext cx="1953372" cy="657967"/>
+            </a:xfrm>
+            <a:prstGeom prst="roundRect">
+              <a:avLst/>
+            </a:prstGeom>
+            <a:solidFill>
+              <a:schemeClr val="accent1">
+                <a:alpha val="50196"/>
+              </a:schemeClr>
+            </a:solidFill>
+            <a:ln>
+              <a:noFill/>
+            </a:ln>
+          </p:spPr>
+          <p:style>
+            <a:lnRef idx="2">
+              <a:schemeClr val="accent1">
+                <a:shade val="15000"/>
+              </a:schemeClr>
+            </a:lnRef>
+            <a:fillRef idx="1">
+              <a:schemeClr val="accent1"/>
+            </a:fillRef>
+            <a:effectRef idx="0">
+              <a:schemeClr val="accent1"/>
+            </a:effectRef>
+            <a:fontRef idx="minor">
+              <a:schemeClr val="lt1"/>
+            </a:fontRef>
+          </p:style>
+          <p:txBody>
+            <a:bodyPr rtlCol="0" anchor="ctr"/>
+            <a:lstStyle/>
+            <a:p>
+              <a:pPr algn="ctr"/>
+              <a:r>
+                <a:rPr lang="en-CA" b="1" noProof="0" dirty="0">
+                  <a:latin typeface="Avenir Next LT Pro" panose="020B0504020202020204" pitchFamily="34" charset="77"/>
+                </a:rPr>
+                <a:t>Active season ➚</a:t>
+              </a:r>
+              <a:endParaRPr lang="en-CA" b="1" noProof="0" dirty="0">
+                <a:latin typeface="Avenir Next LT Pro" panose="020B0504020202020204" pitchFamily="34" charset="77"/>
+                <a:ea typeface="Cambria Math" panose="02040503050406030204" pitchFamily="18" charset="0"/>
+              </a:endParaRPr>
+            </a:p>
+          </p:txBody>
+        </p:sp>
+        <p:pic>
+          <p:nvPicPr>
+            <p:cNvPr id="31" name="Image 9" descr="Une image contenant dessin, croquis, noir, art&#10;&#10;Description générée automatiquement">
+              <a:extLst>
+                <a:ext uri="{FF2B5EF4-FFF2-40B4-BE49-F238E27FC236}">
+                  <a16:creationId xmlns:a16="http://schemas.microsoft.com/office/drawing/2014/main" id="{0B495BFB-DEE6-3411-FD5A-A1A160BB070B}"/>
+                </a:ext>
+              </a:extLst>
+            </p:cNvPr>
+            <p:cNvPicPr>
+              <a:picLocks noChangeAspect="1"/>
+            </p:cNvPicPr>
+            <p:nvPr/>
+          </p:nvPicPr>
+          <p:blipFill rotWithShape="1">
+            <a:blip r:embed="rId3"/>
+            <a:srcRect l="17815" t="63021" r="18034"/>
+            <a:stretch/>
+          </p:blipFill>
+          <p:spPr>
+            <a:xfrm>
+              <a:off x="5615771" y="927275"/>
+              <a:ext cx="2856704" cy="1646694"/>
+            </a:xfrm>
+            <a:prstGeom prst="rect">
+              <a:avLst/>
+            </a:prstGeom>
+          </p:spPr>
+        </p:pic>
+        <p:sp>
+          <p:nvSpPr>
+            <p:cNvPr id="32" name="Rectangle : coins arrondis 11">
+              <a:extLst>
+                <a:ext uri="{FF2B5EF4-FFF2-40B4-BE49-F238E27FC236}">
+                  <a16:creationId xmlns:a16="http://schemas.microsoft.com/office/drawing/2014/main" id="{08F6767D-6C22-F7B9-F8F8-3A8711B3F10D}"/>
+                </a:ext>
+              </a:extLst>
+            </p:cNvPr>
+            <p:cNvSpPr>
+              <a:spLocks/>
+            </p:cNvSpPr>
+            <p:nvPr/>
+          </p:nvSpPr>
+          <p:spPr>
+            <a:xfrm>
+              <a:off x="7190194" y="810407"/>
+              <a:ext cx="2556615" cy="652982"/>
+            </a:xfrm>
+            <a:prstGeom prst="roundRect">
+              <a:avLst/>
+            </a:prstGeom>
+            <a:solidFill>
+              <a:schemeClr val="accent1">
+                <a:alpha val="50196"/>
+              </a:schemeClr>
+            </a:solidFill>
+            <a:ln>
+              <a:noFill/>
+            </a:ln>
+          </p:spPr>
+          <p:style>
+            <a:lnRef idx="2">
+              <a:schemeClr val="accent1">
+                <a:shade val="15000"/>
+              </a:schemeClr>
+            </a:lnRef>
+            <a:fillRef idx="1">
+              <a:schemeClr val="accent1"/>
+            </a:fillRef>
+            <a:effectRef idx="0">
+              <a:schemeClr val="accent1"/>
+            </a:effectRef>
+            <a:fontRef idx="minor">
+              <a:schemeClr val="lt1"/>
+            </a:fontRef>
+          </p:style>
+          <p:txBody>
+            <a:bodyPr rtlCol="0" anchor="ctr"/>
+            <a:lstStyle/>
+            <a:p>
+              <a:pPr algn="ctr"/>
+              <a:r>
+                <a:rPr lang="en-CA" b="1" noProof="0" dirty="0">
+                  <a:latin typeface="Avenir Next LT Pro" panose="020B0504020202020204" pitchFamily="34" charset="77"/>
+                </a:rPr>
+                <a:t>Hibernation➘</a:t>
+              </a:r>
+              <a:endParaRPr lang="en-CA" b="1" noProof="0" dirty="0">
+                <a:latin typeface="Avenir Next LT Pro" panose="020B0504020202020204" pitchFamily="34" charset="77"/>
+                <a:ea typeface="Cambria Math" panose="02040503050406030204" pitchFamily="18" charset="0"/>
+              </a:endParaRPr>
+            </a:p>
+          </p:txBody>
+        </p:sp>
+      </p:grpSp>
+      <p:cxnSp>
+        <p:nvCxnSpPr>
+          <p:cNvPr id="28" name="Connecteur en arc 18">
+            <a:extLst>
+              <a:ext uri="{FF2B5EF4-FFF2-40B4-BE49-F238E27FC236}">
+                <a16:creationId xmlns:a16="http://schemas.microsoft.com/office/drawing/2014/main" id="{47AD13F8-BBAF-20E5-670B-558CBF6AAD43}"/>
+              </a:ext>
+            </a:extLst>
+          </p:cNvPr>
+          <p:cNvCxnSpPr>
+            <a:cxnSpLocks/>
+            <a:stCxn id="16" idx="3"/>
+            <a:endCxn id="30" idx="1"/>
+          </p:cNvCxnSpPr>
+          <p:nvPr/>
+        </p:nvCxnSpPr>
+        <p:spPr>
+          <a:xfrm flipV="1">
+            <a:off x="3657599" y="410372"/>
+            <a:ext cx="685796" cy="773689"/>
+          </a:xfrm>
+          <a:prstGeom prst="curvedConnector3">
+            <a:avLst>
+              <a:gd name="adj1" fmla="val 50000"/>
+            </a:avLst>
+          </a:prstGeom>
+          <a:ln w="38100">
+            <a:solidFill>
+              <a:schemeClr val="accent1"/>
+            </a:solidFill>
+            <a:headEnd type="none" w="med" len="med"/>
+            <a:tailEnd type="triangle" w="med" len="med"/>
+          </a:ln>
+        </p:spPr>
+        <p:style>
+          <a:lnRef idx="1">
+            <a:schemeClr val="accent1"/>
+          </a:lnRef>
+          <a:fillRef idx="0">
+            <a:schemeClr val="accent1"/>
+          </a:fillRef>
+          <a:effectRef idx="0">
+            <a:schemeClr val="accent1"/>
+          </a:effectRef>
+          <a:fontRef idx="minor">
+            <a:schemeClr val="tx1"/>
+          </a:fontRef>
+        </p:style>
+      </p:cxnSp>
+      <p:sp>
+        <p:nvSpPr>
+          <p:cNvPr id="29" name="Forme libre 28">
+            <a:extLst>
+              <a:ext uri="{FF2B5EF4-FFF2-40B4-BE49-F238E27FC236}">
+                <a16:creationId xmlns:a16="http://schemas.microsoft.com/office/drawing/2014/main" id="{8D689383-11FC-21F9-5D8C-921F91679856}"/>
+              </a:ext>
+            </a:extLst>
+          </p:cNvPr>
+          <p:cNvSpPr/>
+          <p:nvPr/>
+        </p:nvSpPr>
+        <p:spPr>
+          <a:xfrm>
+            <a:off x="6395308" y="1311085"/>
+            <a:ext cx="1797640" cy="699858"/>
+          </a:xfrm>
+          <a:custGeom>
+            <a:avLst/>
+            <a:gdLst>
+              <a:gd name="connsiteX0" fmla="*/ 0 w 573206"/>
+              <a:gd name="connsiteY0" fmla="*/ 0 h 887105"/>
+              <a:gd name="connsiteX1" fmla="*/ 477671 w 573206"/>
+              <a:gd name="connsiteY1" fmla="*/ 368490 h 887105"/>
+              <a:gd name="connsiteX2" fmla="*/ 573206 w 573206"/>
+              <a:gd name="connsiteY2" fmla="*/ 887105 h 887105"/>
+            </a:gdLst>
+            <a:ahLst/>
+            <a:cxnLst>
+              <a:cxn ang="0">
+                <a:pos x="connsiteX0" y="connsiteY0"/>
+              </a:cxn>
+              <a:cxn ang="0">
+                <a:pos x="connsiteX1" y="connsiteY1"/>
+              </a:cxn>
+              <a:cxn ang="0">
+                <a:pos x="connsiteX2" y="connsiteY2"/>
+              </a:cxn>
+            </a:cxnLst>
+            <a:rect l="l" t="t" r="r" b="b"/>
+            <a:pathLst>
+              <a:path w="573206" h="887105">
+                <a:moveTo>
+                  <a:pt x="0" y="0"/>
+                </a:moveTo>
+                <a:cubicBezTo>
+                  <a:pt x="191068" y="110319"/>
+                  <a:pt x="382137" y="220639"/>
+                  <a:pt x="477671" y="368490"/>
+                </a:cubicBezTo>
+                <a:cubicBezTo>
+                  <a:pt x="573205" y="516341"/>
+                  <a:pt x="573205" y="701723"/>
+                  <a:pt x="573206" y="887105"/>
+                </a:cubicBezTo>
+              </a:path>
+            </a:pathLst>
+          </a:custGeom>
+          <a:noFill/>
+          <a:ln w="38100">
+            <a:solidFill>
+              <a:schemeClr val="accent1"/>
+            </a:solidFill>
+            <a:headEnd type="none" w="med" len="med"/>
+            <a:tailEnd type="triangle" w="med" len="med"/>
+            <a:extLst>
+              <a:ext uri="{C807C97D-BFC1-408E-A445-0C87EB9F89A2}">
+                <ask:lineSketchStyleProps xmlns:ask="http://schemas.microsoft.com/office/drawing/2018/sketchyshapes" sd="1219033472">
+                  <a:custGeom>
+                    <a:avLst/>
+                    <a:gdLst>
+                      <a:gd name="connsiteX0" fmla="*/ 0 w 573206"/>
+                      <a:gd name="connsiteY0" fmla="*/ 0 h 887105"/>
+                      <a:gd name="connsiteX1" fmla="*/ 477671 w 573206"/>
+                      <a:gd name="connsiteY1" fmla="*/ 368490 h 887105"/>
+                      <a:gd name="connsiteX2" fmla="*/ 573206 w 573206"/>
+                      <a:gd name="connsiteY2" fmla="*/ 887105 h 887105"/>
+                    </a:gdLst>
+                    <a:ahLst/>
+                    <a:cxnLst>
+                      <a:cxn ang="0">
+                        <a:pos x="connsiteX0" y="connsiteY0"/>
+                      </a:cxn>
+                      <a:cxn ang="0">
+                        <a:pos x="connsiteX1" y="connsiteY1"/>
+                      </a:cxn>
+                      <a:cxn ang="0">
+                        <a:pos x="connsiteX2" y="connsiteY2"/>
+                      </a:cxn>
+                    </a:cxnLst>
+                    <a:rect l="l" t="t" r="r" b="b"/>
+                    <a:pathLst>
+                      <a:path w="573206" h="887105" extrusionOk="0">
+                        <a:moveTo>
+                          <a:pt x="0" y="0"/>
+                        </a:moveTo>
+                        <a:cubicBezTo>
+                          <a:pt x="166656" y="95261"/>
+                          <a:pt x="363541" y="227618"/>
+                          <a:pt x="477671" y="368490"/>
+                        </a:cubicBezTo>
+                        <a:cubicBezTo>
+                          <a:pt x="586088" y="519053"/>
+                          <a:pt x="553187" y="702360"/>
+                          <a:pt x="573206" y="887105"/>
+                        </a:cubicBezTo>
+                      </a:path>
+                    </a:pathLst>
+                  </a:custGeom>
+                  <ask:type>
+                    <ask:lineSketchNone/>
+                  </ask:type>
+                </ask:lineSketchStyleProps>
+              </a:ext>
+            </a:extLst>
+          </a:ln>
+        </p:spPr>
+        <p:style>
+          <a:lnRef idx="2">
+            <a:schemeClr val="accent1">
+              <a:shade val="15000"/>
+            </a:schemeClr>
+          </a:lnRef>
+          <a:fillRef idx="1">
+            <a:schemeClr val="accent1"/>
+          </a:fillRef>
+          <a:effectRef idx="0">
+            <a:schemeClr val="accent1"/>
+          </a:effectRef>
+          <a:fontRef idx="minor">
+            <a:schemeClr val="lt1"/>
+          </a:fontRef>
+        </p:style>
+        <p:txBody>
+          <a:bodyPr rtlCol="0" anchor="ctr"/>
+          <a:lstStyle/>
+          <a:p>
+            <a:pPr algn="ctr"/>
+            <a:endParaRPr lang="en-CA" sz="1050" noProof="0" dirty="0"/>
+          </a:p>
+        </p:txBody>
+      </p:sp>
+      <p:sp>
+        <p:nvSpPr>
+          <p:cNvPr id="7" name="Freeform 6">
+            <a:extLst>
+              <a:ext uri="{FF2B5EF4-FFF2-40B4-BE49-F238E27FC236}">
+                <a16:creationId xmlns:a16="http://schemas.microsoft.com/office/drawing/2014/main" id="{5F587D4C-DBE1-10E2-4604-55E88FF52B27}"/>
+              </a:ext>
+            </a:extLst>
+          </p:cNvPr>
+          <p:cNvSpPr/>
+          <p:nvPr/>
+        </p:nvSpPr>
+        <p:spPr>
+          <a:xfrm>
+            <a:off x="2063716" y="3330184"/>
+            <a:ext cx="2384793" cy="183952"/>
+          </a:xfrm>
+          <a:custGeom>
+            <a:avLst/>
+            <a:gdLst>
+              <a:gd name="connsiteX0" fmla="*/ 0 w 1727200"/>
+              <a:gd name="connsiteY0" fmla="*/ 0 h 783771"/>
+              <a:gd name="connsiteX1" fmla="*/ 333829 w 1727200"/>
+              <a:gd name="connsiteY1" fmla="*/ 290286 h 783771"/>
+              <a:gd name="connsiteX2" fmla="*/ 1161143 w 1727200"/>
+              <a:gd name="connsiteY2" fmla="*/ 638628 h 783771"/>
+              <a:gd name="connsiteX3" fmla="*/ 1727200 w 1727200"/>
+              <a:gd name="connsiteY3" fmla="*/ 783771 h 783771"/>
+            </a:gdLst>
+            <a:ahLst/>
+            <a:cxnLst>
+              <a:cxn ang="0">
+                <a:pos x="connsiteX0" y="connsiteY0"/>
+              </a:cxn>
+              <a:cxn ang="0">
+                <a:pos x="connsiteX1" y="connsiteY1"/>
+              </a:cxn>
+              <a:cxn ang="0">
+                <a:pos x="connsiteX2" y="connsiteY2"/>
+              </a:cxn>
+              <a:cxn ang="0">
+                <a:pos x="connsiteX3" y="connsiteY3"/>
+              </a:cxn>
+            </a:cxnLst>
+            <a:rect l="l" t="t" r="r" b="b"/>
+            <a:pathLst>
+              <a:path w="1727200" h="783771">
+                <a:moveTo>
+                  <a:pt x="0" y="0"/>
+                </a:moveTo>
+                <a:cubicBezTo>
+                  <a:pt x="70152" y="91924"/>
+                  <a:pt x="140305" y="183848"/>
+                  <a:pt x="333829" y="290286"/>
+                </a:cubicBezTo>
+                <a:cubicBezTo>
+                  <a:pt x="527353" y="396724"/>
+                  <a:pt x="928915" y="556381"/>
+                  <a:pt x="1161143" y="638628"/>
+                </a:cubicBezTo>
+                <a:cubicBezTo>
+                  <a:pt x="1393371" y="720875"/>
+                  <a:pt x="1560285" y="752323"/>
+                  <a:pt x="1727200" y="783771"/>
+                </a:cubicBezTo>
+              </a:path>
+            </a:pathLst>
+          </a:custGeom>
+          <a:noFill/>
+          <a:ln w="38100">
+            <a:solidFill>
+              <a:schemeClr val="accent6"/>
+            </a:solidFill>
+            <a:tailEnd type="triangle"/>
+          </a:ln>
+        </p:spPr>
+        <p:style>
+          <a:lnRef idx="2">
+            <a:schemeClr val="accent1">
+              <a:shade val="15000"/>
+            </a:schemeClr>
+          </a:lnRef>
+          <a:fillRef idx="1">
+            <a:schemeClr val="accent1"/>
+          </a:fillRef>
+          <a:effectRef idx="0">
+            <a:schemeClr val="accent1"/>
+          </a:effectRef>
+          <a:fontRef idx="minor">
+            <a:schemeClr val="lt1"/>
+          </a:fontRef>
+        </p:style>
+        <p:txBody>
+          <a:bodyPr rtlCol="0" anchor="ctr"/>
+          <a:lstStyle/>
+          <a:p>
+            <a:pPr algn="ctr"/>
+            <a:endParaRPr lang="en-CA" noProof="0" dirty="0"/>
+          </a:p>
+        </p:txBody>
+      </p:sp>
+      <p:sp>
+        <p:nvSpPr>
+          <p:cNvPr id="10" name="Freeform 9">
+            <a:extLst>
+              <a:ext uri="{FF2B5EF4-FFF2-40B4-BE49-F238E27FC236}">
+                <a16:creationId xmlns:a16="http://schemas.microsoft.com/office/drawing/2014/main" id="{6701D879-BCE7-FE07-F1DC-411C102A8326}"/>
+              </a:ext>
+            </a:extLst>
+          </p:cNvPr>
+          <p:cNvSpPr/>
+          <p:nvPr/>
+        </p:nvSpPr>
+        <p:spPr>
+          <a:xfrm>
+            <a:off x="9480941" y="3725736"/>
+            <a:ext cx="919726" cy="67899"/>
+          </a:xfrm>
+          <a:custGeom>
+            <a:avLst/>
+            <a:gdLst>
+              <a:gd name="connsiteX0" fmla="*/ 0 w 2583542"/>
+              <a:gd name="connsiteY0" fmla="*/ 58057 h 58057"/>
+              <a:gd name="connsiteX1" fmla="*/ 1930400 w 2583542"/>
+              <a:gd name="connsiteY1" fmla="*/ 14515 h 58057"/>
+              <a:gd name="connsiteX2" fmla="*/ 2583542 w 2583542"/>
+              <a:gd name="connsiteY2" fmla="*/ 0 h 58057"/>
+            </a:gdLst>
+            <a:ahLst/>
+            <a:cxnLst>
+              <a:cxn ang="0">
+                <a:pos x="connsiteX0" y="connsiteY0"/>
+              </a:cxn>
+              <a:cxn ang="0">
+                <a:pos x="connsiteX1" y="connsiteY1"/>
+              </a:cxn>
+              <a:cxn ang="0">
+                <a:pos x="connsiteX2" y="connsiteY2"/>
+              </a:cxn>
+            </a:cxnLst>
+            <a:rect l="l" t="t" r="r" b="b"/>
+            <a:pathLst>
+              <a:path w="2583542" h="58057">
+                <a:moveTo>
+                  <a:pt x="0" y="58057"/>
+                </a:moveTo>
+                <a:lnTo>
+                  <a:pt x="1930400" y="14515"/>
+                </a:lnTo>
+                <a:lnTo>
+                  <a:pt x="2583542" y="0"/>
+                </a:lnTo>
+              </a:path>
+            </a:pathLst>
+          </a:custGeom>
+          <a:noFill/>
+          <a:ln w="57150">
+            <a:solidFill>
+              <a:srgbClr val="FF0000"/>
+            </a:solidFill>
+            <a:tailEnd type="triangle"/>
+          </a:ln>
+        </p:spPr>
+        <p:style>
+          <a:lnRef idx="2">
+            <a:schemeClr val="accent1">
+              <a:shade val="15000"/>
+            </a:schemeClr>
+          </a:lnRef>
+          <a:fillRef idx="1">
+            <a:schemeClr val="accent1"/>
+          </a:fillRef>
+          <a:effectRef idx="0">
+            <a:schemeClr val="accent1"/>
+          </a:effectRef>
+          <a:fontRef idx="minor">
+            <a:schemeClr val="lt1"/>
+          </a:fontRef>
+        </p:style>
+        <p:txBody>
+          <a:bodyPr rtlCol="0" anchor="ctr"/>
+          <a:lstStyle/>
+          <a:p>
+            <a:pPr algn="ctr"/>
+            <a:endParaRPr lang="en-CA" noProof="0" dirty="0"/>
+          </a:p>
+        </p:txBody>
+      </p:sp>
+      <p:sp>
+        <p:nvSpPr>
+          <p:cNvPr id="12" name="Rectangle : coins arrondis 23">
+            <a:extLst>
+              <a:ext uri="{FF2B5EF4-FFF2-40B4-BE49-F238E27FC236}">
+                <a16:creationId xmlns:a16="http://schemas.microsoft.com/office/drawing/2014/main" id="{43A2C9BC-2C8E-3981-1C93-E45C4921F095}"/>
+              </a:ext>
+            </a:extLst>
+          </p:cNvPr>
+          <p:cNvSpPr>
+            <a:spLocks noChangeAspect="1"/>
+          </p:cNvSpPr>
+          <p:nvPr/>
+        </p:nvSpPr>
+        <p:spPr>
+          <a:xfrm>
+            <a:off x="10448798" y="3570134"/>
+            <a:ext cx="1495960" cy="375670"/>
+          </a:xfrm>
+          <a:prstGeom prst="roundRect">
+            <a:avLst/>
+          </a:prstGeom>
+          <a:solidFill>
+            <a:srgbClr val="FF0000">
+              <a:alpha val="50196"/>
+            </a:srgbClr>
+          </a:solidFill>
+          <a:ln>
+            <a:noFill/>
+          </a:ln>
+        </p:spPr>
+        <p:style>
+          <a:lnRef idx="2">
+            <a:schemeClr val="accent1">
+              <a:shade val="15000"/>
+            </a:schemeClr>
+          </a:lnRef>
+          <a:fillRef idx="1">
+            <a:schemeClr val="accent1"/>
+          </a:fillRef>
+          <a:effectRef idx="0">
+            <a:schemeClr val="accent1"/>
+          </a:effectRef>
+          <a:fontRef idx="minor">
+            <a:schemeClr val="lt1"/>
+          </a:fontRef>
+        </p:style>
+        <p:txBody>
+          <a:bodyPr rtlCol="0" anchor="ctr"/>
+          <a:lstStyle/>
+          <a:p>
+            <a:pPr algn="ctr"/>
+            <a:r>
+              <a:rPr lang="en-CA" sz="2000" b="1" noProof="0" dirty="0">
+                <a:latin typeface="Avenir Next LT Pro" panose="020B0504020202020204" pitchFamily="34" charset="77"/>
+              </a:rPr>
+              <a:t>Behavior</a:t>
+            </a:r>
+            <a:endParaRPr lang="en-CA" sz="1600" b="1" noProof="0" dirty="0"/>
+          </a:p>
+        </p:txBody>
+      </p:sp>
+      <p:sp>
+        <p:nvSpPr>
+          <p:cNvPr id="33" name="Rectangle : coins arrondis 13">
+            <a:extLst>
+              <a:ext uri="{FF2B5EF4-FFF2-40B4-BE49-F238E27FC236}">
+                <a16:creationId xmlns:a16="http://schemas.microsoft.com/office/drawing/2014/main" id="{5FF1FF45-650A-001F-B7C1-CF21F6339555}"/>
+              </a:ext>
+            </a:extLst>
+          </p:cNvPr>
+          <p:cNvSpPr>
+            <a:spLocks/>
+          </p:cNvSpPr>
+          <p:nvPr/>
+        </p:nvSpPr>
+        <p:spPr>
+          <a:xfrm>
+            <a:off x="5218546" y="4936387"/>
+            <a:ext cx="3024000" cy="748419"/>
+          </a:xfrm>
+          <a:prstGeom prst="roundRect">
+            <a:avLst/>
+          </a:prstGeom>
+          <a:solidFill>
+            <a:srgbClr val="7030A0">
+              <a:alpha val="50196"/>
+            </a:srgbClr>
+          </a:solidFill>
+          <a:ln>
+            <a:noFill/>
+          </a:ln>
+        </p:spPr>
+        <p:style>
+          <a:lnRef idx="2">
+            <a:schemeClr val="accent1">
+              <a:shade val="15000"/>
+            </a:schemeClr>
+          </a:lnRef>
+          <a:fillRef idx="1">
+            <a:schemeClr val="accent1"/>
+          </a:fillRef>
+          <a:effectRef idx="0">
+            <a:schemeClr val="accent1"/>
+          </a:effectRef>
+          <a:fontRef idx="minor">
+            <a:schemeClr val="lt1"/>
+          </a:fontRef>
+        </p:style>
+        <p:txBody>
+          <a:bodyPr rtlCol="0" anchor="ctr"/>
+          <a:lstStyle/>
+          <a:p>
+            <a:pPr algn="ctr"/>
+            <a:r>
+              <a:rPr lang="en-CA" sz="2000" b="1" noProof="0" dirty="0">
+                <a:latin typeface="Avenir Next LT Pro" panose="020B0504020202020204" pitchFamily="34" charset="77"/>
+              </a:rPr>
+              <a:t>Mass at the beginning of the active season</a:t>
+            </a:r>
+            <a:endParaRPr lang="en-CA" sz="2000" b="1" noProof="0" dirty="0">
+              <a:latin typeface="Avenir Next LT Pro" panose="020B0504020202020204" pitchFamily="34" charset="77"/>
+              <a:ea typeface="Cambria Math" panose="02040503050406030204" pitchFamily="18" charset="0"/>
+            </a:endParaRPr>
+          </a:p>
+        </p:txBody>
+      </p:sp>
+      <p:sp>
+        <p:nvSpPr>
+          <p:cNvPr id="36" name="Freeform 35">
+            <a:extLst>
+              <a:ext uri="{FF2B5EF4-FFF2-40B4-BE49-F238E27FC236}">
+                <a16:creationId xmlns:a16="http://schemas.microsoft.com/office/drawing/2014/main" id="{B4CD4072-EE35-1A5D-B137-1F76192F6F14}"/>
+              </a:ext>
+            </a:extLst>
+          </p:cNvPr>
+          <p:cNvSpPr/>
+          <p:nvPr/>
+        </p:nvSpPr>
+        <p:spPr>
+          <a:xfrm>
+            <a:off x="7412498" y="4059378"/>
+            <a:ext cx="530884" cy="805310"/>
+          </a:xfrm>
+          <a:custGeom>
+            <a:avLst/>
+            <a:gdLst>
+              <a:gd name="connsiteX0" fmla="*/ 70039 w 890654"/>
+              <a:gd name="connsiteY0" fmla="*/ 890954 h 890954"/>
+              <a:gd name="connsiteX1" fmla="*/ 81762 w 890654"/>
+              <a:gd name="connsiteY1" fmla="*/ 550985 h 890954"/>
+              <a:gd name="connsiteX2" fmla="*/ 890654 w 890654"/>
+              <a:gd name="connsiteY2" fmla="*/ 0 h 890954"/>
+            </a:gdLst>
+            <a:ahLst/>
+            <a:cxnLst>
+              <a:cxn ang="0">
+                <a:pos x="connsiteX0" y="connsiteY0"/>
+              </a:cxn>
+              <a:cxn ang="0">
+                <a:pos x="connsiteX1" y="connsiteY1"/>
+              </a:cxn>
+              <a:cxn ang="0">
+                <a:pos x="connsiteX2" y="connsiteY2"/>
+              </a:cxn>
+            </a:cxnLst>
+            <a:rect l="l" t="t" r="r" b="b"/>
+            <a:pathLst>
+              <a:path w="890654" h="890954">
+                <a:moveTo>
+                  <a:pt x="70039" y="890954"/>
+                </a:moveTo>
+                <a:cubicBezTo>
+                  <a:pt x="7516" y="795215"/>
+                  <a:pt x="-55007" y="699477"/>
+                  <a:pt x="81762" y="550985"/>
+                </a:cubicBezTo>
+                <a:cubicBezTo>
+                  <a:pt x="218531" y="402493"/>
+                  <a:pt x="554592" y="201246"/>
+                  <a:pt x="890654" y="0"/>
+                </a:cubicBezTo>
+              </a:path>
+            </a:pathLst>
+          </a:custGeom>
+          <a:noFill/>
+          <a:ln w="38100">
+            <a:solidFill>
+              <a:srgbClr val="7030A0"/>
+            </a:solidFill>
+            <a:prstDash val="dash"/>
+            <a:headEnd type="none" w="med" len="med"/>
+            <a:tailEnd type="triangle" w="med" len="med"/>
+          </a:ln>
+        </p:spPr>
+        <p:style>
+          <a:lnRef idx="2">
+            <a:schemeClr val="accent1">
+              <a:shade val="15000"/>
+            </a:schemeClr>
+          </a:lnRef>
+          <a:fillRef idx="1">
+            <a:schemeClr val="accent1"/>
+          </a:fillRef>
+          <a:effectRef idx="0">
+            <a:schemeClr val="accent1"/>
+          </a:effectRef>
+          <a:fontRef idx="minor">
+            <a:schemeClr val="lt1"/>
+          </a:fontRef>
+        </p:style>
+        <p:txBody>
+          <a:bodyPr rtlCol="0" anchor="ctr"/>
+          <a:lstStyle/>
+          <a:p>
+            <a:pPr algn="ctr"/>
+            <a:endParaRPr lang="en-CA" noProof="0" dirty="0"/>
+          </a:p>
+        </p:txBody>
+      </p:sp>
+      <p:sp>
+        <p:nvSpPr>
+          <p:cNvPr id="38" name="Freeform 37">
+            <a:extLst>
+              <a:ext uri="{FF2B5EF4-FFF2-40B4-BE49-F238E27FC236}">
+                <a16:creationId xmlns:a16="http://schemas.microsoft.com/office/drawing/2014/main" id="{FC6ECF0C-4D2F-C90A-38FB-62D0D3AD5356}"/>
+              </a:ext>
+            </a:extLst>
+          </p:cNvPr>
+          <p:cNvSpPr/>
+          <p:nvPr/>
+        </p:nvSpPr>
+        <p:spPr>
+          <a:xfrm>
+            <a:off x="8676785" y="4046954"/>
+            <a:ext cx="610988" cy="817734"/>
+          </a:xfrm>
+          <a:custGeom>
+            <a:avLst/>
+            <a:gdLst>
+              <a:gd name="connsiteX0" fmla="*/ 574430 w 750159"/>
+              <a:gd name="connsiteY0" fmla="*/ 879230 h 879230"/>
+              <a:gd name="connsiteX1" fmla="*/ 715107 w 750159"/>
+              <a:gd name="connsiteY1" fmla="*/ 621323 h 879230"/>
+              <a:gd name="connsiteX2" fmla="*/ 0 w 750159"/>
+              <a:gd name="connsiteY2" fmla="*/ 0 h 879230"/>
+            </a:gdLst>
+            <a:ahLst/>
+            <a:cxnLst>
+              <a:cxn ang="0">
+                <a:pos x="connsiteX0" y="connsiteY0"/>
+              </a:cxn>
+              <a:cxn ang="0">
+                <a:pos x="connsiteX1" y="connsiteY1"/>
+              </a:cxn>
+              <a:cxn ang="0">
+                <a:pos x="connsiteX2" y="connsiteY2"/>
+              </a:cxn>
+            </a:cxnLst>
+            <a:rect l="l" t="t" r="r" b="b"/>
+            <a:pathLst>
+              <a:path w="750159" h="879230">
+                <a:moveTo>
+                  <a:pt x="574430" y="879230"/>
+                </a:moveTo>
+                <a:cubicBezTo>
+                  <a:pt x="692637" y="823545"/>
+                  <a:pt x="810845" y="767861"/>
+                  <a:pt x="715107" y="621323"/>
+                </a:cubicBezTo>
+                <a:cubicBezTo>
+                  <a:pt x="619369" y="474785"/>
+                  <a:pt x="309684" y="237392"/>
+                  <a:pt x="0" y="0"/>
+                </a:cubicBezTo>
+              </a:path>
+            </a:pathLst>
+          </a:custGeom>
+          <a:noFill/>
+          <a:ln w="38100">
+            <a:solidFill>
+              <a:srgbClr val="7030A0"/>
+            </a:solidFill>
+            <a:prstDash val="dash"/>
+            <a:headEnd type="none" w="med" len="med"/>
+            <a:tailEnd type="triangle" w="med" len="med"/>
+          </a:ln>
+        </p:spPr>
+        <p:style>
+          <a:lnRef idx="2">
+            <a:schemeClr val="accent1">
+              <a:shade val="15000"/>
+            </a:schemeClr>
+          </a:lnRef>
+          <a:fillRef idx="1">
+            <a:schemeClr val="accent1"/>
+          </a:fillRef>
+          <a:effectRef idx="0">
+            <a:schemeClr val="accent1"/>
+          </a:effectRef>
+          <a:fontRef idx="minor">
+            <a:schemeClr val="lt1"/>
+          </a:fontRef>
+        </p:style>
+        <p:txBody>
+          <a:bodyPr rtlCol="0" anchor="ctr"/>
+          <a:lstStyle/>
+          <a:p>
+            <a:pPr algn="ctr"/>
+            <a:endParaRPr lang="en-CA" noProof="0" dirty="0"/>
+          </a:p>
+        </p:txBody>
+      </p:sp>
+      <p:sp>
+        <p:nvSpPr>
+          <p:cNvPr id="39" name="TextBox 38">
+            <a:extLst>
+              <a:ext uri="{FF2B5EF4-FFF2-40B4-BE49-F238E27FC236}">
+                <a16:creationId xmlns:a16="http://schemas.microsoft.com/office/drawing/2014/main" id="{6090D551-9EC0-8C97-B71A-BE1732506729}"/>
+              </a:ext>
+            </a:extLst>
+          </p:cNvPr>
+          <p:cNvSpPr txBox="1"/>
+          <p:nvPr/>
+        </p:nvSpPr>
+        <p:spPr>
+          <a:xfrm>
+            <a:off x="127043" y="4738746"/>
+            <a:ext cx="1776448" cy="584775"/>
+          </a:xfrm>
+          <a:prstGeom prst="rect">
+            <a:avLst/>
+          </a:prstGeom>
+          <a:noFill/>
+          <a:ln>
+            <a:solidFill>
+              <a:schemeClr val="accent6"/>
+            </a:solidFill>
+          </a:ln>
+        </p:spPr>
+        <p:txBody>
+          <a:bodyPr wrap="none" rtlCol="0">
+            <a:spAutoFit/>
+          </a:bodyPr>
+          <a:lstStyle/>
+          <a:p>
+            <a:r>
+              <a:rPr lang="en-CA" sz="3200" b="1" i="1" noProof="0" dirty="0">
+                <a:solidFill>
+                  <a:schemeClr val="accent6"/>
+                </a:solidFill>
+                <a:latin typeface="Avenir Next LT Pro" panose="020B0504020202020204" pitchFamily="34" charset="77"/>
+              </a:rPr>
+              <a:t>Triggers</a:t>
+            </a:r>
+          </a:p>
+        </p:txBody>
+      </p:sp>
+      <p:sp>
+        <p:nvSpPr>
+          <p:cNvPr id="40" name="TextBox 39">
+            <a:extLst>
+              <a:ext uri="{FF2B5EF4-FFF2-40B4-BE49-F238E27FC236}">
+                <a16:creationId xmlns:a16="http://schemas.microsoft.com/office/drawing/2014/main" id="{1F00257F-3DE4-A477-695B-37795F9D9E5B}"/>
+              </a:ext>
+            </a:extLst>
+          </p:cNvPr>
+          <p:cNvSpPr txBox="1"/>
+          <p:nvPr/>
+        </p:nvSpPr>
+        <p:spPr>
+          <a:xfrm>
+            <a:off x="4917066" y="4024745"/>
+            <a:ext cx="1975797" cy="584775"/>
+          </a:xfrm>
+          <a:prstGeom prst="rect">
+            <a:avLst/>
+          </a:prstGeom>
+          <a:noFill/>
+          <a:ln>
+            <a:solidFill>
+              <a:srgbClr val="7030A0"/>
+            </a:solidFill>
+          </a:ln>
+        </p:spPr>
+        <p:txBody>
+          <a:bodyPr wrap="none" rtlCol="0">
+            <a:spAutoFit/>
+          </a:bodyPr>
+          <a:lstStyle/>
+          <a:p>
+            <a:r>
+              <a:rPr lang="en-CA" sz="3200" b="1" i="1" noProof="0" dirty="0">
+                <a:solidFill>
+                  <a:srgbClr val="7030A0"/>
+                </a:solidFill>
+                <a:latin typeface="Avenir Next LT Pro" panose="020B0504020202020204" pitchFamily="34" charset="77"/>
+              </a:rPr>
+              <a:t>Structure</a:t>
+            </a:r>
+          </a:p>
+        </p:txBody>
+      </p:sp>
+      <p:sp>
+        <p:nvSpPr>
+          <p:cNvPr id="41" name="TextBox 40">
+            <a:extLst>
+              <a:ext uri="{FF2B5EF4-FFF2-40B4-BE49-F238E27FC236}">
+                <a16:creationId xmlns:a16="http://schemas.microsoft.com/office/drawing/2014/main" id="{E57E31AF-AE21-65EC-200F-C9E87EC5A8D1}"/>
+              </a:ext>
+            </a:extLst>
+          </p:cNvPr>
+          <p:cNvSpPr txBox="1"/>
+          <p:nvPr/>
+        </p:nvSpPr>
+        <p:spPr>
+          <a:xfrm>
+            <a:off x="9520517" y="2243946"/>
+            <a:ext cx="2605970" cy="584775"/>
+          </a:xfrm>
+          <a:prstGeom prst="rect">
+            <a:avLst/>
+          </a:prstGeom>
+          <a:noFill/>
+          <a:ln>
+            <a:solidFill>
+              <a:srgbClr val="FF0000"/>
+            </a:solidFill>
+          </a:ln>
+        </p:spPr>
+        <p:txBody>
+          <a:bodyPr wrap="none" rtlCol="0">
+            <a:spAutoFit/>
+          </a:bodyPr>
+          <a:lstStyle/>
+          <a:p>
+            <a:r>
+              <a:rPr lang="en-CA" sz="3200" b="1" i="1" noProof="0" dirty="0">
+                <a:solidFill>
+                  <a:srgbClr val="FF0000"/>
+                </a:solidFill>
+                <a:latin typeface="Avenir Next LT Pro" panose="020B0504020202020204" pitchFamily="34" charset="77"/>
+              </a:rPr>
+              <a:t>Implications</a:t>
+            </a:r>
+          </a:p>
+        </p:txBody>
+      </p:sp>
+      <p:sp>
+        <p:nvSpPr>
+          <p:cNvPr id="44" name="Rectangle : coins arrondis 13">
+            <a:extLst>
+              <a:ext uri="{FF2B5EF4-FFF2-40B4-BE49-F238E27FC236}">
+                <a16:creationId xmlns:a16="http://schemas.microsoft.com/office/drawing/2014/main" id="{98ED72BB-B7E8-FF4A-2CA5-9A8D9E7FA708}"/>
+              </a:ext>
+            </a:extLst>
+          </p:cNvPr>
+          <p:cNvSpPr>
+            <a:spLocks/>
+          </p:cNvSpPr>
+          <p:nvPr/>
+        </p:nvSpPr>
+        <p:spPr>
+          <a:xfrm>
+            <a:off x="8285450" y="4931943"/>
+            <a:ext cx="3024000" cy="748419"/>
+          </a:xfrm>
+          <a:prstGeom prst="roundRect">
+            <a:avLst/>
+          </a:prstGeom>
+          <a:solidFill>
+            <a:srgbClr val="7030A0">
+              <a:alpha val="50196"/>
+            </a:srgbClr>
+          </a:solidFill>
+          <a:ln>
+            <a:noFill/>
+          </a:ln>
+        </p:spPr>
+        <p:style>
+          <a:lnRef idx="2">
+            <a:schemeClr val="accent1">
+              <a:shade val="15000"/>
+            </a:schemeClr>
+          </a:lnRef>
+          <a:fillRef idx="1">
+            <a:schemeClr val="accent1"/>
+          </a:fillRef>
+          <a:effectRef idx="0">
+            <a:schemeClr val="accent1"/>
+          </a:effectRef>
+          <a:fontRef idx="minor">
+            <a:schemeClr val="lt1"/>
+          </a:fontRef>
+        </p:style>
+        <p:txBody>
+          <a:bodyPr rtlCol="0" anchor="ctr"/>
+          <a:lstStyle/>
+          <a:p>
+            <a:pPr algn="ctr"/>
+            <a:r>
+              <a:rPr lang="en-CA" sz="2000" b="1" noProof="0" dirty="0">
+                <a:latin typeface="Avenir Next LT Pro" panose="020B0504020202020204" pitchFamily="34" charset="77"/>
+              </a:rPr>
+              <a:t>Mass at the end of the active season</a:t>
+            </a:r>
+            <a:endParaRPr lang="en-CA" sz="2000" b="1" noProof="0" dirty="0">
+              <a:latin typeface="Avenir Next LT Pro" panose="020B0504020202020204" pitchFamily="34" charset="77"/>
+              <a:ea typeface="Cambria Math" panose="02040503050406030204" pitchFamily="18" charset="0"/>
+            </a:endParaRPr>
+          </a:p>
+        </p:txBody>
+      </p:sp>
+      <p:sp>
+        <p:nvSpPr>
+          <p:cNvPr id="2" name="Freeform 1">
+            <a:extLst>
+              <a:ext uri="{FF2B5EF4-FFF2-40B4-BE49-F238E27FC236}">
+                <a16:creationId xmlns:a16="http://schemas.microsoft.com/office/drawing/2014/main" id="{47E1132D-5DC5-E9E9-3024-D9B22C09AB9B}"/>
+              </a:ext>
+            </a:extLst>
+          </p:cNvPr>
+          <p:cNvSpPr/>
+          <p:nvPr/>
+        </p:nvSpPr>
+        <p:spPr>
+          <a:xfrm>
+            <a:off x="3863245" y="2487707"/>
+            <a:ext cx="574284" cy="842476"/>
+          </a:xfrm>
+          <a:custGeom>
+            <a:avLst/>
+            <a:gdLst>
+              <a:gd name="connsiteX0" fmla="*/ 9508 w 574284"/>
+              <a:gd name="connsiteY0" fmla="*/ 0 h 981635"/>
+              <a:gd name="connsiteX1" fmla="*/ 76743 w 574284"/>
+              <a:gd name="connsiteY1" fmla="*/ 806823 h 981635"/>
+              <a:gd name="connsiteX2" fmla="*/ 574284 w 574284"/>
+              <a:gd name="connsiteY2" fmla="*/ 981635 h 981635"/>
+            </a:gdLst>
+            <a:ahLst/>
+            <a:cxnLst>
+              <a:cxn ang="0">
+                <a:pos x="connsiteX0" y="connsiteY0"/>
+              </a:cxn>
+              <a:cxn ang="0">
+                <a:pos x="connsiteX1" y="connsiteY1"/>
+              </a:cxn>
+              <a:cxn ang="0">
+                <a:pos x="connsiteX2" y="connsiteY2"/>
+              </a:cxn>
+            </a:cxnLst>
+            <a:rect l="l" t="t" r="r" b="b"/>
+            <a:pathLst>
+              <a:path w="574284" h="981635">
+                <a:moveTo>
+                  <a:pt x="9508" y="0"/>
+                </a:moveTo>
+                <a:cubicBezTo>
+                  <a:pt x="-3939" y="321608"/>
+                  <a:pt x="-17386" y="643217"/>
+                  <a:pt x="76743" y="806823"/>
+                </a:cubicBezTo>
+                <a:cubicBezTo>
+                  <a:pt x="170872" y="970429"/>
+                  <a:pt x="372578" y="976032"/>
+                  <a:pt x="574284" y="981635"/>
+                </a:cubicBezTo>
+              </a:path>
+            </a:pathLst>
+          </a:custGeom>
+          <a:noFill/>
+          <a:ln w="38100">
+            <a:solidFill>
+              <a:schemeClr val="accent6"/>
+            </a:solidFill>
+            <a:headEnd type="none" w="med" len="med"/>
+            <a:tailEnd type="triangle" w="med" len="med"/>
+          </a:ln>
+        </p:spPr>
+        <p:style>
+          <a:lnRef idx="2">
+            <a:schemeClr val="accent1">
+              <a:shade val="15000"/>
+            </a:schemeClr>
+          </a:lnRef>
+          <a:fillRef idx="1">
+            <a:schemeClr val="accent1"/>
+          </a:fillRef>
+          <a:effectRef idx="0">
+            <a:schemeClr val="accent1"/>
+          </a:effectRef>
+          <a:fontRef idx="minor">
+            <a:schemeClr val="lt1"/>
+          </a:fontRef>
+        </p:style>
+        <p:txBody>
+          <a:bodyPr rtlCol="0" anchor="ctr"/>
+          <a:lstStyle/>
+          <a:p>
+            <a:pPr algn="ctr"/>
+            <a:endParaRPr lang="en-US"/>
+          </a:p>
+        </p:txBody>
+      </p:sp>
+      <p:sp>
+        <p:nvSpPr>
+          <p:cNvPr id="3" name="Freeform 2">
+            <a:extLst>
+              <a:ext uri="{FF2B5EF4-FFF2-40B4-BE49-F238E27FC236}">
+                <a16:creationId xmlns:a16="http://schemas.microsoft.com/office/drawing/2014/main" id="{64DDB657-8F51-F2CE-9E1E-481EC066C4D0}"/>
+              </a:ext>
+            </a:extLst>
+          </p:cNvPr>
+          <p:cNvSpPr/>
+          <p:nvPr/>
+        </p:nvSpPr>
+        <p:spPr>
+          <a:xfrm>
+            <a:off x="2411992" y="3663949"/>
+            <a:ext cx="1963270" cy="524435"/>
+          </a:xfrm>
+          <a:custGeom>
+            <a:avLst/>
+            <a:gdLst>
+              <a:gd name="connsiteX0" fmla="*/ 0 w 1963270"/>
+              <a:gd name="connsiteY0" fmla="*/ 524435 h 524435"/>
+              <a:gd name="connsiteX1" fmla="*/ 1223682 w 1963270"/>
+              <a:gd name="connsiteY1" fmla="*/ 309282 h 524435"/>
+              <a:gd name="connsiteX2" fmla="*/ 1963270 w 1963270"/>
+              <a:gd name="connsiteY2" fmla="*/ 0 h 524435"/>
+            </a:gdLst>
+            <a:ahLst/>
+            <a:cxnLst>
+              <a:cxn ang="0">
+                <a:pos x="connsiteX0" y="connsiteY0"/>
+              </a:cxn>
+              <a:cxn ang="0">
+                <a:pos x="connsiteX1" y="connsiteY1"/>
+              </a:cxn>
+              <a:cxn ang="0">
+                <a:pos x="connsiteX2" y="connsiteY2"/>
+              </a:cxn>
+            </a:cxnLst>
+            <a:rect l="l" t="t" r="r" b="b"/>
+            <a:pathLst>
+              <a:path w="1963270" h="524435">
+                <a:moveTo>
+                  <a:pt x="0" y="524435"/>
+                </a:moveTo>
+                <a:cubicBezTo>
+                  <a:pt x="448235" y="460561"/>
+                  <a:pt x="896470" y="396688"/>
+                  <a:pt x="1223682" y="309282"/>
+                </a:cubicBezTo>
+                <a:cubicBezTo>
+                  <a:pt x="1550894" y="221876"/>
+                  <a:pt x="1757082" y="110938"/>
+                  <a:pt x="1963270" y="0"/>
+                </a:cubicBezTo>
+              </a:path>
+            </a:pathLst>
+          </a:custGeom>
+          <a:noFill/>
+          <a:ln w="38100">
+            <a:solidFill>
+              <a:schemeClr val="accent6"/>
+            </a:solidFill>
+            <a:headEnd type="none" w="med" len="med"/>
+            <a:tailEnd type="triangle" w="med" len="med"/>
+          </a:ln>
+        </p:spPr>
+        <p:style>
+          <a:lnRef idx="2">
+            <a:schemeClr val="accent1">
+              <a:shade val="15000"/>
+            </a:schemeClr>
+          </a:lnRef>
+          <a:fillRef idx="1">
+            <a:schemeClr val="accent1"/>
+          </a:fillRef>
+          <a:effectRef idx="0">
+            <a:schemeClr val="accent1"/>
+          </a:effectRef>
+          <a:fontRef idx="minor">
+            <a:schemeClr val="lt1"/>
+          </a:fontRef>
+        </p:style>
+        <p:txBody>
+          <a:bodyPr rtlCol="0" anchor="ctr"/>
+          <a:lstStyle/>
+          <a:p>
+            <a:pPr algn="ctr"/>
+            <a:endParaRPr lang="en-US"/>
+          </a:p>
+        </p:txBody>
+      </p:sp>
+      <p:sp>
+        <p:nvSpPr>
+          <p:cNvPr id="11" name="Rectangle : coins arrondis 13">
+            <a:extLst>
+              <a:ext uri="{FF2B5EF4-FFF2-40B4-BE49-F238E27FC236}">
+                <a16:creationId xmlns:a16="http://schemas.microsoft.com/office/drawing/2014/main" id="{7F105EE8-E59F-BCA8-568D-DED01EDE6712}"/>
+              </a:ext>
+            </a:extLst>
+          </p:cNvPr>
+          <p:cNvSpPr>
+            <a:spLocks/>
+          </p:cNvSpPr>
+          <p:nvPr/>
+        </p:nvSpPr>
+        <p:spPr>
+          <a:xfrm>
+            <a:off x="4343394" y="6087134"/>
+            <a:ext cx="1476000" cy="508412"/>
+          </a:xfrm>
+          <a:prstGeom prst="roundRect">
+            <a:avLst/>
+          </a:prstGeom>
+          <a:solidFill>
+            <a:srgbClr val="7030A0">
+              <a:alpha val="50196"/>
+            </a:srgbClr>
+          </a:solidFill>
+          <a:ln>
+            <a:solidFill>
+              <a:schemeClr val="accent5"/>
+            </a:solidFill>
+          </a:ln>
+        </p:spPr>
+        <p:style>
+          <a:lnRef idx="2">
+            <a:schemeClr val="accent1">
+              <a:shade val="15000"/>
+            </a:schemeClr>
+          </a:lnRef>
+          <a:fillRef idx="1">
+            <a:schemeClr val="accent1"/>
+          </a:fillRef>
+          <a:effectRef idx="0">
+            <a:schemeClr val="accent1"/>
+          </a:effectRef>
+          <a:fontRef idx="minor">
+            <a:schemeClr val="lt1"/>
+          </a:fontRef>
+        </p:style>
+        <p:txBody>
+          <a:bodyPr rtlCol="0" anchor="ctr"/>
+          <a:lstStyle/>
+          <a:p>
+            <a:pPr algn="ctr"/>
+            <a:r>
+              <a:rPr lang="en-CA" sz="2000" b="1" noProof="0" dirty="0">
+                <a:latin typeface="Avenir Next LT Pro" panose="020B0504020202020204" pitchFamily="34" charset="77"/>
+              </a:rPr>
+              <a:t>Juveniles</a:t>
+            </a:r>
+            <a:endParaRPr lang="en-CA" sz="2000" b="1" noProof="0" dirty="0">
+              <a:latin typeface="Avenir Next LT Pro" panose="020B0504020202020204" pitchFamily="34" charset="77"/>
+              <a:ea typeface="Cambria Math" panose="02040503050406030204" pitchFamily="18" charset="0"/>
+            </a:endParaRPr>
+          </a:p>
+        </p:txBody>
+      </p:sp>
+      <p:sp>
+        <p:nvSpPr>
+          <p:cNvPr id="13" name="Rectangle : coins arrondis 13">
+            <a:extLst>
+              <a:ext uri="{FF2B5EF4-FFF2-40B4-BE49-F238E27FC236}">
+                <a16:creationId xmlns:a16="http://schemas.microsoft.com/office/drawing/2014/main" id="{9DA328FA-7600-7169-4D05-E43E1790F3E3}"/>
+              </a:ext>
+            </a:extLst>
+          </p:cNvPr>
+          <p:cNvSpPr>
+            <a:spLocks/>
+          </p:cNvSpPr>
+          <p:nvPr/>
+        </p:nvSpPr>
+        <p:spPr>
+          <a:xfrm>
+            <a:off x="6268170" y="6276781"/>
+            <a:ext cx="1476000" cy="508412"/>
+          </a:xfrm>
+          <a:prstGeom prst="roundRect">
+            <a:avLst/>
+          </a:prstGeom>
+          <a:solidFill>
+            <a:srgbClr val="7030A0">
+              <a:alpha val="50196"/>
+            </a:srgbClr>
+          </a:solidFill>
+          <a:ln>
+            <a:solidFill>
+              <a:schemeClr val="accent5"/>
+            </a:solidFill>
+          </a:ln>
+        </p:spPr>
+        <p:style>
+          <a:lnRef idx="2">
+            <a:schemeClr val="accent1">
+              <a:shade val="15000"/>
+            </a:schemeClr>
+          </a:lnRef>
+          <a:fillRef idx="1">
+            <a:schemeClr val="accent1"/>
+          </a:fillRef>
+          <a:effectRef idx="0">
+            <a:schemeClr val="accent1"/>
+          </a:effectRef>
+          <a:fontRef idx="minor">
+            <a:schemeClr val="lt1"/>
+          </a:fontRef>
+        </p:style>
+        <p:txBody>
+          <a:bodyPr rtlCol="0" anchor="ctr"/>
+          <a:lstStyle/>
+          <a:p>
+            <a:pPr algn="ctr"/>
+            <a:r>
+              <a:rPr lang="en-CA" sz="2000" b="1" noProof="0" dirty="0">
+                <a:latin typeface="Avenir Next LT Pro" panose="020B0504020202020204" pitchFamily="34" charset="77"/>
+              </a:rPr>
+              <a:t>Yearlings</a:t>
+            </a:r>
+            <a:endParaRPr lang="en-CA" sz="2000" b="1" noProof="0" dirty="0">
+              <a:latin typeface="Avenir Next LT Pro" panose="020B0504020202020204" pitchFamily="34" charset="77"/>
+              <a:ea typeface="Cambria Math" panose="02040503050406030204" pitchFamily="18" charset="0"/>
+            </a:endParaRPr>
+          </a:p>
+        </p:txBody>
+      </p:sp>
+      <p:sp>
+        <p:nvSpPr>
+          <p:cNvPr id="14" name="Rectangle : coins arrondis 13">
+            <a:extLst>
+              <a:ext uri="{FF2B5EF4-FFF2-40B4-BE49-F238E27FC236}">
+                <a16:creationId xmlns:a16="http://schemas.microsoft.com/office/drawing/2014/main" id="{1C38642C-BB9F-39E6-6FE2-216FC6502C9F}"/>
+              </a:ext>
+            </a:extLst>
+          </p:cNvPr>
+          <p:cNvSpPr>
+            <a:spLocks/>
+          </p:cNvSpPr>
+          <p:nvPr/>
+        </p:nvSpPr>
+        <p:spPr>
+          <a:xfrm>
+            <a:off x="8192947" y="6276781"/>
+            <a:ext cx="1476000" cy="508412"/>
+          </a:xfrm>
+          <a:prstGeom prst="roundRect">
+            <a:avLst/>
+          </a:prstGeom>
+          <a:solidFill>
+            <a:srgbClr val="7030A0">
+              <a:alpha val="50196"/>
+            </a:srgbClr>
+          </a:solidFill>
+          <a:ln>
+            <a:solidFill>
+              <a:schemeClr val="accent5"/>
+            </a:solidFill>
+          </a:ln>
+        </p:spPr>
+        <p:style>
+          <a:lnRef idx="2">
+            <a:schemeClr val="accent1">
+              <a:shade val="15000"/>
+            </a:schemeClr>
+          </a:lnRef>
+          <a:fillRef idx="1">
+            <a:schemeClr val="accent1"/>
+          </a:fillRef>
+          <a:effectRef idx="0">
+            <a:schemeClr val="accent1"/>
+          </a:effectRef>
+          <a:fontRef idx="minor">
+            <a:schemeClr val="lt1"/>
+          </a:fontRef>
+        </p:style>
+        <p:txBody>
+          <a:bodyPr rtlCol="0" anchor="ctr"/>
+          <a:lstStyle/>
+          <a:p>
+            <a:pPr algn="ctr"/>
+            <a:r>
+              <a:rPr lang="en-CA" sz="2000" b="1" noProof="0" dirty="0">
+                <a:latin typeface="Avenir Next LT Pro" panose="020B0504020202020204" pitchFamily="34" charset="77"/>
+              </a:rPr>
+              <a:t>Subadults</a:t>
+            </a:r>
+            <a:endParaRPr lang="en-CA" sz="2000" b="1" noProof="0" dirty="0">
+              <a:latin typeface="Avenir Next LT Pro" panose="020B0504020202020204" pitchFamily="34" charset="77"/>
+              <a:ea typeface="Cambria Math" panose="02040503050406030204" pitchFamily="18" charset="0"/>
+            </a:endParaRPr>
+          </a:p>
+        </p:txBody>
+      </p:sp>
+      <p:sp>
+        <p:nvSpPr>
+          <p:cNvPr id="34" name="Rectangle : coins arrondis 13">
+            <a:extLst>
+              <a:ext uri="{FF2B5EF4-FFF2-40B4-BE49-F238E27FC236}">
+                <a16:creationId xmlns:a16="http://schemas.microsoft.com/office/drawing/2014/main" id="{63D91593-89CC-5879-AE1F-83E7147ADCDB}"/>
+              </a:ext>
+            </a:extLst>
+          </p:cNvPr>
+          <p:cNvSpPr>
+            <a:spLocks/>
+          </p:cNvSpPr>
+          <p:nvPr/>
+        </p:nvSpPr>
+        <p:spPr>
+          <a:xfrm>
+            <a:off x="10117724" y="6087134"/>
+            <a:ext cx="1476000" cy="508412"/>
+          </a:xfrm>
+          <a:prstGeom prst="roundRect">
+            <a:avLst/>
+          </a:prstGeom>
+          <a:solidFill>
+            <a:srgbClr val="7030A0">
+              <a:alpha val="50196"/>
+            </a:srgbClr>
+          </a:solidFill>
+          <a:ln>
+            <a:solidFill>
+              <a:schemeClr val="accent5"/>
+            </a:solidFill>
+          </a:ln>
+        </p:spPr>
+        <p:style>
+          <a:lnRef idx="2">
+            <a:schemeClr val="accent1">
+              <a:shade val="15000"/>
+            </a:schemeClr>
+          </a:lnRef>
+          <a:fillRef idx="1">
+            <a:schemeClr val="accent1"/>
+          </a:fillRef>
+          <a:effectRef idx="0">
+            <a:schemeClr val="accent1"/>
+          </a:effectRef>
+          <a:fontRef idx="minor">
+            <a:schemeClr val="lt1"/>
+          </a:fontRef>
+        </p:style>
+        <p:txBody>
+          <a:bodyPr rtlCol="0" anchor="ctr"/>
+          <a:lstStyle/>
+          <a:p>
+            <a:pPr algn="ctr"/>
+            <a:r>
+              <a:rPr lang="en-CA" sz="2000" b="1" noProof="0" dirty="0">
+                <a:latin typeface="Avenir Next LT Pro" panose="020B0504020202020204" pitchFamily="34" charset="77"/>
+              </a:rPr>
+              <a:t>Adults</a:t>
+            </a:r>
+            <a:endParaRPr lang="en-CA" sz="2000" b="1" noProof="0" dirty="0">
+              <a:latin typeface="Avenir Next LT Pro" panose="020B0504020202020204" pitchFamily="34" charset="77"/>
+              <a:ea typeface="Cambria Math" panose="02040503050406030204" pitchFamily="18" charset="0"/>
+            </a:endParaRPr>
+          </a:p>
+        </p:txBody>
+      </p:sp>
+      <p:cxnSp>
+        <p:nvCxnSpPr>
+          <p:cNvPr id="37" name="Straight Arrow Connector 36">
+            <a:extLst>
+              <a:ext uri="{FF2B5EF4-FFF2-40B4-BE49-F238E27FC236}">
+                <a16:creationId xmlns:a16="http://schemas.microsoft.com/office/drawing/2014/main" id="{4F8145E6-58F4-63DF-3051-5D7E5F8F7BFD}"/>
+              </a:ext>
+            </a:extLst>
+          </p:cNvPr>
+          <p:cNvCxnSpPr>
+            <a:cxnSpLocks/>
+            <a:stCxn id="11" idx="0"/>
+            <a:endCxn id="9" idx="2"/>
+          </p:cNvCxnSpPr>
+          <p:nvPr/>
+        </p:nvCxnSpPr>
+        <p:spPr>
+          <a:xfrm flipV="1">
+            <a:off x="5081394" y="5732369"/>
+            <a:ext cx="3173723" cy="354765"/>
+          </a:xfrm>
+          <a:prstGeom prst="straightConnector1">
+            <a:avLst/>
+          </a:prstGeom>
+          <a:ln w="38100">
+            <a:solidFill>
+              <a:schemeClr val="accent5"/>
+            </a:solidFill>
+            <a:tailEnd type="triangle"/>
+          </a:ln>
+        </p:spPr>
+        <p:style>
+          <a:lnRef idx="2">
+            <a:schemeClr val="accent1"/>
+          </a:lnRef>
+          <a:fillRef idx="0">
+            <a:schemeClr val="accent1"/>
+          </a:fillRef>
+          <a:effectRef idx="1">
+            <a:schemeClr val="accent1"/>
+          </a:effectRef>
+          <a:fontRef idx="minor">
+            <a:schemeClr val="tx1"/>
+          </a:fontRef>
+        </p:style>
+      </p:cxnSp>
+      <p:cxnSp>
+        <p:nvCxnSpPr>
+          <p:cNvPr id="43" name="Straight Arrow Connector 42">
+            <a:extLst>
+              <a:ext uri="{FF2B5EF4-FFF2-40B4-BE49-F238E27FC236}">
+                <a16:creationId xmlns:a16="http://schemas.microsoft.com/office/drawing/2014/main" id="{0F690EA5-5A93-B2CA-D547-AD98FDBF1179}"/>
+              </a:ext>
+            </a:extLst>
+          </p:cNvPr>
+          <p:cNvCxnSpPr>
+            <a:cxnSpLocks/>
+            <a:stCxn id="13" idx="0"/>
+            <a:endCxn id="9" idx="2"/>
+          </p:cNvCxnSpPr>
+          <p:nvPr/>
+        </p:nvCxnSpPr>
+        <p:spPr>
+          <a:xfrm flipV="1">
+            <a:off x="7006170" y="5732369"/>
+            <a:ext cx="1248947" cy="544412"/>
+          </a:xfrm>
+          <a:prstGeom prst="straightConnector1">
+            <a:avLst/>
+          </a:prstGeom>
+          <a:ln w="38100">
+            <a:solidFill>
+              <a:schemeClr val="accent5"/>
+            </a:solidFill>
+            <a:tailEnd type="triangle"/>
+          </a:ln>
+        </p:spPr>
+        <p:style>
+          <a:lnRef idx="2">
+            <a:schemeClr val="accent1"/>
+          </a:lnRef>
+          <a:fillRef idx="0">
+            <a:schemeClr val="accent1"/>
+          </a:fillRef>
+          <a:effectRef idx="1">
+            <a:schemeClr val="accent1"/>
+          </a:effectRef>
+          <a:fontRef idx="minor">
+            <a:schemeClr val="tx1"/>
+          </a:fontRef>
+        </p:style>
+      </p:cxnSp>
+      <p:cxnSp>
+        <p:nvCxnSpPr>
+          <p:cNvPr id="47" name="Straight Arrow Connector 46">
+            <a:extLst>
+              <a:ext uri="{FF2B5EF4-FFF2-40B4-BE49-F238E27FC236}">
+                <a16:creationId xmlns:a16="http://schemas.microsoft.com/office/drawing/2014/main" id="{7B91819E-5D53-93B1-9309-C47B3D121891}"/>
+              </a:ext>
+            </a:extLst>
+          </p:cNvPr>
+          <p:cNvCxnSpPr>
+            <a:cxnSpLocks/>
+            <a:stCxn id="14" idx="0"/>
+            <a:endCxn id="9" idx="2"/>
+          </p:cNvCxnSpPr>
+          <p:nvPr/>
+        </p:nvCxnSpPr>
+        <p:spPr>
+          <a:xfrm flipH="1" flipV="1">
+            <a:off x="8255117" y="5732369"/>
+            <a:ext cx="675830" cy="544412"/>
+          </a:xfrm>
+          <a:prstGeom prst="straightConnector1">
+            <a:avLst/>
+          </a:prstGeom>
+          <a:ln w="38100">
+            <a:solidFill>
+              <a:schemeClr val="accent5"/>
+            </a:solidFill>
+            <a:tailEnd type="triangle"/>
+          </a:ln>
+        </p:spPr>
+        <p:style>
+          <a:lnRef idx="2">
+            <a:schemeClr val="accent1"/>
+          </a:lnRef>
+          <a:fillRef idx="0">
+            <a:schemeClr val="accent1"/>
+          </a:fillRef>
+          <a:effectRef idx="1">
+            <a:schemeClr val="accent1"/>
+          </a:effectRef>
+          <a:fontRef idx="minor">
+            <a:schemeClr val="tx1"/>
+          </a:fontRef>
+        </p:style>
+      </p:cxnSp>
+      <p:cxnSp>
+        <p:nvCxnSpPr>
+          <p:cNvPr id="50" name="Straight Arrow Connector 49">
+            <a:extLst>
+              <a:ext uri="{FF2B5EF4-FFF2-40B4-BE49-F238E27FC236}">
+                <a16:creationId xmlns:a16="http://schemas.microsoft.com/office/drawing/2014/main" id="{0D3EEDA5-63DF-5C86-CAF8-6083AB114280}"/>
+              </a:ext>
+            </a:extLst>
+          </p:cNvPr>
+          <p:cNvCxnSpPr>
+            <a:cxnSpLocks/>
+            <a:stCxn id="34" idx="0"/>
+            <a:endCxn id="9" idx="2"/>
+          </p:cNvCxnSpPr>
+          <p:nvPr/>
+        </p:nvCxnSpPr>
+        <p:spPr>
+          <a:xfrm flipH="1" flipV="1">
+            <a:off x="8255117" y="5732369"/>
+            <a:ext cx="2600607" cy="354765"/>
+          </a:xfrm>
+          <a:prstGeom prst="straightConnector1">
+            <a:avLst/>
+          </a:prstGeom>
+          <a:ln w="38100">
+            <a:solidFill>
+              <a:schemeClr val="accent5"/>
+            </a:solidFill>
+            <a:tailEnd type="triangle"/>
+          </a:ln>
+        </p:spPr>
+        <p:style>
+          <a:lnRef idx="2">
+            <a:schemeClr val="accent1"/>
+          </a:lnRef>
+          <a:fillRef idx="0">
+            <a:schemeClr val="accent1"/>
+          </a:fillRef>
+          <a:effectRef idx="1">
+            <a:schemeClr val="accent1"/>
+          </a:effectRef>
+          <a:fontRef idx="minor">
+            <a:schemeClr val="tx1"/>
+          </a:fontRef>
+        </p:style>
+      </p:cxnSp>
+    </p:spTree>
+    <p:extLst>
+      <p:ext uri="{BB962C8B-B14F-4D97-AF65-F5344CB8AC3E}">
+        <p14:creationId xmlns:p14="http://schemas.microsoft.com/office/powerpoint/2010/main" val="2354053169"/>
+      </p:ext>
+    </p:extLst>
+  </p:cSld>
+  <p:clrMapOvr>
+    <a:masterClrMapping/>
+  </p:clrMapOvr>
+</p:sld>
+</file>
+
+<file path=ppt/slides/slide3.xml><?xml version="1.0" encoding="utf-8"?>
+<p:sld xmlns:a="http://schemas.openxmlformats.org/drawingml/2006/main" xmlns:r="http://schemas.openxmlformats.org/officeDocument/2006/relationships" xmlns:p="http://schemas.openxmlformats.org/presentationml/2006/main">
+  <p:cSld>
+    <p:spTree>
+      <p:nvGrpSpPr>
         <p:cNvPr id="1" name=""/>
         <p:cNvGrpSpPr/>
         <p:nvPr/>

</xml_diff>

<commit_message>
remake - chapter 1
</commit_message>
<xml_diff>
--- a/figures/illustrations.pptx
+++ b/figures/illustrations.pptx
@@ -7,7 +7,8 @@
   <p:sldIdLst>
     <p:sldId id="257" r:id="rId2"/>
     <p:sldId id="258" r:id="rId3"/>
-    <p:sldId id="256" r:id="rId4"/>
+    <p:sldId id="259" r:id="rId4"/>
+    <p:sldId id="256" r:id="rId5"/>
   </p:sldIdLst>
   <p:sldSz cx="12192000" cy="6858000"/>
   <p:notesSz cx="6858000" cy="9144000"/>
@@ -261,7 +262,7 @@
           <a:p>
             <a:fld id="{E0E97E3A-7EAE-AE47-B84C-E0DE5DFF029A}" type="datetimeFigureOut">
               <a:rPr lang="en-US" smtClean="0"/>
-              <a:t>2/24/25</a:t>
+              <a:t>3/5/25</a:t>
             </a:fld>
             <a:endParaRPr lang="en-US"/>
           </a:p>
@@ -459,7 +460,7 @@
           <a:p>
             <a:fld id="{E0E97E3A-7EAE-AE47-B84C-E0DE5DFF029A}" type="datetimeFigureOut">
               <a:rPr lang="en-US" smtClean="0"/>
-              <a:t>2/24/25</a:t>
+              <a:t>3/5/25</a:t>
             </a:fld>
             <a:endParaRPr lang="en-US"/>
           </a:p>
@@ -667,7 +668,7 @@
           <a:p>
             <a:fld id="{E0E97E3A-7EAE-AE47-B84C-E0DE5DFF029A}" type="datetimeFigureOut">
               <a:rPr lang="en-US" smtClean="0"/>
-              <a:t>2/24/25</a:t>
+              <a:t>3/5/25</a:t>
             </a:fld>
             <a:endParaRPr lang="en-US"/>
           </a:p>
@@ -865,7 +866,7 @@
           <a:p>
             <a:fld id="{E0E97E3A-7EAE-AE47-B84C-E0DE5DFF029A}" type="datetimeFigureOut">
               <a:rPr lang="en-US" smtClean="0"/>
-              <a:t>2/24/25</a:t>
+              <a:t>3/5/25</a:t>
             </a:fld>
             <a:endParaRPr lang="en-US"/>
           </a:p>
@@ -1140,7 +1141,7 @@
           <a:p>
             <a:fld id="{E0E97E3A-7EAE-AE47-B84C-E0DE5DFF029A}" type="datetimeFigureOut">
               <a:rPr lang="en-US" smtClean="0"/>
-              <a:t>2/24/25</a:t>
+              <a:t>3/5/25</a:t>
             </a:fld>
             <a:endParaRPr lang="en-US"/>
           </a:p>
@@ -1405,7 +1406,7 @@
           <a:p>
             <a:fld id="{E0E97E3A-7EAE-AE47-B84C-E0DE5DFF029A}" type="datetimeFigureOut">
               <a:rPr lang="en-US" smtClean="0"/>
-              <a:t>2/24/25</a:t>
+              <a:t>3/5/25</a:t>
             </a:fld>
             <a:endParaRPr lang="en-US"/>
           </a:p>
@@ -1817,7 +1818,7 @@
           <a:p>
             <a:fld id="{E0E97E3A-7EAE-AE47-B84C-E0DE5DFF029A}" type="datetimeFigureOut">
               <a:rPr lang="en-US" smtClean="0"/>
-              <a:t>2/24/25</a:t>
+              <a:t>3/5/25</a:t>
             </a:fld>
             <a:endParaRPr lang="en-US"/>
           </a:p>
@@ -1958,7 +1959,7 @@
           <a:p>
             <a:fld id="{E0E97E3A-7EAE-AE47-B84C-E0DE5DFF029A}" type="datetimeFigureOut">
               <a:rPr lang="en-US" smtClean="0"/>
-              <a:t>2/24/25</a:t>
+              <a:t>3/5/25</a:t>
             </a:fld>
             <a:endParaRPr lang="en-US"/>
           </a:p>
@@ -2071,7 +2072,7 @@
           <a:p>
             <a:fld id="{E0E97E3A-7EAE-AE47-B84C-E0DE5DFF029A}" type="datetimeFigureOut">
               <a:rPr lang="en-US" smtClean="0"/>
-              <a:t>2/24/25</a:t>
+              <a:t>3/5/25</a:t>
             </a:fld>
             <a:endParaRPr lang="en-US"/>
           </a:p>
@@ -2382,7 +2383,7 @@
           <a:p>
             <a:fld id="{E0E97E3A-7EAE-AE47-B84C-E0DE5DFF029A}" type="datetimeFigureOut">
               <a:rPr lang="en-US" smtClean="0"/>
-              <a:t>2/24/25</a:t>
+              <a:t>3/5/25</a:t>
             </a:fld>
             <a:endParaRPr lang="en-US"/>
           </a:p>
@@ -2670,7 +2671,7 @@
           <a:p>
             <a:fld id="{E0E97E3A-7EAE-AE47-B84C-E0DE5DFF029A}" type="datetimeFigureOut">
               <a:rPr lang="en-US" smtClean="0"/>
-              <a:t>2/24/25</a:t>
+              <a:t>3/5/25</a:t>
             </a:fld>
             <a:endParaRPr lang="en-US"/>
           </a:p>
@@ -2911,7 +2912,7 @@
           <a:p>
             <a:fld id="{E0E97E3A-7EAE-AE47-B84C-E0DE5DFF029A}" type="datetimeFigureOut">
               <a:rPr lang="en-US" smtClean="0"/>
-              <a:t>2/24/25</a:t>
+              <a:t>3/5/25</a:t>
             </a:fld>
             <a:endParaRPr lang="en-US"/>
           </a:p>
@@ -5741,8 +5742,8 @@
           </a:p>
         </p:txBody>
       </p:sp>
-      <mc:AlternateContent xmlns:mc="http://schemas.openxmlformats.org/markup-compatibility/2006">
-        <mc:Choice xmlns:a14="http://schemas.microsoft.com/office/drawing/2010/main" Requires="a14">
+      <mc:AlternateContent xmlns:mc="http://schemas.openxmlformats.org/markup-compatibility/2006" xmlns:a14="http://schemas.microsoft.com/office/drawing/2010/main">
+        <mc:Choice Requires="a14">
           <p:sp>
             <p:nvSpPr>
               <p:cNvPr id="15" name="Rectangle : coins arrondis 4">
@@ -5815,7 +5816,7 @@
             </p:txBody>
           </p:sp>
         </mc:Choice>
-        <mc:Fallback>
+        <mc:Fallback xmlns="">
           <p:sp>
             <p:nvSpPr>
               <p:cNvPr id="15" name="Rectangle : coins arrondis 4">
@@ -8476,6 +8477,3162 @@
 </file>
 
 <file path=ppt/slides/slide3.xml><?xml version="1.0" encoding="utf-8"?>
+<p:sld xmlns:a="http://schemas.openxmlformats.org/drawingml/2006/main" xmlns:r="http://schemas.openxmlformats.org/officeDocument/2006/relationships" xmlns:p="http://schemas.openxmlformats.org/presentationml/2006/main">
+  <p:cSld>
+    <p:spTree>
+      <p:nvGrpSpPr>
+        <p:cNvPr id="1" name="">
+          <a:extLst>
+            <a:ext uri="{FF2B5EF4-FFF2-40B4-BE49-F238E27FC236}">
+              <a16:creationId xmlns:a16="http://schemas.microsoft.com/office/drawing/2014/main" id="{BAC24FB3-EEA8-FA40-7BC9-81774761E1A0}"/>
+            </a:ext>
+          </a:extLst>
+        </p:cNvPr>
+        <p:cNvGrpSpPr/>
+        <p:nvPr/>
+      </p:nvGrpSpPr>
+      <p:grpSpPr>
+        <a:xfrm>
+          <a:off x="0" y="0"/>
+          <a:ext cx="0" cy="0"/>
+          <a:chOff x="0" y="0"/>
+          <a:chExt cx="0" cy="0"/>
+        </a:xfrm>
+      </p:grpSpPr>
+      <p:sp>
+        <p:nvSpPr>
+          <p:cNvPr id="9" name="Rounded Rectangle 8">
+            <a:extLst>
+              <a:ext uri="{FF2B5EF4-FFF2-40B4-BE49-F238E27FC236}">
+                <a16:creationId xmlns:a16="http://schemas.microsoft.com/office/drawing/2014/main" id="{C197826C-9AE5-CE2C-4D1D-34C39A4BB486}"/>
+              </a:ext>
+            </a:extLst>
+          </p:cNvPr>
+          <p:cNvSpPr/>
+          <p:nvPr/>
+        </p:nvSpPr>
+        <p:spPr>
+          <a:xfrm>
+            <a:off x="3980334" y="4904369"/>
+            <a:ext cx="6156000" cy="828000"/>
+          </a:xfrm>
+          <a:prstGeom prst="roundRect">
+            <a:avLst/>
+          </a:prstGeom>
+          <a:solidFill>
+            <a:srgbClr val="7030A0">
+              <a:alpha val="9804"/>
+            </a:srgbClr>
+          </a:solidFill>
+          <a:ln>
+            <a:solidFill>
+              <a:schemeClr val="accent5"/>
+            </a:solidFill>
+          </a:ln>
+        </p:spPr>
+        <p:style>
+          <a:lnRef idx="2">
+            <a:schemeClr val="accent1">
+              <a:shade val="15000"/>
+            </a:schemeClr>
+          </a:lnRef>
+          <a:fillRef idx="1">
+            <a:schemeClr val="accent1"/>
+          </a:fillRef>
+          <a:effectRef idx="0">
+            <a:schemeClr val="accent1"/>
+          </a:effectRef>
+          <a:fontRef idx="minor">
+            <a:schemeClr val="lt1"/>
+          </a:fontRef>
+        </p:style>
+        <p:txBody>
+          <a:bodyPr rtlCol="0" anchor="ctr"/>
+          <a:lstStyle/>
+          <a:p>
+            <a:pPr algn="ctr"/>
+            <a:endParaRPr lang="en-US"/>
+          </a:p>
+        </p:txBody>
+      </p:sp>
+      <mc:AlternateContent xmlns:mc="http://schemas.openxmlformats.org/markup-compatibility/2006">
+        <mc:Choice xmlns:a14="http://schemas.microsoft.com/office/drawing/2010/main" Requires="a14">
+          <p:sp>
+            <p:nvSpPr>
+              <p:cNvPr id="15" name="Rectangle : coins arrondis 4">
+                <a:extLst>
+                  <a:ext uri="{FF2B5EF4-FFF2-40B4-BE49-F238E27FC236}">
+                    <a16:creationId xmlns:a16="http://schemas.microsoft.com/office/drawing/2014/main" id="{E4B22F4B-9401-54CE-7096-4C928B0F1084}"/>
+                  </a:ext>
+                </a:extLst>
+              </p:cNvPr>
+              <p:cNvSpPr>
+                <a:spLocks noChangeAspect="1"/>
+              </p:cNvSpPr>
+              <p:nvPr/>
+            </p:nvSpPr>
+            <p:spPr>
+              <a:xfrm>
+                <a:off x="5820341" y="3449276"/>
+                <a:ext cx="2463817" cy="617387"/>
+              </a:xfrm>
+              <a:prstGeom prst="roundRect">
+                <a:avLst/>
+              </a:prstGeom>
+              <a:solidFill>
+                <a:schemeClr val="accent1">
+                  <a:alpha val="50196"/>
+                </a:schemeClr>
+              </a:solidFill>
+              <a:ln w="38100"/>
+            </p:spPr>
+            <p:style>
+              <a:lnRef idx="2">
+                <a:schemeClr val="accent1">
+                  <a:shade val="15000"/>
+                </a:schemeClr>
+              </a:lnRef>
+              <a:fillRef idx="1">
+                <a:schemeClr val="accent1"/>
+              </a:fillRef>
+              <a:effectRef idx="0">
+                <a:schemeClr val="accent1"/>
+              </a:effectRef>
+              <a:fontRef idx="minor">
+                <a:schemeClr val="lt1"/>
+              </a:fontRef>
+            </p:style>
+            <p:txBody>
+              <a:bodyPr rtlCol="0" anchor="ctr"/>
+              <a:lstStyle/>
+              <a:p>
+                <a:pPr algn="ctr"/>
+                <a:r>
+                  <a:rPr lang="en-CA" sz="2800" b="1" noProof="0" dirty="0">
+                    <a:latin typeface="Avenir Next LT Pro" panose="020B0504020202020204" pitchFamily="34" charset="77"/>
+                  </a:rPr>
+                  <a:t>Body mass </a:t>
+                </a:r>
+                <a14:m>
+                  <m:oMath xmlns:m="http://schemas.openxmlformats.org/officeDocument/2006/math">
+                    <m:r>
+                      <a:rPr lang="en-CA" sz="2800" b="1" i="0" noProof="0" smtClean="0">
+                        <a:latin typeface="Cambria Math" panose="02040503050406030204" pitchFamily="18" charset="0"/>
+                        <a:ea typeface="Cambria Math" panose="02040503050406030204" pitchFamily="18" charset="0"/>
+                      </a:rPr>
+                      <m:t>↗</m:t>
+                    </m:r>
+                  </m:oMath>
+                </a14:m>
+                <a:endParaRPr lang="en-CA" sz="2800" b="1" noProof="0" dirty="0"/>
+              </a:p>
+            </p:txBody>
+          </p:sp>
+        </mc:Choice>
+        <mc:Fallback>
+          <p:sp>
+            <p:nvSpPr>
+              <p:cNvPr id="15" name="Rectangle : coins arrondis 4">
+                <a:extLst>
+                  <a:ext uri="{FF2B5EF4-FFF2-40B4-BE49-F238E27FC236}">
+                    <a16:creationId xmlns:a16="http://schemas.microsoft.com/office/drawing/2014/main" id="{E4B22F4B-9401-54CE-7096-4C928B0F1084}"/>
+                  </a:ext>
+                </a:extLst>
+              </p:cNvPr>
+              <p:cNvSpPr>
+                <a:spLocks noRot="1" noChangeAspect="1" noMove="1" noResize="1" noEditPoints="1" noAdjustHandles="1" noChangeArrowheads="1" noChangeShapeType="1" noTextEdit="1"/>
+              </p:cNvSpPr>
+              <p:nvPr/>
+            </p:nvSpPr>
+            <p:spPr>
+              <a:xfrm>
+                <a:off x="5820341" y="3449276"/>
+                <a:ext cx="2463817" cy="617387"/>
+              </a:xfrm>
+              <a:prstGeom prst="roundRect">
+                <a:avLst/>
+              </a:prstGeom>
+              <a:blipFill>
+                <a:blip r:embed="rId2"/>
+                <a:stretch>
+                  <a:fillRect l="-2020" t="-1923" b="-15385"/>
+                </a:stretch>
+              </a:blipFill>
+              <a:ln w="38100"/>
+            </p:spPr>
+            <p:txBody>
+              <a:bodyPr/>
+              <a:lstStyle/>
+              <a:p>
+                <a:r>
+                  <a:rPr lang="en-CA">
+                    <a:noFill/>
+                  </a:rPr>
+                  <a:t> </a:t>
+                </a:r>
+              </a:p>
+            </p:txBody>
+          </p:sp>
+        </mc:Fallback>
+      </mc:AlternateContent>
+      <p:sp>
+        <p:nvSpPr>
+          <p:cNvPr id="16" name="Explosion 1 15">
+            <a:extLst>
+              <a:ext uri="{FF2B5EF4-FFF2-40B4-BE49-F238E27FC236}">
+                <a16:creationId xmlns:a16="http://schemas.microsoft.com/office/drawing/2014/main" id="{515B5DEA-5F20-F083-EAFC-71456D14189C}"/>
+              </a:ext>
+            </a:extLst>
+          </p:cNvPr>
+          <p:cNvSpPr/>
+          <p:nvPr/>
+        </p:nvSpPr>
+        <p:spPr>
+          <a:xfrm>
+            <a:off x="0" y="115714"/>
+            <a:ext cx="3657599" cy="1736365"/>
+          </a:xfrm>
+          <a:prstGeom prst="irregularSeal1">
+            <a:avLst/>
+          </a:prstGeom>
+          <a:solidFill>
+            <a:schemeClr val="accent1">
+              <a:alpha val="50000"/>
+            </a:schemeClr>
+          </a:solidFill>
+        </p:spPr>
+        <p:style>
+          <a:lnRef idx="2">
+            <a:schemeClr val="accent1">
+              <a:shade val="15000"/>
+            </a:schemeClr>
+          </a:lnRef>
+          <a:fillRef idx="1">
+            <a:schemeClr val="accent1"/>
+          </a:fillRef>
+          <a:effectRef idx="0">
+            <a:schemeClr val="accent1"/>
+          </a:effectRef>
+          <a:fontRef idx="minor">
+            <a:schemeClr val="lt1"/>
+          </a:fontRef>
+        </p:style>
+        <p:txBody>
+          <a:bodyPr rtlCol="0" anchor="ctr"/>
+          <a:lstStyle/>
+          <a:p>
+            <a:pPr algn="ctr"/>
+            <a:r>
+              <a:rPr lang="en-CA" sz="2300" b="1" noProof="0" dirty="0">
+                <a:latin typeface="Avenir Next LT Pro" panose="020B0504020202020204" pitchFamily="34" charset="77"/>
+              </a:rPr>
+              <a:t>Climate change</a:t>
+            </a:r>
+          </a:p>
+        </p:txBody>
+      </p:sp>
+      <p:sp>
+        <p:nvSpPr>
+          <p:cNvPr id="17" name="Rectangle : coins arrondis 22">
+            <a:extLst>
+              <a:ext uri="{FF2B5EF4-FFF2-40B4-BE49-F238E27FC236}">
+                <a16:creationId xmlns:a16="http://schemas.microsoft.com/office/drawing/2014/main" id="{000960DA-AF90-C2C4-26C7-10E99A25F63B}"/>
+              </a:ext>
+            </a:extLst>
+          </p:cNvPr>
+          <p:cNvSpPr>
+            <a:spLocks noChangeAspect="1"/>
+          </p:cNvSpPr>
+          <p:nvPr/>
+        </p:nvSpPr>
+        <p:spPr>
+          <a:xfrm>
+            <a:off x="6076438" y="2031694"/>
+            <a:ext cx="1839453" cy="617384"/>
+          </a:xfrm>
+          <a:prstGeom prst="roundRect">
+            <a:avLst/>
+          </a:prstGeom>
+          <a:solidFill>
+            <a:schemeClr val="accent1">
+              <a:alpha val="50196"/>
+            </a:schemeClr>
+          </a:solidFill>
+        </p:spPr>
+        <p:style>
+          <a:lnRef idx="2">
+            <a:schemeClr val="accent1">
+              <a:shade val="15000"/>
+            </a:schemeClr>
+          </a:lnRef>
+          <a:fillRef idx="1">
+            <a:schemeClr val="accent1"/>
+          </a:fillRef>
+          <a:effectRef idx="0">
+            <a:schemeClr val="accent1"/>
+          </a:effectRef>
+          <a:fontRef idx="minor">
+            <a:schemeClr val="lt1"/>
+          </a:fontRef>
+        </p:style>
+        <p:txBody>
+          <a:bodyPr rtlCol="0" anchor="ctr"/>
+          <a:lstStyle/>
+          <a:p>
+            <a:pPr algn="ctr"/>
+            <a:r>
+              <a:rPr lang="en-CA" sz="2800" b="1" noProof="0" dirty="0">
+                <a:latin typeface="Avenir Next LT Pro" panose="020B0504020202020204" pitchFamily="34" charset="77"/>
+              </a:rPr>
+              <a:t>Plasticity</a:t>
+            </a:r>
+            <a:endParaRPr lang="en-CA" sz="2800" b="1" noProof="0" dirty="0"/>
+          </a:p>
+        </p:txBody>
+      </p:sp>
+      <p:sp>
+        <p:nvSpPr>
+          <p:cNvPr id="18" name="Rectangle : coins arrondis 23">
+            <a:extLst>
+              <a:ext uri="{FF2B5EF4-FFF2-40B4-BE49-F238E27FC236}">
+                <a16:creationId xmlns:a16="http://schemas.microsoft.com/office/drawing/2014/main" id="{17722861-A033-D79B-E3DD-172EC0FA1322}"/>
+              </a:ext>
+            </a:extLst>
+          </p:cNvPr>
+          <p:cNvSpPr>
+            <a:spLocks noChangeAspect="1"/>
+          </p:cNvSpPr>
+          <p:nvPr/>
+        </p:nvSpPr>
+        <p:spPr>
+          <a:xfrm>
+            <a:off x="3272200" y="3115668"/>
+            <a:ext cx="1897531" cy="627675"/>
+          </a:xfrm>
+          <a:prstGeom prst="roundRect">
+            <a:avLst/>
+          </a:prstGeom>
+          <a:solidFill>
+            <a:schemeClr val="accent1">
+              <a:alpha val="50196"/>
+            </a:schemeClr>
+          </a:solidFill>
+        </p:spPr>
+        <p:style>
+          <a:lnRef idx="2">
+            <a:schemeClr val="accent1">
+              <a:shade val="15000"/>
+            </a:schemeClr>
+          </a:lnRef>
+          <a:fillRef idx="1">
+            <a:schemeClr val="accent1"/>
+          </a:fillRef>
+          <a:effectRef idx="0">
+            <a:schemeClr val="accent1"/>
+          </a:effectRef>
+          <a:fontRef idx="minor">
+            <a:schemeClr val="lt1"/>
+          </a:fontRef>
+        </p:style>
+        <p:txBody>
+          <a:bodyPr rtlCol="0" anchor="ctr"/>
+          <a:lstStyle/>
+          <a:p>
+            <a:pPr algn="ctr"/>
+            <a:r>
+              <a:rPr lang="en-CA" sz="2800" b="1" noProof="0" dirty="0">
+                <a:latin typeface="Avenir Next LT Pro" panose="020B0504020202020204" pitchFamily="34" charset="77"/>
+              </a:rPr>
+              <a:t>Evolution</a:t>
+            </a:r>
+            <a:endParaRPr lang="en-CA" b="1" noProof="0" dirty="0"/>
+          </a:p>
+        </p:txBody>
+      </p:sp>
+      <p:sp>
+        <p:nvSpPr>
+          <p:cNvPr id="19" name="Forme libre 26">
+            <a:extLst>
+              <a:ext uri="{FF2B5EF4-FFF2-40B4-BE49-F238E27FC236}">
+                <a16:creationId xmlns:a16="http://schemas.microsoft.com/office/drawing/2014/main" id="{BD357D59-AB3C-A7BC-DC25-4098BF7925B8}"/>
+              </a:ext>
+            </a:extLst>
+          </p:cNvPr>
+          <p:cNvSpPr/>
+          <p:nvPr/>
+        </p:nvSpPr>
+        <p:spPr>
+          <a:xfrm>
+            <a:off x="7063204" y="2684907"/>
+            <a:ext cx="45719" cy="715698"/>
+          </a:xfrm>
+          <a:custGeom>
+            <a:avLst/>
+            <a:gdLst>
+              <a:gd name="connsiteX0" fmla="*/ 0 w 573206"/>
+              <a:gd name="connsiteY0" fmla="*/ 0 h 887105"/>
+              <a:gd name="connsiteX1" fmla="*/ 477671 w 573206"/>
+              <a:gd name="connsiteY1" fmla="*/ 368490 h 887105"/>
+              <a:gd name="connsiteX2" fmla="*/ 573206 w 573206"/>
+              <a:gd name="connsiteY2" fmla="*/ 887105 h 887105"/>
+            </a:gdLst>
+            <a:ahLst/>
+            <a:cxnLst>
+              <a:cxn ang="0">
+                <a:pos x="connsiteX0" y="connsiteY0"/>
+              </a:cxn>
+              <a:cxn ang="0">
+                <a:pos x="connsiteX1" y="connsiteY1"/>
+              </a:cxn>
+              <a:cxn ang="0">
+                <a:pos x="connsiteX2" y="connsiteY2"/>
+              </a:cxn>
+            </a:cxnLst>
+            <a:rect l="l" t="t" r="r" b="b"/>
+            <a:pathLst>
+              <a:path w="573206" h="887105">
+                <a:moveTo>
+                  <a:pt x="0" y="0"/>
+                </a:moveTo>
+                <a:cubicBezTo>
+                  <a:pt x="191068" y="110319"/>
+                  <a:pt x="382137" y="220639"/>
+                  <a:pt x="477671" y="368490"/>
+                </a:cubicBezTo>
+                <a:cubicBezTo>
+                  <a:pt x="573205" y="516341"/>
+                  <a:pt x="573205" y="701723"/>
+                  <a:pt x="573206" y="887105"/>
+                </a:cubicBezTo>
+              </a:path>
+            </a:pathLst>
+          </a:custGeom>
+          <a:noFill/>
+          <a:ln w="76200">
+            <a:solidFill>
+              <a:schemeClr val="accent1"/>
+            </a:solidFill>
+            <a:headEnd type="none" w="med" len="med"/>
+            <a:tailEnd type="triangle" w="med" len="med"/>
+            <a:extLst>
+              <a:ext uri="{C807C97D-BFC1-408E-A445-0C87EB9F89A2}">
+                <ask:lineSketchStyleProps xmlns:ask="http://schemas.microsoft.com/office/drawing/2018/sketchyshapes" sd="1219033472">
+                  <a:custGeom>
+                    <a:avLst/>
+                    <a:gdLst>
+                      <a:gd name="connsiteX0" fmla="*/ 0 w 573206"/>
+                      <a:gd name="connsiteY0" fmla="*/ 0 h 887105"/>
+                      <a:gd name="connsiteX1" fmla="*/ 477671 w 573206"/>
+                      <a:gd name="connsiteY1" fmla="*/ 368490 h 887105"/>
+                      <a:gd name="connsiteX2" fmla="*/ 573206 w 573206"/>
+                      <a:gd name="connsiteY2" fmla="*/ 887105 h 887105"/>
+                    </a:gdLst>
+                    <a:ahLst/>
+                    <a:cxnLst>
+                      <a:cxn ang="0">
+                        <a:pos x="connsiteX0" y="connsiteY0"/>
+                      </a:cxn>
+                      <a:cxn ang="0">
+                        <a:pos x="connsiteX1" y="connsiteY1"/>
+                      </a:cxn>
+                      <a:cxn ang="0">
+                        <a:pos x="connsiteX2" y="connsiteY2"/>
+                      </a:cxn>
+                    </a:cxnLst>
+                    <a:rect l="l" t="t" r="r" b="b"/>
+                    <a:pathLst>
+                      <a:path w="573206" h="887105" extrusionOk="0">
+                        <a:moveTo>
+                          <a:pt x="0" y="0"/>
+                        </a:moveTo>
+                        <a:cubicBezTo>
+                          <a:pt x="166656" y="95261"/>
+                          <a:pt x="363541" y="227618"/>
+                          <a:pt x="477671" y="368490"/>
+                        </a:cubicBezTo>
+                        <a:cubicBezTo>
+                          <a:pt x="586088" y="519053"/>
+                          <a:pt x="553187" y="702360"/>
+                          <a:pt x="573206" y="887105"/>
+                        </a:cubicBezTo>
+                      </a:path>
+                    </a:pathLst>
+                  </a:custGeom>
+                  <ask:type>
+                    <ask:lineSketchNone/>
+                  </ask:type>
+                </ask:lineSketchStyleProps>
+              </a:ext>
+            </a:extLst>
+          </a:ln>
+        </p:spPr>
+        <p:style>
+          <a:lnRef idx="2">
+            <a:schemeClr val="accent1">
+              <a:shade val="15000"/>
+            </a:schemeClr>
+          </a:lnRef>
+          <a:fillRef idx="1">
+            <a:schemeClr val="accent1"/>
+          </a:fillRef>
+          <a:effectRef idx="0">
+            <a:schemeClr val="accent1"/>
+          </a:effectRef>
+          <a:fontRef idx="minor">
+            <a:schemeClr val="lt1"/>
+          </a:fontRef>
+        </p:style>
+        <p:txBody>
+          <a:bodyPr rtlCol="0" anchor="ctr"/>
+          <a:lstStyle/>
+          <a:p>
+            <a:pPr algn="ctr"/>
+            <a:endParaRPr lang="en-CA" sz="1050" noProof="0" dirty="0"/>
+          </a:p>
+        </p:txBody>
+      </p:sp>
+      <p:sp>
+        <p:nvSpPr>
+          <p:cNvPr id="20" name="Forme libre 27">
+            <a:extLst>
+              <a:ext uri="{FF2B5EF4-FFF2-40B4-BE49-F238E27FC236}">
+                <a16:creationId xmlns:a16="http://schemas.microsoft.com/office/drawing/2014/main" id="{C5184774-C0EE-CAF2-9C4E-26FBD1B99DF2}"/>
+              </a:ext>
+            </a:extLst>
+          </p:cNvPr>
+          <p:cNvSpPr/>
+          <p:nvPr/>
+        </p:nvSpPr>
+        <p:spPr>
+          <a:xfrm>
+            <a:off x="5148033" y="3662780"/>
+            <a:ext cx="667619" cy="148461"/>
+          </a:xfrm>
+          <a:custGeom>
+            <a:avLst/>
+            <a:gdLst>
+              <a:gd name="connsiteX0" fmla="*/ 0 w 1487606"/>
+              <a:gd name="connsiteY0" fmla="*/ 0 h 437519"/>
+              <a:gd name="connsiteX1" fmla="*/ 518615 w 1487606"/>
+              <a:gd name="connsiteY1" fmla="*/ 368489 h 437519"/>
+              <a:gd name="connsiteX2" fmla="*/ 1487606 w 1487606"/>
+              <a:gd name="connsiteY2" fmla="*/ 436728 h 437519"/>
+            </a:gdLst>
+            <a:ahLst/>
+            <a:cxnLst>
+              <a:cxn ang="0">
+                <a:pos x="connsiteX0" y="connsiteY0"/>
+              </a:cxn>
+              <a:cxn ang="0">
+                <a:pos x="connsiteX1" y="connsiteY1"/>
+              </a:cxn>
+              <a:cxn ang="0">
+                <a:pos x="connsiteX2" y="connsiteY2"/>
+              </a:cxn>
+            </a:cxnLst>
+            <a:rect l="l" t="t" r="r" b="b"/>
+            <a:pathLst>
+              <a:path w="1487606" h="437519">
+                <a:moveTo>
+                  <a:pt x="0" y="0"/>
+                </a:moveTo>
+                <a:cubicBezTo>
+                  <a:pt x="135340" y="147850"/>
+                  <a:pt x="270681" y="295701"/>
+                  <a:pt x="518615" y="368489"/>
+                </a:cubicBezTo>
+                <a:cubicBezTo>
+                  <a:pt x="766549" y="441277"/>
+                  <a:pt x="1127077" y="439002"/>
+                  <a:pt x="1487606" y="436728"/>
+                </a:cubicBezTo>
+              </a:path>
+            </a:pathLst>
+          </a:custGeom>
+          <a:noFill/>
+          <a:ln w="76200">
+            <a:solidFill>
+              <a:schemeClr val="accent1"/>
+            </a:solidFill>
+            <a:prstDash val="solid"/>
+            <a:headEnd type="none" w="med" len="med"/>
+            <a:tailEnd type="triangle" w="med" len="med"/>
+          </a:ln>
+        </p:spPr>
+        <p:style>
+          <a:lnRef idx="2">
+            <a:schemeClr val="accent1">
+              <a:shade val="15000"/>
+            </a:schemeClr>
+          </a:lnRef>
+          <a:fillRef idx="1">
+            <a:schemeClr val="accent1"/>
+          </a:fillRef>
+          <a:effectRef idx="0">
+            <a:schemeClr val="accent1"/>
+          </a:effectRef>
+          <a:fontRef idx="minor">
+            <a:schemeClr val="lt1"/>
+          </a:fontRef>
+        </p:style>
+        <p:txBody>
+          <a:bodyPr rtlCol="0" anchor="ctr"/>
+          <a:lstStyle/>
+          <a:p>
+            <a:pPr algn="ctr"/>
+            <a:endParaRPr lang="en-CA" sz="1050" noProof="0" dirty="0"/>
+          </a:p>
+        </p:txBody>
+      </p:sp>
+      <p:sp>
+        <p:nvSpPr>
+          <p:cNvPr id="21" name="Forme libre 7">
+            <a:extLst>
+              <a:ext uri="{FF2B5EF4-FFF2-40B4-BE49-F238E27FC236}">
+                <a16:creationId xmlns:a16="http://schemas.microsoft.com/office/drawing/2014/main" id="{A6F7CEC9-F99C-435E-8A37-5B3203DF2B23}"/>
+              </a:ext>
+            </a:extLst>
+          </p:cNvPr>
+          <p:cNvSpPr/>
+          <p:nvPr/>
+        </p:nvSpPr>
+        <p:spPr>
+          <a:xfrm>
+            <a:off x="198951" y="1521325"/>
+            <a:ext cx="575676" cy="2270062"/>
+          </a:xfrm>
+          <a:custGeom>
+            <a:avLst/>
+            <a:gdLst>
+              <a:gd name="connsiteX0" fmla="*/ 463790 w 463790"/>
+              <a:gd name="connsiteY0" fmla="*/ 0 h 846162"/>
+              <a:gd name="connsiteX1" fmla="*/ 40710 w 463790"/>
+              <a:gd name="connsiteY1" fmla="*/ 286603 h 846162"/>
+              <a:gd name="connsiteX2" fmla="*/ 40710 w 463790"/>
+              <a:gd name="connsiteY2" fmla="*/ 846162 h 846162"/>
+            </a:gdLst>
+            <a:ahLst/>
+            <a:cxnLst>
+              <a:cxn ang="0">
+                <a:pos x="connsiteX0" y="connsiteY0"/>
+              </a:cxn>
+              <a:cxn ang="0">
+                <a:pos x="connsiteX1" y="connsiteY1"/>
+              </a:cxn>
+              <a:cxn ang="0">
+                <a:pos x="connsiteX2" y="connsiteY2"/>
+              </a:cxn>
+            </a:cxnLst>
+            <a:rect l="l" t="t" r="r" b="b"/>
+            <a:pathLst>
+              <a:path w="463790" h="846162">
+                <a:moveTo>
+                  <a:pt x="463790" y="0"/>
+                </a:moveTo>
+                <a:cubicBezTo>
+                  <a:pt x="287506" y="72788"/>
+                  <a:pt x="111223" y="145576"/>
+                  <a:pt x="40710" y="286603"/>
+                </a:cubicBezTo>
+                <a:cubicBezTo>
+                  <a:pt x="-29803" y="427630"/>
+                  <a:pt x="5453" y="636896"/>
+                  <a:pt x="40710" y="846162"/>
+                </a:cubicBezTo>
+              </a:path>
+            </a:pathLst>
+          </a:custGeom>
+          <a:noFill/>
+          <a:ln w="38100">
+            <a:solidFill>
+              <a:schemeClr val="accent6"/>
+            </a:solidFill>
+            <a:prstDash val="dash"/>
+            <a:headEnd type="none" w="med" len="med"/>
+            <a:tailEnd type="triangle" w="med" len="med"/>
+          </a:ln>
+        </p:spPr>
+        <p:style>
+          <a:lnRef idx="2">
+            <a:schemeClr val="accent1">
+              <a:shade val="15000"/>
+            </a:schemeClr>
+          </a:lnRef>
+          <a:fillRef idx="1">
+            <a:schemeClr val="accent1"/>
+          </a:fillRef>
+          <a:effectRef idx="0">
+            <a:schemeClr val="accent1"/>
+          </a:effectRef>
+          <a:fontRef idx="minor">
+            <a:schemeClr val="lt1"/>
+          </a:fontRef>
+        </p:style>
+        <p:txBody>
+          <a:bodyPr rtlCol="0" anchor="ctr"/>
+          <a:lstStyle/>
+          <a:p>
+            <a:pPr algn="ctr"/>
+            <a:endParaRPr lang="en-CA" sz="1050" noProof="0" dirty="0"/>
+          </a:p>
+        </p:txBody>
+      </p:sp>
+      <p:sp>
+        <p:nvSpPr>
+          <p:cNvPr id="22" name="Rectangle : coins arrondis 10">
+            <a:extLst>
+              <a:ext uri="{FF2B5EF4-FFF2-40B4-BE49-F238E27FC236}">
+                <a16:creationId xmlns:a16="http://schemas.microsoft.com/office/drawing/2014/main" id="{61E29F8C-1880-6C80-5B18-94F722CDFDD0}"/>
+              </a:ext>
+            </a:extLst>
+          </p:cNvPr>
+          <p:cNvSpPr>
+            <a:spLocks/>
+          </p:cNvSpPr>
+          <p:nvPr/>
+        </p:nvSpPr>
+        <p:spPr>
+          <a:xfrm>
+            <a:off x="27199" y="3833016"/>
+            <a:ext cx="2384793" cy="749194"/>
+          </a:xfrm>
+          <a:prstGeom prst="roundRect">
+            <a:avLst/>
+          </a:prstGeom>
+          <a:solidFill>
+            <a:schemeClr val="accent6">
+              <a:alpha val="50196"/>
+            </a:schemeClr>
+          </a:solidFill>
+          <a:ln>
+            <a:noFill/>
+          </a:ln>
+        </p:spPr>
+        <p:style>
+          <a:lnRef idx="2">
+            <a:schemeClr val="accent1">
+              <a:shade val="15000"/>
+            </a:schemeClr>
+          </a:lnRef>
+          <a:fillRef idx="1">
+            <a:schemeClr val="accent1"/>
+          </a:fillRef>
+          <a:effectRef idx="0">
+            <a:schemeClr val="accent1"/>
+          </a:effectRef>
+          <a:fontRef idx="minor">
+            <a:schemeClr val="lt1"/>
+          </a:fontRef>
+        </p:style>
+        <p:txBody>
+          <a:bodyPr rtlCol="0" anchor="ctr"/>
+          <a:lstStyle/>
+          <a:p>
+            <a:pPr algn="ctr"/>
+            <a:r>
+              <a:rPr lang="en-CA" sz="2000" b="1" noProof="0" dirty="0">
+                <a:latin typeface="Avenir Next LT Pro" panose="020B0504020202020204" pitchFamily="34" charset="77"/>
+              </a:rPr>
+              <a:t>Growing season conditions</a:t>
+            </a:r>
+            <a:endParaRPr lang="en-CA" sz="2000" b="1" noProof="0" dirty="0">
+              <a:latin typeface="Avenir Next LT Pro" panose="020B0504020202020204" pitchFamily="34" charset="77"/>
+              <a:ea typeface="Cambria Math" panose="02040503050406030204" pitchFamily="18" charset="0"/>
+            </a:endParaRPr>
+          </a:p>
+        </p:txBody>
+      </p:sp>
+      <p:sp>
+        <p:nvSpPr>
+          <p:cNvPr id="23" name="Rectangle : coins arrondis 13">
+            <a:extLst>
+              <a:ext uri="{FF2B5EF4-FFF2-40B4-BE49-F238E27FC236}">
+                <a16:creationId xmlns:a16="http://schemas.microsoft.com/office/drawing/2014/main" id="{15A4AD96-6CC1-25EA-787B-01931F910CB6}"/>
+              </a:ext>
+            </a:extLst>
+          </p:cNvPr>
+          <p:cNvSpPr>
+            <a:spLocks/>
+          </p:cNvSpPr>
+          <p:nvPr/>
+        </p:nvSpPr>
+        <p:spPr>
+          <a:xfrm>
+            <a:off x="417519" y="2656395"/>
+            <a:ext cx="2642883" cy="673787"/>
+          </a:xfrm>
+          <a:prstGeom prst="roundRect">
+            <a:avLst/>
+          </a:prstGeom>
+          <a:solidFill>
+            <a:schemeClr val="accent6">
+              <a:alpha val="50196"/>
+            </a:schemeClr>
+          </a:solidFill>
+          <a:ln>
+            <a:noFill/>
+          </a:ln>
+        </p:spPr>
+        <p:style>
+          <a:lnRef idx="2">
+            <a:schemeClr val="accent1">
+              <a:shade val="15000"/>
+            </a:schemeClr>
+          </a:lnRef>
+          <a:fillRef idx="1">
+            <a:schemeClr val="accent1"/>
+          </a:fillRef>
+          <a:effectRef idx="0">
+            <a:schemeClr val="accent1"/>
+          </a:effectRef>
+          <a:fontRef idx="minor">
+            <a:schemeClr val="lt1"/>
+          </a:fontRef>
+        </p:style>
+        <p:txBody>
+          <a:bodyPr rtlCol="0" anchor="ctr"/>
+          <a:lstStyle/>
+          <a:p>
+            <a:pPr algn="ctr"/>
+            <a:r>
+              <a:rPr lang="en-CA" sz="2000" b="1" noProof="0" dirty="0">
+                <a:latin typeface="Avenir Next LT Pro" panose="020B0504020202020204" pitchFamily="34" charset="77"/>
+              </a:rPr>
+              <a:t>Hibernation season conditions</a:t>
+            </a:r>
+            <a:endParaRPr lang="en-CA" sz="2000" b="1" noProof="0" dirty="0">
+              <a:latin typeface="Avenir Next LT Pro" panose="020B0504020202020204" pitchFamily="34" charset="77"/>
+              <a:ea typeface="Cambria Math" panose="02040503050406030204" pitchFamily="18" charset="0"/>
+            </a:endParaRPr>
+          </a:p>
+        </p:txBody>
+      </p:sp>
+      <p:sp>
+        <p:nvSpPr>
+          <p:cNvPr id="24" name="Forme libre 14">
+            <a:extLst>
+              <a:ext uri="{FF2B5EF4-FFF2-40B4-BE49-F238E27FC236}">
+                <a16:creationId xmlns:a16="http://schemas.microsoft.com/office/drawing/2014/main" id="{D909B5C6-A95F-F4FF-2999-040764535198}"/>
+              </a:ext>
+            </a:extLst>
+          </p:cNvPr>
+          <p:cNvSpPr/>
+          <p:nvPr/>
+        </p:nvSpPr>
+        <p:spPr>
+          <a:xfrm>
+            <a:off x="1428188" y="1831497"/>
+            <a:ext cx="152142" cy="824899"/>
+          </a:xfrm>
+          <a:custGeom>
+            <a:avLst/>
+            <a:gdLst>
+              <a:gd name="connsiteX0" fmla="*/ 17416 w 686157"/>
+              <a:gd name="connsiteY0" fmla="*/ 0 h 1542197"/>
+              <a:gd name="connsiteX1" fmla="*/ 85655 w 686157"/>
+              <a:gd name="connsiteY1" fmla="*/ 900753 h 1542197"/>
+              <a:gd name="connsiteX2" fmla="*/ 686157 w 686157"/>
+              <a:gd name="connsiteY2" fmla="*/ 1542197 h 1542197"/>
+            </a:gdLst>
+            <a:ahLst/>
+            <a:cxnLst>
+              <a:cxn ang="0">
+                <a:pos x="connsiteX0" y="connsiteY0"/>
+              </a:cxn>
+              <a:cxn ang="0">
+                <a:pos x="connsiteX1" y="connsiteY1"/>
+              </a:cxn>
+              <a:cxn ang="0">
+                <a:pos x="connsiteX2" y="connsiteY2"/>
+              </a:cxn>
+            </a:cxnLst>
+            <a:rect l="l" t="t" r="r" b="b"/>
+            <a:pathLst>
+              <a:path w="686157" h="1542197">
+                <a:moveTo>
+                  <a:pt x="17416" y="0"/>
+                </a:moveTo>
+                <a:cubicBezTo>
+                  <a:pt x="-4193" y="321860"/>
+                  <a:pt x="-25802" y="643720"/>
+                  <a:pt x="85655" y="900753"/>
+                </a:cubicBezTo>
+                <a:cubicBezTo>
+                  <a:pt x="197112" y="1157786"/>
+                  <a:pt x="441634" y="1349991"/>
+                  <a:pt x="686157" y="1542197"/>
+                </a:cubicBezTo>
+              </a:path>
+            </a:pathLst>
+          </a:custGeom>
+          <a:noFill/>
+          <a:ln w="38100">
+            <a:solidFill>
+              <a:schemeClr val="accent6"/>
+            </a:solidFill>
+            <a:prstDash val="dash"/>
+            <a:headEnd type="none" w="med" len="med"/>
+            <a:tailEnd type="triangle" w="med" len="med"/>
+          </a:ln>
+        </p:spPr>
+        <p:style>
+          <a:lnRef idx="2">
+            <a:schemeClr val="accent1">
+              <a:shade val="15000"/>
+            </a:schemeClr>
+          </a:lnRef>
+          <a:fillRef idx="1">
+            <a:schemeClr val="accent1"/>
+          </a:fillRef>
+          <a:effectRef idx="0">
+            <a:schemeClr val="accent1"/>
+          </a:effectRef>
+          <a:fontRef idx="minor">
+            <a:schemeClr val="lt1"/>
+          </a:fontRef>
+        </p:style>
+        <p:txBody>
+          <a:bodyPr rtlCol="0" anchor="ctr"/>
+          <a:lstStyle/>
+          <a:p>
+            <a:pPr algn="ctr"/>
+            <a:endParaRPr lang="en-CA" sz="1050" noProof="0" dirty="0"/>
+          </a:p>
+        </p:txBody>
+      </p:sp>
+      <p:sp>
+        <p:nvSpPr>
+          <p:cNvPr id="25" name="Rectangle : coins arrondis 15">
+            <a:extLst>
+              <a:ext uri="{FF2B5EF4-FFF2-40B4-BE49-F238E27FC236}">
+                <a16:creationId xmlns:a16="http://schemas.microsoft.com/office/drawing/2014/main" id="{9031E633-7345-B324-2921-1D2E7B740014}"/>
+              </a:ext>
+            </a:extLst>
+          </p:cNvPr>
+          <p:cNvSpPr>
+            <a:spLocks/>
+          </p:cNvSpPr>
+          <p:nvPr/>
+        </p:nvSpPr>
+        <p:spPr>
+          <a:xfrm>
+            <a:off x="2991571" y="1806918"/>
+            <a:ext cx="1982288" cy="665064"/>
+          </a:xfrm>
+          <a:prstGeom prst="roundRect">
+            <a:avLst/>
+          </a:prstGeom>
+          <a:solidFill>
+            <a:schemeClr val="accent6">
+              <a:alpha val="50196"/>
+            </a:schemeClr>
+          </a:solidFill>
+          <a:ln>
+            <a:noFill/>
+          </a:ln>
+        </p:spPr>
+        <p:style>
+          <a:lnRef idx="2">
+            <a:schemeClr val="accent1">
+              <a:shade val="15000"/>
+            </a:schemeClr>
+          </a:lnRef>
+          <a:fillRef idx="1">
+            <a:schemeClr val="accent1"/>
+          </a:fillRef>
+          <a:effectRef idx="0">
+            <a:schemeClr val="accent1"/>
+          </a:effectRef>
+          <a:fontRef idx="minor">
+            <a:schemeClr val="lt1"/>
+          </a:fontRef>
+        </p:style>
+        <p:txBody>
+          <a:bodyPr rtlCol="0" anchor="ctr"/>
+          <a:lstStyle/>
+          <a:p>
+            <a:pPr algn="ctr"/>
+            <a:r>
+              <a:rPr lang="en-CA" sz="2000" b="1" noProof="0" dirty="0">
+                <a:latin typeface="Avenir Next LT Pro" panose="020B0504020202020204" pitchFamily="34" charset="77"/>
+              </a:rPr>
+              <a:t>Seasons length</a:t>
+            </a:r>
+            <a:endParaRPr lang="en-CA" sz="2000" b="1" noProof="0" dirty="0">
+              <a:latin typeface="Avenir Next LT Pro" panose="020B0504020202020204" pitchFamily="34" charset="77"/>
+              <a:ea typeface="Cambria Math" panose="02040503050406030204" pitchFamily="18" charset="0"/>
+            </a:endParaRPr>
+          </a:p>
+        </p:txBody>
+      </p:sp>
+      <p:sp>
+        <p:nvSpPr>
+          <p:cNvPr id="26" name="Forme libre 16">
+            <a:extLst>
+              <a:ext uri="{FF2B5EF4-FFF2-40B4-BE49-F238E27FC236}">
+                <a16:creationId xmlns:a16="http://schemas.microsoft.com/office/drawing/2014/main" id="{631906C4-D7D5-052E-116A-3A09629A30BD}"/>
+              </a:ext>
+            </a:extLst>
+          </p:cNvPr>
+          <p:cNvSpPr/>
+          <p:nvPr/>
+        </p:nvSpPr>
+        <p:spPr>
+          <a:xfrm flipH="1">
+            <a:off x="4132796" y="1478719"/>
+            <a:ext cx="1237134" cy="328199"/>
+          </a:xfrm>
+          <a:custGeom>
+            <a:avLst/>
+            <a:gdLst>
+              <a:gd name="connsiteX0" fmla="*/ 0 w 2606722"/>
+              <a:gd name="connsiteY0" fmla="*/ 0 h 1173707"/>
+              <a:gd name="connsiteX1" fmla="*/ 982639 w 2606722"/>
+              <a:gd name="connsiteY1" fmla="*/ 272955 h 1173707"/>
+              <a:gd name="connsiteX2" fmla="*/ 2279176 w 2606722"/>
+              <a:gd name="connsiteY2" fmla="*/ 818865 h 1173707"/>
+              <a:gd name="connsiteX3" fmla="*/ 2606722 w 2606722"/>
+              <a:gd name="connsiteY3" fmla="*/ 1173707 h 1173707"/>
+            </a:gdLst>
+            <a:ahLst/>
+            <a:cxnLst>
+              <a:cxn ang="0">
+                <a:pos x="connsiteX0" y="connsiteY0"/>
+              </a:cxn>
+              <a:cxn ang="0">
+                <a:pos x="connsiteX1" y="connsiteY1"/>
+              </a:cxn>
+              <a:cxn ang="0">
+                <a:pos x="connsiteX2" y="connsiteY2"/>
+              </a:cxn>
+              <a:cxn ang="0">
+                <a:pos x="connsiteX3" y="connsiteY3"/>
+              </a:cxn>
+            </a:cxnLst>
+            <a:rect l="l" t="t" r="r" b="b"/>
+            <a:pathLst>
+              <a:path w="2606722" h="1173707">
+                <a:moveTo>
+                  <a:pt x="0" y="0"/>
+                </a:moveTo>
+                <a:cubicBezTo>
+                  <a:pt x="301388" y="68239"/>
+                  <a:pt x="602776" y="136478"/>
+                  <a:pt x="982639" y="272955"/>
+                </a:cubicBezTo>
+                <a:cubicBezTo>
+                  <a:pt x="1362502" y="409432"/>
+                  <a:pt x="2008496" y="668740"/>
+                  <a:pt x="2279176" y="818865"/>
+                </a:cubicBezTo>
+                <a:cubicBezTo>
+                  <a:pt x="2549856" y="968990"/>
+                  <a:pt x="2578289" y="1071348"/>
+                  <a:pt x="2606722" y="1173707"/>
+                </a:cubicBezTo>
+              </a:path>
+            </a:pathLst>
+          </a:custGeom>
+          <a:noFill/>
+          <a:ln w="38100">
+            <a:solidFill>
+              <a:schemeClr val="accent6"/>
+            </a:solidFill>
+            <a:prstDash val="dash"/>
+            <a:headEnd type="none" w="med" len="med"/>
+            <a:tailEnd type="triangle" w="med" len="med"/>
+          </a:ln>
+        </p:spPr>
+        <p:style>
+          <a:lnRef idx="2">
+            <a:schemeClr val="accent1">
+              <a:shade val="15000"/>
+            </a:schemeClr>
+          </a:lnRef>
+          <a:fillRef idx="1">
+            <a:schemeClr val="accent1"/>
+          </a:fillRef>
+          <a:effectRef idx="0">
+            <a:schemeClr val="accent1"/>
+          </a:effectRef>
+          <a:fontRef idx="minor">
+            <a:schemeClr val="lt1"/>
+          </a:fontRef>
+        </p:style>
+        <p:txBody>
+          <a:bodyPr rtlCol="0" anchor="ctr"/>
+          <a:lstStyle/>
+          <a:p>
+            <a:pPr algn="ctr"/>
+            <a:endParaRPr lang="en-CA" sz="1050" noProof="0" dirty="0"/>
+          </a:p>
+        </p:txBody>
+      </p:sp>
+      <p:grpSp>
+        <p:nvGrpSpPr>
+          <p:cNvPr id="27" name="Groupe 12">
+            <a:extLst>
+              <a:ext uri="{FF2B5EF4-FFF2-40B4-BE49-F238E27FC236}">
+                <a16:creationId xmlns:a16="http://schemas.microsoft.com/office/drawing/2014/main" id="{7B3BA561-B8EB-37B3-73AA-0A00CF7BFEB2}"/>
+              </a:ext>
+            </a:extLst>
+          </p:cNvPr>
+          <p:cNvGrpSpPr/>
+          <p:nvPr/>
+        </p:nvGrpSpPr>
+        <p:grpSpPr>
+          <a:xfrm>
+            <a:off x="4343396" y="141428"/>
+            <a:ext cx="2955899" cy="1710650"/>
+            <a:chOff x="5079593" y="481424"/>
+            <a:chExt cx="4667216" cy="2092545"/>
+          </a:xfrm>
+        </p:grpSpPr>
+        <p:sp>
+          <p:nvSpPr>
+            <p:cNvPr id="30" name="Rectangle : coins arrondis 6">
+              <a:extLst>
+                <a:ext uri="{FF2B5EF4-FFF2-40B4-BE49-F238E27FC236}">
+                  <a16:creationId xmlns:a16="http://schemas.microsoft.com/office/drawing/2014/main" id="{A978F387-4624-2160-1BD0-775938A0F4CD}"/>
+                </a:ext>
+              </a:extLst>
+            </p:cNvPr>
+            <p:cNvSpPr>
+              <a:spLocks/>
+            </p:cNvSpPr>
+            <p:nvPr/>
+          </p:nvSpPr>
+          <p:spPr>
+            <a:xfrm>
+              <a:off x="5079593" y="481424"/>
+              <a:ext cx="1953372" cy="657967"/>
+            </a:xfrm>
+            <a:prstGeom prst="roundRect">
+              <a:avLst/>
+            </a:prstGeom>
+            <a:solidFill>
+              <a:schemeClr val="accent1">
+                <a:alpha val="50196"/>
+              </a:schemeClr>
+            </a:solidFill>
+            <a:ln>
+              <a:noFill/>
+            </a:ln>
+          </p:spPr>
+          <p:style>
+            <a:lnRef idx="2">
+              <a:schemeClr val="accent1">
+                <a:shade val="15000"/>
+              </a:schemeClr>
+            </a:lnRef>
+            <a:fillRef idx="1">
+              <a:schemeClr val="accent1"/>
+            </a:fillRef>
+            <a:effectRef idx="0">
+              <a:schemeClr val="accent1"/>
+            </a:effectRef>
+            <a:fontRef idx="minor">
+              <a:schemeClr val="lt1"/>
+            </a:fontRef>
+          </p:style>
+          <p:txBody>
+            <a:bodyPr rtlCol="0" anchor="ctr"/>
+            <a:lstStyle/>
+            <a:p>
+              <a:pPr algn="ctr"/>
+              <a:r>
+                <a:rPr lang="en-CA" b="1" noProof="0" dirty="0">
+                  <a:latin typeface="Avenir Next LT Pro" panose="020B0504020202020204" pitchFamily="34" charset="77"/>
+                </a:rPr>
+                <a:t>Active season ➚</a:t>
+              </a:r>
+              <a:endParaRPr lang="en-CA" b="1" noProof="0" dirty="0">
+                <a:latin typeface="Avenir Next LT Pro" panose="020B0504020202020204" pitchFamily="34" charset="77"/>
+                <a:ea typeface="Cambria Math" panose="02040503050406030204" pitchFamily="18" charset="0"/>
+              </a:endParaRPr>
+            </a:p>
+          </p:txBody>
+        </p:sp>
+        <p:pic>
+          <p:nvPicPr>
+            <p:cNvPr id="31" name="Image 9" descr="Une image contenant dessin, croquis, noir, art&#10;&#10;Description générée automatiquement">
+              <a:extLst>
+                <a:ext uri="{FF2B5EF4-FFF2-40B4-BE49-F238E27FC236}">
+                  <a16:creationId xmlns:a16="http://schemas.microsoft.com/office/drawing/2014/main" id="{FCFD7B6F-91CC-A7E6-026D-0CD11349BE9D}"/>
+                </a:ext>
+              </a:extLst>
+            </p:cNvPr>
+            <p:cNvPicPr>
+              <a:picLocks noChangeAspect="1"/>
+            </p:cNvPicPr>
+            <p:nvPr/>
+          </p:nvPicPr>
+          <p:blipFill rotWithShape="1">
+            <a:blip r:embed="rId3"/>
+            <a:srcRect l="17815" t="63021" r="18034"/>
+            <a:stretch/>
+          </p:blipFill>
+          <p:spPr>
+            <a:xfrm>
+              <a:off x="5615771" y="927275"/>
+              <a:ext cx="2856704" cy="1646694"/>
+            </a:xfrm>
+            <a:prstGeom prst="rect">
+              <a:avLst/>
+            </a:prstGeom>
+          </p:spPr>
+        </p:pic>
+        <p:sp>
+          <p:nvSpPr>
+            <p:cNvPr id="32" name="Rectangle : coins arrondis 11">
+              <a:extLst>
+                <a:ext uri="{FF2B5EF4-FFF2-40B4-BE49-F238E27FC236}">
+                  <a16:creationId xmlns:a16="http://schemas.microsoft.com/office/drawing/2014/main" id="{189EE7B5-C046-BE83-10E7-BC50AF82B22C}"/>
+                </a:ext>
+              </a:extLst>
+            </p:cNvPr>
+            <p:cNvSpPr>
+              <a:spLocks/>
+            </p:cNvSpPr>
+            <p:nvPr/>
+          </p:nvSpPr>
+          <p:spPr>
+            <a:xfrm>
+              <a:off x="7190194" y="810407"/>
+              <a:ext cx="2556615" cy="652982"/>
+            </a:xfrm>
+            <a:prstGeom prst="roundRect">
+              <a:avLst/>
+            </a:prstGeom>
+            <a:solidFill>
+              <a:schemeClr val="accent1">
+                <a:alpha val="50196"/>
+              </a:schemeClr>
+            </a:solidFill>
+            <a:ln>
+              <a:noFill/>
+            </a:ln>
+          </p:spPr>
+          <p:style>
+            <a:lnRef idx="2">
+              <a:schemeClr val="accent1">
+                <a:shade val="15000"/>
+              </a:schemeClr>
+            </a:lnRef>
+            <a:fillRef idx="1">
+              <a:schemeClr val="accent1"/>
+            </a:fillRef>
+            <a:effectRef idx="0">
+              <a:schemeClr val="accent1"/>
+            </a:effectRef>
+            <a:fontRef idx="minor">
+              <a:schemeClr val="lt1"/>
+            </a:fontRef>
+          </p:style>
+          <p:txBody>
+            <a:bodyPr rtlCol="0" anchor="ctr"/>
+            <a:lstStyle/>
+            <a:p>
+              <a:pPr algn="ctr"/>
+              <a:r>
+                <a:rPr lang="en-CA" b="1" noProof="0" dirty="0">
+                  <a:latin typeface="Avenir Next LT Pro" panose="020B0504020202020204" pitchFamily="34" charset="77"/>
+                </a:rPr>
+                <a:t>Hibernation➘</a:t>
+              </a:r>
+              <a:endParaRPr lang="en-CA" b="1" noProof="0" dirty="0">
+                <a:latin typeface="Avenir Next LT Pro" panose="020B0504020202020204" pitchFamily="34" charset="77"/>
+                <a:ea typeface="Cambria Math" panose="02040503050406030204" pitchFamily="18" charset="0"/>
+              </a:endParaRPr>
+            </a:p>
+          </p:txBody>
+        </p:sp>
+      </p:grpSp>
+      <p:cxnSp>
+        <p:nvCxnSpPr>
+          <p:cNvPr id="28" name="Connecteur en arc 18">
+            <a:extLst>
+              <a:ext uri="{FF2B5EF4-FFF2-40B4-BE49-F238E27FC236}">
+                <a16:creationId xmlns:a16="http://schemas.microsoft.com/office/drawing/2014/main" id="{EEA7876A-6FBE-659D-5F0F-6359652506C1}"/>
+              </a:ext>
+            </a:extLst>
+          </p:cNvPr>
+          <p:cNvCxnSpPr>
+            <a:cxnSpLocks/>
+            <a:stCxn id="16" idx="3"/>
+            <a:endCxn id="30" idx="1"/>
+          </p:cNvCxnSpPr>
+          <p:nvPr/>
+        </p:nvCxnSpPr>
+        <p:spPr>
+          <a:xfrm flipV="1">
+            <a:off x="3657599" y="410372"/>
+            <a:ext cx="685796" cy="773689"/>
+          </a:xfrm>
+          <a:prstGeom prst="curvedConnector3">
+            <a:avLst>
+              <a:gd name="adj1" fmla="val 50000"/>
+            </a:avLst>
+          </a:prstGeom>
+          <a:ln w="38100">
+            <a:solidFill>
+              <a:schemeClr val="accent1"/>
+            </a:solidFill>
+            <a:headEnd type="none" w="med" len="med"/>
+            <a:tailEnd type="triangle" w="med" len="med"/>
+          </a:ln>
+        </p:spPr>
+        <p:style>
+          <a:lnRef idx="1">
+            <a:schemeClr val="accent1"/>
+          </a:lnRef>
+          <a:fillRef idx="0">
+            <a:schemeClr val="accent1"/>
+          </a:fillRef>
+          <a:effectRef idx="0">
+            <a:schemeClr val="accent1"/>
+          </a:effectRef>
+          <a:fontRef idx="minor">
+            <a:schemeClr val="tx1"/>
+          </a:fontRef>
+        </p:style>
+      </p:cxnSp>
+      <p:sp>
+        <p:nvSpPr>
+          <p:cNvPr id="29" name="Forme libre 28">
+            <a:extLst>
+              <a:ext uri="{FF2B5EF4-FFF2-40B4-BE49-F238E27FC236}">
+                <a16:creationId xmlns:a16="http://schemas.microsoft.com/office/drawing/2014/main" id="{DDFCE017-54BD-B6B3-1FEA-EC253649F637}"/>
+              </a:ext>
+            </a:extLst>
+          </p:cNvPr>
+          <p:cNvSpPr/>
+          <p:nvPr/>
+        </p:nvSpPr>
+        <p:spPr>
+          <a:xfrm>
+            <a:off x="6215715" y="1239031"/>
+            <a:ext cx="780450" cy="771912"/>
+          </a:xfrm>
+          <a:custGeom>
+            <a:avLst/>
+            <a:gdLst>
+              <a:gd name="connsiteX0" fmla="*/ 0 w 573206"/>
+              <a:gd name="connsiteY0" fmla="*/ 0 h 887105"/>
+              <a:gd name="connsiteX1" fmla="*/ 477671 w 573206"/>
+              <a:gd name="connsiteY1" fmla="*/ 368490 h 887105"/>
+              <a:gd name="connsiteX2" fmla="*/ 573206 w 573206"/>
+              <a:gd name="connsiteY2" fmla="*/ 887105 h 887105"/>
+            </a:gdLst>
+            <a:ahLst/>
+            <a:cxnLst>
+              <a:cxn ang="0">
+                <a:pos x="connsiteX0" y="connsiteY0"/>
+              </a:cxn>
+              <a:cxn ang="0">
+                <a:pos x="connsiteX1" y="connsiteY1"/>
+              </a:cxn>
+              <a:cxn ang="0">
+                <a:pos x="connsiteX2" y="connsiteY2"/>
+              </a:cxn>
+            </a:cxnLst>
+            <a:rect l="l" t="t" r="r" b="b"/>
+            <a:pathLst>
+              <a:path w="573206" h="887105">
+                <a:moveTo>
+                  <a:pt x="0" y="0"/>
+                </a:moveTo>
+                <a:cubicBezTo>
+                  <a:pt x="191068" y="110319"/>
+                  <a:pt x="382137" y="220639"/>
+                  <a:pt x="477671" y="368490"/>
+                </a:cubicBezTo>
+                <a:cubicBezTo>
+                  <a:pt x="573205" y="516341"/>
+                  <a:pt x="573205" y="701723"/>
+                  <a:pt x="573206" y="887105"/>
+                </a:cubicBezTo>
+              </a:path>
+            </a:pathLst>
+          </a:custGeom>
+          <a:noFill/>
+          <a:ln w="38100">
+            <a:solidFill>
+              <a:schemeClr val="accent1"/>
+            </a:solidFill>
+            <a:headEnd type="none" w="med" len="med"/>
+            <a:tailEnd type="triangle" w="med" len="med"/>
+            <a:extLst>
+              <a:ext uri="{C807C97D-BFC1-408E-A445-0C87EB9F89A2}">
+                <ask:lineSketchStyleProps xmlns:ask="http://schemas.microsoft.com/office/drawing/2018/sketchyshapes" sd="1219033472">
+                  <a:custGeom>
+                    <a:avLst/>
+                    <a:gdLst>
+                      <a:gd name="connsiteX0" fmla="*/ 0 w 573206"/>
+                      <a:gd name="connsiteY0" fmla="*/ 0 h 887105"/>
+                      <a:gd name="connsiteX1" fmla="*/ 477671 w 573206"/>
+                      <a:gd name="connsiteY1" fmla="*/ 368490 h 887105"/>
+                      <a:gd name="connsiteX2" fmla="*/ 573206 w 573206"/>
+                      <a:gd name="connsiteY2" fmla="*/ 887105 h 887105"/>
+                    </a:gdLst>
+                    <a:ahLst/>
+                    <a:cxnLst>
+                      <a:cxn ang="0">
+                        <a:pos x="connsiteX0" y="connsiteY0"/>
+                      </a:cxn>
+                      <a:cxn ang="0">
+                        <a:pos x="connsiteX1" y="connsiteY1"/>
+                      </a:cxn>
+                      <a:cxn ang="0">
+                        <a:pos x="connsiteX2" y="connsiteY2"/>
+                      </a:cxn>
+                    </a:cxnLst>
+                    <a:rect l="l" t="t" r="r" b="b"/>
+                    <a:pathLst>
+                      <a:path w="573206" h="887105" extrusionOk="0">
+                        <a:moveTo>
+                          <a:pt x="0" y="0"/>
+                        </a:moveTo>
+                        <a:cubicBezTo>
+                          <a:pt x="166656" y="95261"/>
+                          <a:pt x="363541" y="227618"/>
+                          <a:pt x="477671" y="368490"/>
+                        </a:cubicBezTo>
+                        <a:cubicBezTo>
+                          <a:pt x="586088" y="519053"/>
+                          <a:pt x="553187" y="702360"/>
+                          <a:pt x="573206" y="887105"/>
+                        </a:cubicBezTo>
+                      </a:path>
+                    </a:pathLst>
+                  </a:custGeom>
+                  <ask:type>
+                    <ask:lineSketchNone/>
+                  </ask:type>
+                </ask:lineSketchStyleProps>
+              </a:ext>
+            </a:extLst>
+          </a:ln>
+        </p:spPr>
+        <p:style>
+          <a:lnRef idx="2">
+            <a:schemeClr val="accent1">
+              <a:shade val="15000"/>
+            </a:schemeClr>
+          </a:lnRef>
+          <a:fillRef idx="1">
+            <a:schemeClr val="accent1"/>
+          </a:fillRef>
+          <a:effectRef idx="0">
+            <a:schemeClr val="accent1"/>
+          </a:effectRef>
+          <a:fontRef idx="minor">
+            <a:schemeClr val="lt1"/>
+          </a:fontRef>
+        </p:style>
+        <p:txBody>
+          <a:bodyPr rtlCol="0" anchor="ctr"/>
+          <a:lstStyle/>
+          <a:p>
+            <a:pPr algn="ctr"/>
+            <a:endParaRPr lang="en-CA" sz="1050" noProof="0" dirty="0"/>
+          </a:p>
+        </p:txBody>
+      </p:sp>
+      <p:sp>
+        <p:nvSpPr>
+          <p:cNvPr id="7" name="Freeform 6">
+            <a:extLst>
+              <a:ext uri="{FF2B5EF4-FFF2-40B4-BE49-F238E27FC236}">
+                <a16:creationId xmlns:a16="http://schemas.microsoft.com/office/drawing/2014/main" id="{A9B35425-4F6B-96F0-385C-2011FA5A72D4}"/>
+              </a:ext>
+            </a:extLst>
+          </p:cNvPr>
+          <p:cNvSpPr/>
+          <p:nvPr/>
+        </p:nvSpPr>
+        <p:spPr>
+          <a:xfrm>
+            <a:off x="2063716" y="3330184"/>
+            <a:ext cx="1208483" cy="98816"/>
+          </a:xfrm>
+          <a:custGeom>
+            <a:avLst/>
+            <a:gdLst>
+              <a:gd name="connsiteX0" fmla="*/ 0 w 1727200"/>
+              <a:gd name="connsiteY0" fmla="*/ 0 h 783771"/>
+              <a:gd name="connsiteX1" fmla="*/ 333829 w 1727200"/>
+              <a:gd name="connsiteY1" fmla="*/ 290286 h 783771"/>
+              <a:gd name="connsiteX2" fmla="*/ 1161143 w 1727200"/>
+              <a:gd name="connsiteY2" fmla="*/ 638628 h 783771"/>
+              <a:gd name="connsiteX3" fmla="*/ 1727200 w 1727200"/>
+              <a:gd name="connsiteY3" fmla="*/ 783771 h 783771"/>
+            </a:gdLst>
+            <a:ahLst/>
+            <a:cxnLst>
+              <a:cxn ang="0">
+                <a:pos x="connsiteX0" y="connsiteY0"/>
+              </a:cxn>
+              <a:cxn ang="0">
+                <a:pos x="connsiteX1" y="connsiteY1"/>
+              </a:cxn>
+              <a:cxn ang="0">
+                <a:pos x="connsiteX2" y="connsiteY2"/>
+              </a:cxn>
+              <a:cxn ang="0">
+                <a:pos x="connsiteX3" y="connsiteY3"/>
+              </a:cxn>
+            </a:cxnLst>
+            <a:rect l="l" t="t" r="r" b="b"/>
+            <a:pathLst>
+              <a:path w="1727200" h="783771">
+                <a:moveTo>
+                  <a:pt x="0" y="0"/>
+                </a:moveTo>
+                <a:cubicBezTo>
+                  <a:pt x="70152" y="91924"/>
+                  <a:pt x="140305" y="183848"/>
+                  <a:pt x="333829" y="290286"/>
+                </a:cubicBezTo>
+                <a:cubicBezTo>
+                  <a:pt x="527353" y="396724"/>
+                  <a:pt x="928915" y="556381"/>
+                  <a:pt x="1161143" y="638628"/>
+                </a:cubicBezTo>
+                <a:cubicBezTo>
+                  <a:pt x="1393371" y="720875"/>
+                  <a:pt x="1560285" y="752323"/>
+                  <a:pt x="1727200" y="783771"/>
+                </a:cubicBezTo>
+              </a:path>
+            </a:pathLst>
+          </a:custGeom>
+          <a:noFill/>
+          <a:ln w="38100">
+            <a:solidFill>
+              <a:schemeClr val="accent6"/>
+            </a:solidFill>
+            <a:tailEnd type="triangle"/>
+          </a:ln>
+        </p:spPr>
+        <p:style>
+          <a:lnRef idx="2">
+            <a:schemeClr val="accent1">
+              <a:shade val="15000"/>
+            </a:schemeClr>
+          </a:lnRef>
+          <a:fillRef idx="1">
+            <a:schemeClr val="accent1"/>
+          </a:fillRef>
+          <a:effectRef idx="0">
+            <a:schemeClr val="accent1"/>
+          </a:effectRef>
+          <a:fontRef idx="minor">
+            <a:schemeClr val="lt1"/>
+          </a:fontRef>
+        </p:style>
+        <p:txBody>
+          <a:bodyPr rtlCol="0" anchor="ctr"/>
+          <a:lstStyle/>
+          <a:p>
+            <a:pPr algn="ctr"/>
+            <a:endParaRPr lang="en-CA" noProof="0" dirty="0"/>
+          </a:p>
+        </p:txBody>
+      </p:sp>
+      <p:sp>
+        <p:nvSpPr>
+          <p:cNvPr id="10" name="Freeform 9">
+            <a:extLst>
+              <a:ext uri="{FF2B5EF4-FFF2-40B4-BE49-F238E27FC236}">
+                <a16:creationId xmlns:a16="http://schemas.microsoft.com/office/drawing/2014/main" id="{ACFCBD95-08CD-E337-2D1D-58EC615A95E5}"/>
+              </a:ext>
+            </a:extLst>
+          </p:cNvPr>
+          <p:cNvSpPr/>
+          <p:nvPr/>
+        </p:nvSpPr>
+        <p:spPr>
+          <a:xfrm>
+            <a:off x="8284158" y="3514136"/>
+            <a:ext cx="919726" cy="67899"/>
+          </a:xfrm>
+          <a:custGeom>
+            <a:avLst/>
+            <a:gdLst>
+              <a:gd name="connsiteX0" fmla="*/ 0 w 2583542"/>
+              <a:gd name="connsiteY0" fmla="*/ 58057 h 58057"/>
+              <a:gd name="connsiteX1" fmla="*/ 1930400 w 2583542"/>
+              <a:gd name="connsiteY1" fmla="*/ 14515 h 58057"/>
+              <a:gd name="connsiteX2" fmla="*/ 2583542 w 2583542"/>
+              <a:gd name="connsiteY2" fmla="*/ 0 h 58057"/>
+            </a:gdLst>
+            <a:ahLst/>
+            <a:cxnLst>
+              <a:cxn ang="0">
+                <a:pos x="connsiteX0" y="connsiteY0"/>
+              </a:cxn>
+              <a:cxn ang="0">
+                <a:pos x="connsiteX1" y="connsiteY1"/>
+              </a:cxn>
+              <a:cxn ang="0">
+                <a:pos x="connsiteX2" y="connsiteY2"/>
+              </a:cxn>
+            </a:cxnLst>
+            <a:rect l="l" t="t" r="r" b="b"/>
+            <a:pathLst>
+              <a:path w="2583542" h="58057">
+                <a:moveTo>
+                  <a:pt x="0" y="58057"/>
+                </a:moveTo>
+                <a:lnTo>
+                  <a:pt x="1930400" y="14515"/>
+                </a:lnTo>
+                <a:lnTo>
+                  <a:pt x="2583542" y="0"/>
+                </a:lnTo>
+              </a:path>
+            </a:pathLst>
+          </a:custGeom>
+          <a:noFill/>
+          <a:ln w="57150">
+            <a:solidFill>
+              <a:srgbClr val="FF0000"/>
+            </a:solidFill>
+            <a:tailEnd type="triangle"/>
+          </a:ln>
+        </p:spPr>
+        <p:style>
+          <a:lnRef idx="2">
+            <a:schemeClr val="accent1">
+              <a:shade val="15000"/>
+            </a:schemeClr>
+          </a:lnRef>
+          <a:fillRef idx="1">
+            <a:schemeClr val="accent1"/>
+          </a:fillRef>
+          <a:effectRef idx="0">
+            <a:schemeClr val="accent1"/>
+          </a:effectRef>
+          <a:fontRef idx="minor">
+            <a:schemeClr val="lt1"/>
+          </a:fontRef>
+        </p:style>
+        <p:txBody>
+          <a:bodyPr rtlCol="0" anchor="ctr"/>
+          <a:lstStyle/>
+          <a:p>
+            <a:pPr algn="ctr"/>
+            <a:endParaRPr lang="en-CA" noProof="0" dirty="0"/>
+          </a:p>
+        </p:txBody>
+      </p:sp>
+      <p:sp>
+        <p:nvSpPr>
+          <p:cNvPr id="12" name="Rectangle : coins arrondis 23">
+            <a:extLst>
+              <a:ext uri="{FF2B5EF4-FFF2-40B4-BE49-F238E27FC236}">
+                <a16:creationId xmlns:a16="http://schemas.microsoft.com/office/drawing/2014/main" id="{7B330AC8-5009-4469-AD65-B866919B6CA5}"/>
+              </a:ext>
+            </a:extLst>
+          </p:cNvPr>
+          <p:cNvSpPr>
+            <a:spLocks noChangeAspect="1"/>
+          </p:cNvSpPr>
+          <p:nvPr/>
+        </p:nvSpPr>
+        <p:spPr>
+          <a:xfrm>
+            <a:off x="9203883" y="3234681"/>
+            <a:ext cx="1791333" cy="449845"/>
+          </a:xfrm>
+          <a:prstGeom prst="roundRect">
+            <a:avLst/>
+          </a:prstGeom>
+          <a:solidFill>
+            <a:srgbClr val="FF0000">
+              <a:alpha val="50196"/>
+            </a:srgbClr>
+          </a:solidFill>
+          <a:ln>
+            <a:noFill/>
+          </a:ln>
+        </p:spPr>
+        <p:style>
+          <a:lnRef idx="2">
+            <a:schemeClr val="accent1">
+              <a:shade val="15000"/>
+            </a:schemeClr>
+          </a:lnRef>
+          <a:fillRef idx="1">
+            <a:schemeClr val="accent1"/>
+          </a:fillRef>
+          <a:effectRef idx="0">
+            <a:schemeClr val="accent1"/>
+          </a:effectRef>
+          <a:fontRef idx="minor">
+            <a:schemeClr val="lt1"/>
+          </a:fontRef>
+        </p:style>
+        <p:txBody>
+          <a:bodyPr rtlCol="0" anchor="ctr"/>
+          <a:lstStyle/>
+          <a:p>
+            <a:pPr algn="ctr"/>
+            <a:r>
+              <a:rPr lang="en-CA" sz="2800" b="1" noProof="0" dirty="0">
+                <a:latin typeface="Avenir Next LT Pro" panose="020B0504020202020204" pitchFamily="34" charset="77"/>
+              </a:rPr>
+              <a:t>Behavior</a:t>
+            </a:r>
+            <a:endParaRPr lang="en-CA" sz="2000" b="1" noProof="0" dirty="0"/>
+          </a:p>
+        </p:txBody>
+      </p:sp>
+      <p:sp>
+        <p:nvSpPr>
+          <p:cNvPr id="33" name="Rectangle : coins arrondis 13">
+            <a:extLst>
+              <a:ext uri="{FF2B5EF4-FFF2-40B4-BE49-F238E27FC236}">
+                <a16:creationId xmlns:a16="http://schemas.microsoft.com/office/drawing/2014/main" id="{CFEA216C-02A1-501B-8DCB-605770E32393}"/>
+              </a:ext>
+            </a:extLst>
+          </p:cNvPr>
+          <p:cNvSpPr>
+            <a:spLocks/>
+          </p:cNvSpPr>
+          <p:nvPr/>
+        </p:nvSpPr>
+        <p:spPr>
+          <a:xfrm>
+            <a:off x="4021763" y="4936387"/>
+            <a:ext cx="3024000" cy="748419"/>
+          </a:xfrm>
+          <a:prstGeom prst="roundRect">
+            <a:avLst/>
+          </a:prstGeom>
+          <a:solidFill>
+            <a:srgbClr val="7030A0">
+              <a:alpha val="50196"/>
+            </a:srgbClr>
+          </a:solidFill>
+          <a:ln>
+            <a:noFill/>
+          </a:ln>
+        </p:spPr>
+        <p:style>
+          <a:lnRef idx="2">
+            <a:schemeClr val="accent1">
+              <a:shade val="15000"/>
+            </a:schemeClr>
+          </a:lnRef>
+          <a:fillRef idx="1">
+            <a:schemeClr val="accent1"/>
+          </a:fillRef>
+          <a:effectRef idx="0">
+            <a:schemeClr val="accent1"/>
+          </a:effectRef>
+          <a:fontRef idx="minor">
+            <a:schemeClr val="lt1"/>
+          </a:fontRef>
+        </p:style>
+        <p:txBody>
+          <a:bodyPr rtlCol="0" anchor="ctr"/>
+          <a:lstStyle/>
+          <a:p>
+            <a:pPr algn="ctr"/>
+            <a:r>
+              <a:rPr lang="en-CA" sz="2000" b="1" noProof="0" dirty="0">
+                <a:latin typeface="Avenir Next LT Pro" panose="020B0504020202020204" pitchFamily="34" charset="77"/>
+              </a:rPr>
+              <a:t>Mass at the beginning of the active season</a:t>
+            </a:r>
+            <a:endParaRPr lang="en-CA" sz="2000" b="1" noProof="0" dirty="0">
+              <a:latin typeface="Avenir Next LT Pro" panose="020B0504020202020204" pitchFamily="34" charset="77"/>
+              <a:ea typeface="Cambria Math" panose="02040503050406030204" pitchFamily="18" charset="0"/>
+            </a:endParaRPr>
+          </a:p>
+        </p:txBody>
+      </p:sp>
+      <p:sp>
+        <p:nvSpPr>
+          <p:cNvPr id="36" name="Freeform 35">
+            <a:extLst>
+              <a:ext uri="{FF2B5EF4-FFF2-40B4-BE49-F238E27FC236}">
+                <a16:creationId xmlns:a16="http://schemas.microsoft.com/office/drawing/2014/main" id="{4E15B444-78D8-E745-49D7-DE11930C880C}"/>
+              </a:ext>
+            </a:extLst>
+          </p:cNvPr>
+          <p:cNvSpPr/>
+          <p:nvPr/>
+        </p:nvSpPr>
+        <p:spPr>
+          <a:xfrm>
+            <a:off x="6215715" y="4059378"/>
+            <a:ext cx="530884" cy="805310"/>
+          </a:xfrm>
+          <a:custGeom>
+            <a:avLst/>
+            <a:gdLst>
+              <a:gd name="connsiteX0" fmla="*/ 70039 w 890654"/>
+              <a:gd name="connsiteY0" fmla="*/ 890954 h 890954"/>
+              <a:gd name="connsiteX1" fmla="*/ 81762 w 890654"/>
+              <a:gd name="connsiteY1" fmla="*/ 550985 h 890954"/>
+              <a:gd name="connsiteX2" fmla="*/ 890654 w 890654"/>
+              <a:gd name="connsiteY2" fmla="*/ 0 h 890954"/>
+            </a:gdLst>
+            <a:ahLst/>
+            <a:cxnLst>
+              <a:cxn ang="0">
+                <a:pos x="connsiteX0" y="connsiteY0"/>
+              </a:cxn>
+              <a:cxn ang="0">
+                <a:pos x="connsiteX1" y="connsiteY1"/>
+              </a:cxn>
+              <a:cxn ang="0">
+                <a:pos x="connsiteX2" y="connsiteY2"/>
+              </a:cxn>
+            </a:cxnLst>
+            <a:rect l="l" t="t" r="r" b="b"/>
+            <a:pathLst>
+              <a:path w="890654" h="890954">
+                <a:moveTo>
+                  <a:pt x="70039" y="890954"/>
+                </a:moveTo>
+                <a:cubicBezTo>
+                  <a:pt x="7516" y="795215"/>
+                  <a:pt x="-55007" y="699477"/>
+                  <a:pt x="81762" y="550985"/>
+                </a:cubicBezTo>
+                <a:cubicBezTo>
+                  <a:pt x="218531" y="402493"/>
+                  <a:pt x="554592" y="201246"/>
+                  <a:pt x="890654" y="0"/>
+                </a:cubicBezTo>
+              </a:path>
+            </a:pathLst>
+          </a:custGeom>
+          <a:noFill/>
+          <a:ln w="38100">
+            <a:solidFill>
+              <a:srgbClr val="7030A0"/>
+            </a:solidFill>
+            <a:prstDash val="dash"/>
+            <a:headEnd type="none" w="med" len="med"/>
+            <a:tailEnd type="triangle" w="med" len="med"/>
+          </a:ln>
+        </p:spPr>
+        <p:style>
+          <a:lnRef idx="2">
+            <a:schemeClr val="accent1">
+              <a:shade val="15000"/>
+            </a:schemeClr>
+          </a:lnRef>
+          <a:fillRef idx="1">
+            <a:schemeClr val="accent1"/>
+          </a:fillRef>
+          <a:effectRef idx="0">
+            <a:schemeClr val="accent1"/>
+          </a:effectRef>
+          <a:fontRef idx="minor">
+            <a:schemeClr val="lt1"/>
+          </a:fontRef>
+        </p:style>
+        <p:txBody>
+          <a:bodyPr rtlCol="0" anchor="ctr"/>
+          <a:lstStyle/>
+          <a:p>
+            <a:pPr algn="ctr"/>
+            <a:endParaRPr lang="en-CA" noProof="0" dirty="0"/>
+          </a:p>
+        </p:txBody>
+      </p:sp>
+      <p:sp>
+        <p:nvSpPr>
+          <p:cNvPr id="38" name="Freeform 37">
+            <a:extLst>
+              <a:ext uri="{FF2B5EF4-FFF2-40B4-BE49-F238E27FC236}">
+                <a16:creationId xmlns:a16="http://schemas.microsoft.com/office/drawing/2014/main" id="{36B309E7-144C-0817-0109-389F419E3307}"/>
+              </a:ext>
+            </a:extLst>
+          </p:cNvPr>
+          <p:cNvSpPr/>
+          <p:nvPr/>
+        </p:nvSpPr>
+        <p:spPr>
+          <a:xfrm>
+            <a:off x="7480002" y="4046954"/>
+            <a:ext cx="610988" cy="817734"/>
+          </a:xfrm>
+          <a:custGeom>
+            <a:avLst/>
+            <a:gdLst>
+              <a:gd name="connsiteX0" fmla="*/ 574430 w 750159"/>
+              <a:gd name="connsiteY0" fmla="*/ 879230 h 879230"/>
+              <a:gd name="connsiteX1" fmla="*/ 715107 w 750159"/>
+              <a:gd name="connsiteY1" fmla="*/ 621323 h 879230"/>
+              <a:gd name="connsiteX2" fmla="*/ 0 w 750159"/>
+              <a:gd name="connsiteY2" fmla="*/ 0 h 879230"/>
+            </a:gdLst>
+            <a:ahLst/>
+            <a:cxnLst>
+              <a:cxn ang="0">
+                <a:pos x="connsiteX0" y="connsiteY0"/>
+              </a:cxn>
+              <a:cxn ang="0">
+                <a:pos x="connsiteX1" y="connsiteY1"/>
+              </a:cxn>
+              <a:cxn ang="0">
+                <a:pos x="connsiteX2" y="connsiteY2"/>
+              </a:cxn>
+            </a:cxnLst>
+            <a:rect l="l" t="t" r="r" b="b"/>
+            <a:pathLst>
+              <a:path w="750159" h="879230">
+                <a:moveTo>
+                  <a:pt x="574430" y="879230"/>
+                </a:moveTo>
+                <a:cubicBezTo>
+                  <a:pt x="692637" y="823545"/>
+                  <a:pt x="810845" y="767861"/>
+                  <a:pt x="715107" y="621323"/>
+                </a:cubicBezTo>
+                <a:cubicBezTo>
+                  <a:pt x="619369" y="474785"/>
+                  <a:pt x="309684" y="237392"/>
+                  <a:pt x="0" y="0"/>
+                </a:cubicBezTo>
+              </a:path>
+            </a:pathLst>
+          </a:custGeom>
+          <a:noFill/>
+          <a:ln w="38100">
+            <a:solidFill>
+              <a:srgbClr val="7030A0"/>
+            </a:solidFill>
+            <a:prstDash val="dash"/>
+            <a:headEnd type="none" w="med" len="med"/>
+            <a:tailEnd type="triangle" w="med" len="med"/>
+          </a:ln>
+        </p:spPr>
+        <p:style>
+          <a:lnRef idx="2">
+            <a:schemeClr val="accent1">
+              <a:shade val="15000"/>
+            </a:schemeClr>
+          </a:lnRef>
+          <a:fillRef idx="1">
+            <a:schemeClr val="accent1"/>
+          </a:fillRef>
+          <a:effectRef idx="0">
+            <a:schemeClr val="accent1"/>
+          </a:effectRef>
+          <a:fontRef idx="minor">
+            <a:schemeClr val="lt1"/>
+          </a:fontRef>
+        </p:style>
+        <p:txBody>
+          <a:bodyPr rtlCol="0" anchor="ctr"/>
+          <a:lstStyle/>
+          <a:p>
+            <a:pPr algn="ctr"/>
+            <a:endParaRPr lang="en-CA" noProof="0" dirty="0"/>
+          </a:p>
+        </p:txBody>
+      </p:sp>
+      <p:sp>
+        <p:nvSpPr>
+          <p:cNvPr id="39" name="TextBox 38">
+            <a:extLst>
+              <a:ext uri="{FF2B5EF4-FFF2-40B4-BE49-F238E27FC236}">
+                <a16:creationId xmlns:a16="http://schemas.microsoft.com/office/drawing/2014/main" id="{1FA7F22D-788C-EC7F-AF71-89B380AC1CE0}"/>
+              </a:ext>
+            </a:extLst>
+          </p:cNvPr>
+          <p:cNvSpPr txBox="1"/>
+          <p:nvPr/>
+        </p:nvSpPr>
+        <p:spPr>
+          <a:xfrm>
+            <a:off x="127043" y="4738746"/>
+            <a:ext cx="1776448" cy="584775"/>
+          </a:xfrm>
+          <a:prstGeom prst="rect">
+            <a:avLst/>
+          </a:prstGeom>
+          <a:noFill/>
+          <a:ln>
+            <a:solidFill>
+              <a:schemeClr val="accent6"/>
+            </a:solidFill>
+          </a:ln>
+        </p:spPr>
+        <p:txBody>
+          <a:bodyPr wrap="none" rtlCol="0">
+            <a:spAutoFit/>
+          </a:bodyPr>
+          <a:lstStyle/>
+          <a:p>
+            <a:r>
+              <a:rPr lang="en-CA" sz="3200" b="1" i="1" noProof="0" dirty="0">
+                <a:solidFill>
+                  <a:schemeClr val="accent6"/>
+                </a:solidFill>
+                <a:latin typeface="Avenir Next LT Pro" panose="020B0504020202020204" pitchFamily="34" charset="77"/>
+              </a:rPr>
+              <a:t>Triggers</a:t>
+            </a:r>
+          </a:p>
+        </p:txBody>
+      </p:sp>
+      <p:sp>
+        <p:nvSpPr>
+          <p:cNvPr id="40" name="TextBox 39">
+            <a:extLst>
+              <a:ext uri="{FF2B5EF4-FFF2-40B4-BE49-F238E27FC236}">
+                <a16:creationId xmlns:a16="http://schemas.microsoft.com/office/drawing/2014/main" id="{A40F3437-BA92-3E85-ABE3-C734E7F3D759}"/>
+              </a:ext>
+            </a:extLst>
+          </p:cNvPr>
+          <p:cNvSpPr txBox="1"/>
+          <p:nvPr/>
+        </p:nvSpPr>
+        <p:spPr>
+          <a:xfrm>
+            <a:off x="3720283" y="4024745"/>
+            <a:ext cx="1975797" cy="584775"/>
+          </a:xfrm>
+          <a:prstGeom prst="rect">
+            <a:avLst/>
+          </a:prstGeom>
+          <a:noFill/>
+          <a:ln>
+            <a:solidFill>
+              <a:srgbClr val="7030A0"/>
+            </a:solidFill>
+          </a:ln>
+        </p:spPr>
+        <p:txBody>
+          <a:bodyPr wrap="none" rtlCol="0">
+            <a:spAutoFit/>
+          </a:bodyPr>
+          <a:lstStyle/>
+          <a:p>
+            <a:r>
+              <a:rPr lang="en-CA" sz="3200" b="1" i="1" noProof="0" dirty="0">
+                <a:solidFill>
+                  <a:srgbClr val="7030A0"/>
+                </a:solidFill>
+                <a:latin typeface="Avenir Next LT Pro" panose="020B0504020202020204" pitchFamily="34" charset="77"/>
+              </a:rPr>
+              <a:t>Structure</a:t>
+            </a:r>
+          </a:p>
+        </p:txBody>
+      </p:sp>
+      <p:sp>
+        <p:nvSpPr>
+          <p:cNvPr id="41" name="TextBox 40">
+            <a:extLst>
+              <a:ext uri="{FF2B5EF4-FFF2-40B4-BE49-F238E27FC236}">
+                <a16:creationId xmlns:a16="http://schemas.microsoft.com/office/drawing/2014/main" id="{CC60B4C6-8BBA-4228-E184-68F6011243D7}"/>
+              </a:ext>
+            </a:extLst>
+          </p:cNvPr>
+          <p:cNvSpPr txBox="1"/>
+          <p:nvPr/>
+        </p:nvSpPr>
+        <p:spPr>
+          <a:xfrm>
+            <a:off x="8920941" y="3950814"/>
+            <a:ext cx="2605970" cy="584775"/>
+          </a:xfrm>
+          <a:prstGeom prst="rect">
+            <a:avLst/>
+          </a:prstGeom>
+          <a:noFill/>
+          <a:ln>
+            <a:solidFill>
+              <a:srgbClr val="FF0000"/>
+            </a:solidFill>
+          </a:ln>
+        </p:spPr>
+        <p:txBody>
+          <a:bodyPr wrap="none" rtlCol="0">
+            <a:spAutoFit/>
+          </a:bodyPr>
+          <a:lstStyle/>
+          <a:p>
+            <a:r>
+              <a:rPr lang="en-CA" sz="3200" b="1" i="1" noProof="0" dirty="0">
+                <a:solidFill>
+                  <a:srgbClr val="FF0000"/>
+                </a:solidFill>
+                <a:latin typeface="Avenir Next LT Pro" panose="020B0504020202020204" pitchFamily="34" charset="77"/>
+              </a:rPr>
+              <a:t>Implications</a:t>
+            </a:r>
+          </a:p>
+        </p:txBody>
+      </p:sp>
+      <p:sp>
+        <p:nvSpPr>
+          <p:cNvPr id="44" name="Rectangle : coins arrondis 13">
+            <a:extLst>
+              <a:ext uri="{FF2B5EF4-FFF2-40B4-BE49-F238E27FC236}">
+                <a16:creationId xmlns:a16="http://schemas.microsoft.com/office/drawing/2014/main" id="{D1358C38-884C-1AEF-6860-E95FE1C61F30}"/>
+              </a:ext>
+            </a:extLst>
+          </p:cNvPr>
+          <p:cNvSpPr>
+            <a:spLocks/>
+          </p:cNvSpPr>
+          <p:nvPr/>
+        </p:nvSpPr>
+        <p:spPr>
+          <a:xfrm>
+            <a:off x="7088667" y="4931943"/>
+            <a:ext cx="3024000" cy="748419"/>
+          </a:xfrm>
+          <a:prstGeom prst="roundRect">
+            <a:avLst/>
+          </a:prstGeom>
+          <a:solidFill>
+            <a:srgbClr val="7030A0">
+              <a:alpha val="50196"/>
+            </a:srgbClr>
+          </a:solidFill>
+          <a:ln>
+            <a:noFill/>
+          </a:ln>
+        </p:spPr>
+        <p:style>
+          <a:lnRef idx="2">
+            <a:schemeClr val="accent1">
+              <a:shade val="15000"/>
+            </a:schemeClr>
+          </a:lnRef>
+          <a:fillRef idx="1">
+            <a:schemeClr val="accent1"/>
+          </a:fillRef>
+          <a:effectRef idx="0">
+            <a:schemeClr val="accent1"/>
+          </a:effectRef>
+          <a:fontRef idx="minor">
+            <a:schemeClr val="lt1"/>
+          </a:fontRef>
+        </p:style>
+        <p:txBody>
+          <a:bodyPr rtlCol="0" anchor="ctr"/>
+          <a:lstStyle/>
+          <a:p>
+            <a:pPr algn="ctr"/>
+            <a:r>
+              <a:rPr lang="en-CA" sz="2000" b="1" noProof="0" dirty="0">
+                <a:latin typeface="Avenir Next LT Pro" panose="020B0504020202020204" pitchFamily="34" charset="77"/>
+              </a:rPr>
+              <a:t>Mass at the end of the active season</a:t>
+            </a:r>
+            <a:endParaRPr lang="en-CA" sz="2000" b="1" noProof="0" dirty="0">
+              <a:latin typeface="Avenir Next LT Pro" panose="020B0504020202020204" pitchFamily="34" charset="77"/>
+              <a:ea typeface="Cambria Math" panose="02040503050406030204" pitchFamily="18" charset="0"/>
+            </a:endParaRPr>
+          </a:p>
+        </p:txBody>
+      </p:sp>
+      <p:sp>
+        <p:nvSpPr>
+          <p:cNvPr id="2" name="Freeform 1">
+            <a:extLst>
+              <a:ext uri="{FF2B5EF4-FFF2-40B4-BE49-F238E27FC236}">
+                <a16:creationId xmlns:a16="http://schemas.microsoft.com/office/drawing/2014/main" id="{3C3F3041-F377-3616-543C-44E7FF006548}"/>
+              </a:ext>
+            </a:extLst>
+          </p:cNvPr>
+          <p:cNvSpPr/>
+          <p:nvPr/>
+        </p:nvSpPr>
+        <p:spPr>
+          <a:xfrm>
+            <a:off x="3863245" y="2487707"/>
+            <a:ext cx="45719" cy="617384"/>
+          </a:xfrm>
+          <a:custGeom>
+            <a:avLst/>
+            <a:gdLst>
+              <a:gd name="connsiteX0" fmla="*/ 9508 w 574284"/>
+              <a:gd name="connsiteY0" fmla="*/ 0 h 981635"/>
+              <a:gd name="connsiteX1" fmla="*/ 76743 w 574284"/>
+              <a:gd name="connsiteY1" fmla="*/ 806823 h 981635"/>
+              <a:gd name="connsiteX2" fmla="*/ 574284 w 574284"/>
+              <a:gd name="connsiteY2" fmla="*/ 981635 h 981635"/>
+            </a:gdLst>
+            <a:ahLst/>
+            <a:cxnLst>
+              <a:cxn ang="0">
+                <a:pos x="connsiteX0" y="connsiteY0"/>
+              </a:cxn>
+              <a:cxn ang="0">
+                <a:pos x="connsiteX1" y="connsiteY1"/>
+              </a:cxn>
+              <a:cxn ang="0">
+                <a:pos x="connsiteX2" y="connsiteY2"/>
+              </a:cxn>
+            </a:cxnLst>
+            <a:rect l="l" t="t" r="r" b="b"/>
+            <a:pathLst>
+              <a:path w="574284" h="981635">
+                <a:moveTo>
+                  <a:pt x="9508" y="0"/>
+                </a:moveTo>
+                <a:cubicBezTo>
+                  <a:pt x="-3939" y="321608"/>
+                  <a:pt x="-17386" y="643217"/>
+                  <a:pt x="76743" y="806823"/>
+                </a:cubicBezTo>
+                <a:cubicBezTo>
+                  <a:pt x="170872" y="970429"/>
+                  <a:pt x="372578" y="976032"/>
+                  <a:pt x="574284" y="981635"/>
+                </a:cubicBezTo>
+              </a:path>
+            </a:pathLst>
+          </a:custGeom>
+          <a:noFill/>
+          <a:ln w="38100">
+            <a:solidFill>
+              <a:schemeClr val="accent6"/>
+            </a:solidFill>
+            <a:headEnd type="none" w="med" len="med"/>
+            <a:tailEnd type="triangle" w="med" len="med"/>
+          </a:ln>
+        </p:spPr>
+        <p:style>
+          <a:lnRef idx="2">
+            <a:schemeClr val="accent1">
+              <a:shade val="15000"/>
+            </a:schemeClr>
+          </a:lnRef>
+          <a:fillRef idx="1">
+            <a:schemeClr val="accent1"/>
+          </a:fillRef>
+          <a:effectRef idx="0">
+            <a:schemeClr val="accent1"/>
+          </a:effectRef>
+          <a:fontRef idx="minor">
+            <a:schemeClr val="lt1"/>
+          </a:fontRef>
+        </p:style>
+        <p:txBody>
+          <a:bodyPr rtlCol="0" anchor="ctr"/>
+          <a:lstStyle/>
+          <a:p>
+            <a:pPr algn="ctr"/>
+            <a:endParaRPr lang="en-US"/>
+          </a:p>
+        </p:txBody>
+      </p:sp>
+      <p:sp>
+        <p:nvSpPr>
+          <p:cNvPr id="3" name="Freeform 2">
+            <a:extLst>
+              <a:ext uri="{FF2B5EF4-FFF2-40B4-BE49-F238E27FC236}">
+                <a16:creationId xmlns:a16="http://schemas.microsoft.com/office/drawing/2014/main" id="{7F32E579-46F5-FD3C-0428-E68CC61435EB}"/>
+              </a:ext>
+            </a:extLst>
+          </p:cNvPr>
+          <p:cNvSpPr/>
+          <p:nvPr/>
+        </p:nvSpPr>
+        <p:spPr>
+          <a:xfrm>
+            <a:off x="2411992" y="3783765"/>
+            <a:ext cx="1451253" cy="404619"/>
+          </a:xfrm>
+          <a:custGeom>
+            <a:avLst/>
+            <a:gdLst>
+              <a:gd name="connsiteX0" fmla="*/ 0 w 1963270"/>
+              <a:gd name="connsiteY0" fmla="*/ 524435 h 524435"/>
+              <a:gd name="connsiteX1" fmla="*/ 1223682 w 1963270"/>
+              <a:gd name="connsiteY1" fmla="*/ 309282 h 524435"/>
+              <a:gd name="connsiteX2" fmla="*/ 1963270 w 1963270"/>
+              <a:gd name="connsiteY2" fmla="*/ 0 h 524435"/>
+            </a:gdLst>
+            <a:ahLst/>
+            <a:cxnLst>
+              <a:cxn ang="0">
+                <a:pos x="connsiteX0" y="connsiteY0"/>
+              </a:cxn>
+              <a:cxn ang="0">
+                <a:pos x="connsiteX1" y="connsiteY1"/>
+              </a:cxn>
+              <a:cxn ang="0">
+                <a:pos x="connsiteX2" y="connsiteY2"/>
+              </a:cxn>
+            </a:cxnLst>
+            <a:rect l="l" t="t" r="r" b="b"/>
+            <a:pathLst>
+              <a:path w="1963270" h="524435">
+                <a:moveTo>
+                  <a:pt x="0" y="524435"/>
+                </a:moveTo>
+                <a:cubicBezTo>
+                  <a:pt x="448235" y="460561"/>
+                  <a:pt x="896470" y="396688"/>
+                  <a:pt x="1223682" y="309282"/>
+                </a:cubicBezTo>
+                <a:cubicBezTo>
+                  <a:pt x="1550894" y="221876"/>
+                  <a:pt x="1757082" y="110938"/>
+                  <a:pt x="1963270" y="0"/>
+                </a:cubicBezTo>
+              </a:path>
+            </a:pathLst>
+          </a:custGeom>
+          <a:noFill/>
+          <a:ln w="38100">
+            <a:solidFill>
+              <a:schemeClr val="accent6"/>
+            </a:solidFill>
+            <a:headEnd type="none" w="med" len="med"/>
+            <a:tailEnd type="triangle" w="med" len="med"/>
+          </a:ln>
+        </p:spPr>
+        <p:style>
+          <a:lnRef idx="2">
+            <a:schemeClr val="accent1">
+              <a:shade val="15000"/>
+            </a:schemeClr>
+          </a:lnRef>
+          <a:fillRef idx="1">
+            <a:schemeClr val="accent1"/>
+          </a:fillRef>
+          <a:effectRef idx="0">
+            <a:schemeClr val="accent1"/>
+          </a:effectRef>
+          <a:fontRef idx="minor">
+            <a:schemeClr val="lt1"/>
+          </a:fontRef>
+        </p:style>
+        <p:txBody>
+          <a:bodyPr rtlCol="0" anchor="ctr"/>
+          <a:lstStyle/>
+          <a:p>
+            <a:pPr algn="ctr"/>
+            <a:endParaRPr lang="en-US"/>
+          </a:p>
+        </p:txBody>
+      </p:sp>
+      <p:sp>
+        <p:nvSpPr>
+          <p:cNvPr id="11" name="Rectangle : coins arrondis 13">
+            <a:extLst>
+              <a:ext uri="{FF2B5EF4-FFF2-40B4-BE49-F238E27FC236}">
+                <a16:creationId xmlns:a16="http://schemas.microsoft.com/office/drawing/2014/main" id="{4D3CBAA8-6039-BAC6-88B6-733182E94598}"/>
+              </a:ext>
+            </a:extLst>
+          </p:cNvPr>
+          <p:cNvSpPr>
+            <a:spLocks/>
+          </p:cNvSpPr>
+          <p:nvPr/>
+        </p:nvSpPr>
+        <p:spPr>
+          <a:xfrm>
+            <a:off x="3146611" y="6087134"/>
+            <a:ext cx="1476000" cy="508412"/>
+          </a:xfrm>
+          <a:prstGeom prst="roundRect">
+            <a:avLst/>
+          </a:prstGeom>
+          <a:solidFill>
+            <a:srgbClr val="7030A0">
+              <a:alpha val="50196"/>
+            </a:srgbClr>
+          </a:solidFill>
+          <a:ln>
+            <a:solidFill>
+              <a:schemeClr val="accent5"/>
+            </a:solidFill>
+          </a:ln>
+        </p:spPr>
+        <p:style>
+          <a:lnRef idx="2">
+            <a:schemeClr val="accent1">
+              <a:shade val="15000"/>
+            </a:schemeClr>
+          </a:lnRef>
+          <a:fillRef idx="1">
+            <a:schemeClr val="accent1"/>
+          </a:fillRef>
+          <a:effectRef idx="0">
+            <a:schemeClr val="accent1"/>
+          </a:effectRef>
+          <a:fontRef idx="minor">
+            <a:schemeClr val="lt1"/>
+          </a:fontRef>
+        </p:style>
+        <p:txBody>
+          <a:bodyPr rtlCol="0" anchor="ctr"/>
+          <a:lstStyle/>
+          <a:p>
+            <a:pPr algn="ctr"/>
+            <a:r>
+              <a:rPr lang="en-CA" sz="2000" b="1" noProof="0" dirty="0">
+                <a:latin typeface="Avenir Next LT Pro" panose="020B0504020202020204" pitchFamily="34" charset="77"/>
+              </a:rPr>
+              <a:t>Juveniles</a:t>
+            </a:r>
+            <a:endParaRPr lang="en-CA" sz="2000" b="1" noProof="0" dirty="0">
+              <a:latin typeface="Avenir Next LT Pro" panose="020B0504020202020204" pitchFamily="34" charset="77"/>
+              <a:ea typeface="Cambria Math" panose="02040503050406030204" pitchFamily="18" charset="0"/>
+            </a:endParaRPr>
+          </a:p>
+        </p:txBody>
+      </p:sp>
+      <p:sp>
+        <p:nvSpPr>
+          <p:cNvPr id="13" name="Rectangle : coins arrondis 13">
+            <a:extLst>
+              <a:ext uri="{FF2B5EF4-FFF2-40B4-BE49-F238E27FC236}">
+                <a16:creationId xmlns:a16="http://schemas.microsoft.com/office/drawing/2014/main" id="{7C889DBD-3D49-0C45-DB43-8A7AE37CD18C}"/>
+              </a:ext>
+            </a:extLst>
+          </p:cNvPr>
+          <p:cNvSpPr>
+            <a:spLocks/>
+          </p:cNvSpPr>
+          <p:nvPr/>
+        </p:nvSpPr>
+        <p:spPr>
+          <a:xfrm>
+            <a:off x="5071387" y="6276781"/>
+            <a:ext cx="1476000" cy="508412"/>
+          </a:xfrm>
+          <a:prstGeom prst="roundRect">
+            <a:avLst/>
+          </a:prstGeom>
+          <a:solidFill>
+            <a:srgbClr val="7030A0">
+              <a:alpha val="50196"/>
+            </a:srgbClr>
+          </a:solidFill>
+          <a:ln>
+            <a:solidFill>
+              <a:schemeClr val="accent5"/>
+            </a:solidFill>
+          </a:ln>
+        </p:spPr>
+        <p:style>
+          <a:lnRef idx="2">
+            <a:schemeClr val="accent1">
+              <a:shade val="15000"/>
+            </a:schemeClr>
+          </a:lnRef>
+          <a:fillRef idx="1">
+            <a:schemeClr val="accent1"/>
+          </a:fillRef>
+          <a:effectRef idx="0">
+            <a:schemeClr val="accent1"/>
+          </a:effectRef>
+          <a:fontRef idx="minor">
+            <a:schemeClr val="lt1"/>
+          </a:fontRef>
+        </p:style>
+        <p:txBody>
+          <a:bodyPr rtlCol="0" anchor="ctr"/>
+          <a:lstStyle/>
+          <a:p>
+            <a:pPr algn="ctr"/>
+            <a:r>
+              <a:rPr lang="en-CA" sz="2000" b="1" noProof="0" dirty="0">
+                <a:latin typeface="Avenir Next LT Pro" panose="020B0504020202020204" pitchFamily="34" charset="77"/>
+              </a:rPr>
+              <a:t>Yearlings</a:t>
+            </a:r>
+            <a:endParaRPr lang="en-CA" sz="2000" b="1" noProof="0" dirty="0">
+              <a:latin typeface="Avenir Next LT Pro" panose="020B0504020202020204" pitchFamily="34" charset="77"/>
+              <a:ea typeface="Cambria Math" panose="02040503050406030204" pitchFamily="18" charset="0"/>
+            </a:endParaRPr>
+          </a:p>
+        </p:txBody>
+      </p:sp>
+      <p:sp>
+        <p:nvSpPr>
+          <p:cNvPr id="14" name="Rectangle : coins arrondis 13">
+            <a:extLst>
+              <a:ext uri="{FF2B5EF4-FFF2-40B4-BE49-F238E27FC236}">
+                <a16:creationId xmlns:a16="http://schemas.microsoft.com/office/drawing/2014/main" id="{574FCA71-E03C-4312-F21E-FA1C575466DB}"/>
+              </a:ext>
+            </a:extLst>
+          </p:cNvPr>
+          <p:cNvSpPr>
+            <a:spLocks/>
+          </p:cNvSpPr>
+          <p:nvPr/>
+        </p:nvSpPr>
+        <p:spPr>
+          <a:xfrm>
+            <a:off x="6996164" y="6276781"/>
+            <a:ext cx="1476000" cy="508412"/>
+          </a:xfrm>
+          <a:prstGeom prst="roundRect">
+            <a:avLst/>
+          </a:prstGeom>
+          <a:solidFill>
+            <a:srgbClr val="7030A0">
+              <a:alpha val="50196"/>
+            </a:srgbClr>
+          </a:solidFill>
+          <a:ln>
+            <a:solidFill>
+              <a:schemeClr val="accent5"/>
+            </a:solidFill>
+          </a:ln>
+        </p:spPr>
+        <p:style>
+          <a:lnRef idx="2">
+            <a:schemeClr val="accent1">
+              <a:shade val="15000"/>
+            </a:schemeClr>
+          </a:lnRef>
+          <a:fillRef idx="1">
+            <a:schemeClr val="accent1"/>
+          </a:fillRef>
+          <a:effectRef idx="0">
+            <a:schemeClr val="accent1"/>
+          </a:effectRef>
+          <a:fontRef idx="minor">
+            <a:schemeClr val="lt1"/>
+          </a:fontRef>
+        </p:style>
+        <p:txBody>
+          <a:bodyPr rtlCol="0" anchor="ctr"/>
+          <a:lstStyle/>
+          <a:p>
+            <a:pPr algn="ctr"/>
+            <a:r>
+              <a:rPr lang="en-CA" sz="2000" b="1" noProof="0" dirty="0">
+                <a:latin typeface="Avenir Next LT Pro" panose="020B0504020202020204" pitchFamily="34" charset="77"/>
+              </a:rPr>
+              <a:t>Subadults</a:t>
+            </a:r>
+            <a:endParaRPr lang="en-CA" sz="2000" b="1" noProof="0" dirty="0">
+              <a:latin typeface="Avenir Next LT Pro" panose="020B0504020202020204" pitchFamily="34" charset="77"/>
+              <a:ea typeface="Cambria Math" panose="02040503050406030204" pitchFamily="18" charset="0"/>
+            </a:endParaRPr>
+          </a:p>
+        </p:txBody>
+      </p:sp>
+      <p:sp>
+        <p:nvSpPr>
+          <p:cNvPr id="34" name="Rectangle : coins arrondis 13">
+            <a:extLst>
+              <a:ext uri="{FF2B5EF4-FFF2-40B4-BE49-F238E27FC236}">
+                <a16:creationId xmlns:a16="http://schemas.microsoft.com/office/drawing/2014/main" id="{F94C8480-FBC4-42AC-C283-F8F3127BB248}"/>
+              </a:ext>
+            </a:extLst>
+          </p:cNvPr>
+          <p:cNvSpPr>
+            <a:spLocks/>
+          </p:cNvSpPr>
+          <p:nvPr/>
+        </p:nvSpPr>
+        <p:spPr>
+          <a:xfrm>
+            <a:off x="8920941" y="6087134"/>
+            <a:ext cx="1476000" cy="508412"/>
+          </a:xfrm>
+          <a:prstGeom prst="roundRect">
+            <a:avLst/>
+          </a:prstGeom>
+          <a:solidFill>
+            <a:srgbClr val="7030A0">
+              <a:alpha val="50196"/>
+            </a:srgbClr>
+          </a:solidFill>
+          <a:ln>
+            <a:solidFill>
+              <a:schemeClr val="accent5"/>
+            </a:solidFill>
+          </a:ln>
+        </p:spPr>
+        <p:style>
+          <a:lnRef idx="2">
+            <a:schemeClr val="accent1">
+              <a:shade val="15000"/>
+            </a:schemeClr>
+          </a:lnRef>
+          <a:fillRef idx="1">
+            <a:schemeClr val="accent1"/>
+          </a:fillRef>
+          <a:effectRef idx="0">
+            <a:schemeClr val="accent1"/>
+          </a:effectRef>
+          <a:fontRef idx="minor">
+            <a:schemeClr val="lt1"/>
+          </a:fontRef>
+        </p:style>
+        <p:txBody>
+          <a:bodyPr rtlCol="0" anchor="ctr"/>
+          <a:lstStyle/>
+          <a:p>
+            <a:pPr algn="ctr"/>
+            <a:r>
+              <a:rPr lang="en-CA" sz="2000" b="1" noProof="0" dirty="0">
+                <a:latin typeface="Avenir Next LT Pro" panose="020B0504020202020204" pitchFamily="34" charset="77"/>
+              </a:rPr>
+              <a:t>Adults</a:t>
+            </a:r>
+            <a:endParaRPr lang="en-CA" sz="2000" b="1" noProof="0" dirty="0">
+              <a:latin typeface="Avenir Next LT Pro" panose="020B0504020202020204" pitchFamily="34" charset="77"/>
+              <a:ea typeface="Cambria Math" panose="02040503050406030204" pitchFamily="18" charset="0"/>
+            </a:endParaRPr>
+          </a:p>
+        </p:txBody>
+      </p:sp>
+      <p:cxnSp>
+        <p:nvCxnSpPr>
+          <p:cNvPr id="37" name="Straight Arrow Connector 36">
+            <a:extLst>
+              <a:ext uri="{FF2B5EF4-FFF2-40B4-BE49-F238E27FC236}">
+                <a16:creationId xmlns:a16="http://schemas.microsoft.com/office/drawing/2014/main" id="{CBDC1986-D3F7-779D-42C1-6789A7FF21A9}"/>
+              </a:ext>
+            </a:extLst>
+          </p:cNvPr>
+          <p:cNvCxnSpPr>
+            <a:cxnSpLocks/>
+            <a:stCxn id="11" idx="0"/>
+            <a:endCxn id="9" idx="2"/>
+          </p:cNvCxnSpPr>
+          <p:nvPr/>
+        </p:nvCxnSpPr>
+        <p:spPr>
+          <a:xfrm flipV="1">
+            <a:off x="3884611" y="5732369"/>
+            <a:ext cx="3173723" cy="354765"/>
+          </a:xfrm>
+          <a:prstGeom prst="straightConnector1">
+            <a:avLst/>
+          </a:prstGeom>
+          <a:ln w="38100">
+            <a:solidFill>
+              <a:schemeClr val="accent5"/>
+            </a:solidFill>
+            <a:tailEnd type="triangle"/>
+          </a:ln>
+        </p:spPr>
+        <p:style>
+          <a:lnRef idx="2">
+            <a:schemeClr val="accent1"/>
+          </a:lnRef>
+          <a:fillRef idx="0">
+            <a:schemeClr val="accent1"/>
+          </a:fillRef>
+          <a:effectRef idx="1">
+            <a:schemeClr val="accent1"/>
+          </a:effectRef>
+          <a:fontRef idx="minor">
+            <a:schemeClr val="tx1"/>
+          </a:fontRef>
+        </p:style>
+      </p:cxnSp>
+      <p:cxnSp>
+        <p:nvCxnSpPr>
+          <p:cNvPr id="43" name="Straight Arrow Connector 42">
+            <a:extLst>
+              <a:ext uri="{FF2B5EF4-FFF2-40B4-BE49-F238E27FC236}">
+                <a16:creationId xmlns:a16="http://schemas.microsoft.com/office/drawing/2014/main" id="{C0AE56DF-DABB-074F-DC39-9A788791F683}"/>
+              </a:ext>
+            </a:extLst>
+          </p:cNvPr>
+          <p:cNvCxnSpPr>
+            <a:cxnSpLocks/>
+            <a:stCxn id="13" idx="0"/>
+            <a:endCxn id="9" idx="2"/>
+          </p:cNvCxnSpPr>
+          <p:nvPr/>
+        </p:nvCxnSpPr>
+        <p:spPr>
+          <a:xfrm flipV="1">
+            <a:off x="5809387" y="5732369"/>
+            <a:ext cx="1248947" cy="544412"/>
+          </a:xfrm>
+          <a:prstGeom prst="straightConnector1">
+            <a:avLst/>
+          </a:prstGeom>
+          <a:ln w="38100">
+            <a:solidFill>
+              <a:schemeClr val="accent5"/>
+            </a:solidFill>
+            <a:tailEnd type="triangle"/>
+          </a:ln>
+        </p:spPr>
+        <p:style>
+          <a:lnRef idx="2">
+            <a:schemeClr val="accent1"/>
+          </a:lnRef>
+          <a:fillRef idx="0">
+            <a:schemeClr val="accent1"/>
+          </a:fillRef>
+          <a:effectRef idx="1">
+            <a:schemeClr val="accent1"/>
+          </a:effectRef>
+          <a:fontRef idx="minor">
+            <a:schemeClr val="tx1"/>
+          </a:fontRef>
+        </p:style>
+      </p:cxnSp>
+      <p:cxnSp>
+        <p:nvCxnSpPr>
+          <p:cNvPr id="47" name="Straight Arrow Connector 46">
+            <a:extLst>
+              <a:ext uri="{FF2B5EF4-FFF2-40B4-BE49-F238E27FC236}">
+                <a16:creationId xmlns:a16="http://schemas.microsoft.com/office/drawing/2014/main" id="{3B4015D0-E373-1EC4-BD63-8FCF031AFF7B}"/>
+              </a:ext>
+            </a:extLst>
+          </p:cNvPr>
+          <p:cNvCxnSpPr>
+            <a:cxnSpLocks/>
+            <a:stCxn id="14" idx="0"/>
+            <a:endCxn id="9" idx="2"/>
+          </p:cNvCxnSpPr>
+          <p:nvPr/>
+        </p:nvCxnSpPr>
+        <p:spPr>
+          <a:xfrm flipH="1" flipV="1">
+            <a:off x="7058334" y="5732369"/>
+            <a:ext cx="675830" cy="544412"/>
+          </a:xfrm>
+          <a:prstGeom prst="straightConnector1">
+            <a:avLst/>
+          </a:prstGeom>
+          <a:ln w="38100">
+            <a:solidFill>
+              <a:schemeClr val="accent5"/>
+            </a:solidFill>
+            <a:tailEnd type="triangle"/>
+          </a:ln>
+        </p:spPr>
+        <p:style>
+          <a:lnRef idx="2">
+            <a:schemeClr val="accent1"/>
+          </a:lnRef>
+          <a:fillRef idx="0">
+            <a:schemeClr val="accent1"/>
+          </a:fillRef>
+          <a:effectRef idx="1">
+            <a:schemeClr val="accent1"/>
+          </a:effectRef>
+          <a:fontRef idx="minor">
+            <a:schemeClr val="tx1"/>
+          </a:fontRef>
+        </p:style>
+      </p:cxnSp>
+      <p:cxnSp>
+        <p:nvCxnSpPr>
+          <p:cNvPr id="50" name="Straight Arrow Connector 49">
+            <a:extLst>
+              <a:ext uri="{FF2B5EF4-FFF2-40B4-BE49-F238E27FC236}">
+                <a16:creationId xmlns:a16="http://schemas.microsoft.com/office/drawing/2014/main" id="{9BF0F018-D67A-1214-2E8F-E4AF983E83BA}"/>
+              </a:ext>
+            </a:extLst>
+          </p:cNvPr>
+          <p:cNvCxnSpPr>
+            <a:cxnSpLocks/>
+            <a:stCxn id="34" idx="0"/>
+            <a:endCxn id="9" idx="2"/>
+          </p:cNvCxnSpPr>
+          <p:nvPr/>
+        </p:nvCxnSpPr>
+        <p:spPr>
+          <a:xfrm flipH="1" flipV="1">
+            <a:off x="7058334" y="5732369"/>
+            <a:ext cx="2600607" cy="354765"/>
+          </a:xfrm>
+          <a:prstGeom prst="straightConnector1">
+            <a:avLst/>
+          </a:prstGeom>
+          <a:ln w="38100">
+            <a:solidFill>
+              <a:schemeClr val="accent5"/>
+            </a:solidFill>
+            <a:tailEnd type="triangle"/>
+          </a:ln>
+        </p:spPr>
+        <p:style>
+          <a:lnRef idx="2">
+            <a:schemeClr val="accent1"/>
+          </a:lnRef>
+          <a:fillRef idx="0">
+            <a:schemeClr val="accent1"/>
+          </a:fillRef>
+          <a:effectRef idx="1">
+            <a:schemeClr val="accent1"/>
+          </a:effectRef>
+          <a:fontRef idx="minor">
+            <a:schemeClr val="tx1"/>
+          </a:fontRef>
+        </p:style>
+      </p:cxnSp>
+      <p:sp>
+        <p:nvSpPr>
+          <p:cNvPr id="4" name="Rectangle : coins arrondis 23">
+            <a:extLst>
+              <a:ext uri="{FF2B5EF4-FFF2-40B4-BE49-F238E27FC236}">
+                <a16:creationId xmlns:a16="http://schemas.microsoft.com/office/drawing/2014/main" id="{FD1007C5-5785-55A6-47B9-FB4F7F28F853}"/>
+              </a:ext>
+            </a:extLst>
+          </p:cNvPr>
+          <p:cNvSpPr>
+            <a:spLocks/>
+          </p:cNvSpPr>
+          <p:nvPr/>
+        </p:nvSpPr>
+        <p:spPr>
+          <a:xfrm>
+            <a:off x="7352990" y="2843746"/>
+            <a:ext cx="1476000" cy="324000"/>
+          </a:xfrm>
+          <a:prstGeom prst="roundRect">
+            <a:avLst/>
+          </a:prstGeom>
+          <a:solidFill>
+            <a:srgbClr val="156082">
+              <a:alpha val="45098"/>
+            </a:srgbClr>
+          </a:solidFill>
+          <a:ln>
+            <a:solidFill>
+              <a:srgbClr val="FF0000"/>
+            </a:solidFill>
+            <a:prstDash val="dash"/>
+          </a:ln>
+        </p:spPr>
+        <p:style>
+          <a:lnRef idx="2">
+            <a:schemeClr val="accent1">
+              <a:shade val="15000"/>
+            </a:schemeClr>
+          </a:lnRef>
+          <a:fillRef idx="1">
+            <a:schemeClr val="accent1"/>
+          </a:fillRef>
+          <a:effectRef idx="0">
+            <a:schemeClr val="accent1"/>
+          </a:effectRef>
+          <a:fontRef idx="minor">
+            <a:schemeClr val="lt1"/>
+          </a:fontRef>
+        </p:style>
+        <p:txBody>
+          <a:bodyPr rtlCol="0" anchor="ctr"/>
+          <a:lstStyle/>
+          <a:p>
+            <a:pPr algn="ctr"/>
+            <a:r>
+              <a:rPr lang="en-CA" b="1" noProof="0" dirty="0">
+                <a:solidFill>
+                  <a:schemeClr val="bg1"/>
+                </a:solidFill>
+                <a:latin typeface="Avenir Next LT Pro" panose="020B0504020202020204" pitchFamily="34" charset="77"/>
+              </a:rPr>
+              <a:t>Experience</a:t>
+            </a:r>
+            <a:endParaRPr lang="en-CA" sz="1400" b="1" noProof="0" dirty="0">
+              <a:solidFill>
+                <a:schemeClr val="bg1"/>
+              </a:solidFill>
+            </a:endParaRPr>
+          </a:p>
+        </p:txBody>
+      </p:sp>
+      <p:sp>
+        <p:nvSpPr>
+          <p:cNvPr id="6" name="Freeform 5">
+            <a:extLst>
+              <a:ext uri="{FF2B5EF4-FFF2-40B4-BE49-F238E27FC236}">
+                <a16:creationId xmlns:a16="http://schemas.microsoft.com/office/drawing/2014/main" id="{929D1C19-B836-BC65-65AB-189805FECD37}"/>
+              </a:ext>
+            </a:extLst>
+          </p:cNvPr>
+          <p:cNvSpPr/>
+          <p:nvPr/>
+        </p:nvSpPr>
+        <p:spPr>
+          <a:xfrm flipV="1">
+            <a:off x="8828991" y="3005723"/>
+            <a:ext cx="524220" cy="214030"/>
+          </a:xfrm>
+          <a:custGeom>
+            <a:avLst/>
+            <a:gdLst>
+              <a:gd name="connsiteX0" fmla="*/ 0 w 679976"/>
+              <a:gd name="connsiteY0" fmla="*/ 484094 h 484094"/>
+              <a:gd name="connsiteX1" fmla="*/ 309283 w 679976"/>
+              <a:gd name="connsiteY1" fmla="*/ 376518 h 484094"/>
+              <a:gd name="connsiteX2" fmla="*/ 632012 w 679976"/>
+              <a:gd name="connsiteY2" fmla="*/ 121024 h 484094"/>
+              <a:gd name="connsiteX3" fmla="*/ 672353 w 679976"/>
+              <a:gd name="connsiteY3" fmla="*/ 0 h 484094"/>
+            </a:gdLst>
+            <a:ahLst/>
+            <a:cxnLst>
+              <a:cxn ang="0">
+                <a:pos x="connsiteX0" y="connsiteY0"/>
+              </a:cxn>
+              <a:cxn ang="0">
+                <a:pos x="connsiteX1" y="connsiteY1"/>
+              </a:cxn>
+              <a:cxn ang="0">
+                <a:pos x="connsiteX2" y="connsiteY2"/>
+              </a:cxn>
+              <a:cxn ang="0">
+                <a:pos x="connsiteX3" y="connsiteY3"/>
+              </a:cxn>
+            </a:cxnLst>
+            <a:rect l="l" t="t" r="r" b="b"/>
+            <a:pathLst>
+              <a:path w="679976" h="484094">
+                <a:moveTo>
+                  <a:pt x="0" y="484094"/>
+                </a:moveTo>
+                <a:cubicBezTo>
+                  <a:pt x="101974" y="460562"/>
+                  <a:pt x="203948" y="437030"/>
+                  <a:pt x="309283" y="376518"/>
+                </a:cubicBezTo>
+                <a:cubicBezTo>
+                  <a:pt x="414618" y="316006"/>
+                  <a:pt x="571500" y="183777"/>
+                  <a:pt x="632012" y="121024"/>
+                </a:cubicBezTo>
+                <a:cubicBezTo>
+                  <a:pt x="692524" y="58271"/>
+                  <a:pt x="682438" y="29135"/>
+                  <a:pt x="672353" y="0"/>
+                </a:cubicBezTo>
+              </a:path>
+            </a:pathLst>
+          </a:custGeom>
+          <a:noFill/>
+          <a:ln w="57150">
+            <a:solidFill>
+              <a:srgbClr val="FF0000"/>
+            </a:solidFill>
+            <a:prstDash val="solid"/>
+            <a:headEnd type="none" w="med" len="med"/>
+            <a:tailEnd type="triangle" w="med" len="med"/>
+          </a:ln>
+        </p:spPr>
+        <p:style>
+          <a:lnRef idx="2">
+            <a:schemeClr val="accent1">
+              <a:shade val="15000"/>
+            </a:schemeClr>
+          </a:lnRef>
+          <a:fillRef idx="1">
+            <a:schemeClr val="accent1"/>
+          </a:fillRef>
+          <a:effectRef idx="0">
+            <a:schemeClr val="accent1"/>
+          </a:effectRef>
+          <a:fontRef idx="minor">
+            <a:schemeClr val="lt1"/>
+          </a:fontRef>
+        </p:style>
+        <p:txBody>
+          <a:bodyPr rtlCol="0" anchor="ctr"/>
+          <a:lstStyle/>
+          <a:p>
+            <a:pPr algn="ctr"/>
+            <a:endParaRPr lang="en-CA"/>
+          </a:p>
+        </p:txBody>
+      </p:sp>
+      <p:sp>
+        <p:nvSpPr>
+          <p:cNvPr id="8" name="Freeform 7">
+            <a:extLst>
+              <a:ext uri="{FF2B5EF4-FFF2-40B4-BE49-F238E27FC236}">
+                <a16:creationId xmlns:a16="http://schemas.microsoft.com/office/drawing/2014/main" id="{25AF05D7-F518-3D27-43EE-D4B643EEB7C8}"/>
+              </a:ext>
+            </a:extLst>
+          </p:cNvPr>
+          <p:cNvSpPr/>
+          <p:nvPr/>
+        </p:nvSpPr>
+        <p:spPr>
+          <a:xfrm>
+            <a:off x="10995216" y="2907186"/>
+            <a:ext cx="162225" cy="570739"/>
+          </a:xfrm>
+          <a:custGeom>
+            <a:avLst/>
+            <a:gdLst>
+              <a:gd name="connsiteX0" fmla="*/ 0 w 679976"/>
+              <a:gd name="connsiteY0" fmla="*/ 484094 h 484094"/>
+              <a:gd name="connsiteX1" fmla="*/ 309283 w 679976"/>
+              <a:gd name="connsiteY1" fmla="*/ 376518 h 484094"/>
+              <a:gd name="connsiteX2" fmla="*/ 632012 w 679976"/>
+              <a:gd name="connsiteY2" fmla="*/ 121024 h 484094"/>
+              <a:gd name="connsiteX3" fmla="*/ 672353 w 679976"/>
+              <a:gd name="connsiteY3" fmla="*/ 0 h 484094"/>
+            </a:gdLst>
+            <a:ahLst/>
+            <a:cxnLst>
+              <a:cxn ang="0">
+                <a:pos x="connsiteX0" y="connsiteY0"/>
+              </a:cxn>
+              <a:cxn ang="0">
+                <a:pos x="connsiteX1" y="connsiteY1"/>
+              </a:cxn>
+              <a:cxn ang="0">
+                <a:pos x="connsiteX2" y="connsiteY2"/>
+              </a:cxn>
+              <a:cxn ang="0">
+                <a:pos x="connsiteX3" y="connsiteY3"/>
+              </a:cxn>
+            </a:cxnLst>
+            <a:rect l="l" t="t" r="r" b="b"/>
+            <a:pathLst>
+              <a:path w="679976" h="484094">
+                <a:moveTo>
+                  <a:pt x="0" y="484094"/>
+                </a:moveTo>
+                <a:cubicBezTo>
+                  <a:pt x="101974" y="460562"/>
+                  <a:pt x="203948" y="437030"/>
+                  <a:pt x="309283" y="376518"/>
+                </a:cubicBezTo>
+                <a:cubicBezTo>
+                  <a:pt x="414618" y="316006"/>
+                  <a:pt x="571500" y="183777"/>
+                  <a:pt x="632012" y="121024"/>
+                </a:cubicBezTo>
+                <a:cubicBezTo>
+                  <a:pt x="692524" y="58271"/>
+                  <a:pt x="682438" y="29135"/>
+                  <a:pt x="672353" y="0"/>
+                </a:cubicBezTo>
+              </a:path>
+            </a:pathLst>
+          </a:custGeom>
+          <a:noFill/>
+          <a:ln w="38100">
+            <a:solidFill>
+              <a:srgbClr val="FF0000"/>
+            </a:solidFill>
+            <a:prstDash val="dash"/>
+            <a:headEnd type="none" w="med" len="med"/>
+            <a:tailEnd type="triangle" w="med" len="med"/>
+          </a:ln>
+        </p:spPr>
+        <p:style>
+          <a:lnRef idx="2">
+            <a:schemeClr val="accent1">
+              <a:shade val="15000"/>
+            </a:schemeClr>
+          </a:lnRef>
+          <a:fillRef idx="1">
+            <a:schemeClr val="accent1"/>
+          </a:fillRef>
+          <a:effectRef idx="0">
+            <a:schemeClr val="accent1"/>
+          </a:effectRef>
+          <a:fontRef idx="minor">
+            <a:schemeClr val="lt1"/>
+          </a:fontRef>
+        </p:style>
+        <p:txBody>
+          <a:bodyPr rtlCol="0" anchor="ctr"/>
+          <a:lstStyle/>
+          <a:p>
+            <a:pPr algn="ctr"/>
+            <a:endParaRPr lang="en-CA"/>
+          </a:p>
+        </p:txBody>
+      </p:sp>
+      <p:sp>
+        <p:nvSpPr>
+          <p:cNvPr id="35" name="Rectangle : coins arrondis 23">
+            <a:extLst>
+              <a:ext uri="{FF2B5EF4-FFF2-40B4-BE49-F238E27FC236}">
+                <a16:creationId xmlns:a16="http://schemas.microsoft.com/office/drawing/2014/main" id="{87C8DE76-51C1-07DB-0C56-8D0A1D7727CA}"/>
+              </a:ext>
+            </a:extLst>
+          </p:cNvPr>
+          <p:cNvSpPr>
+            <a:spLocks/>
+          </p:cNvSpPr>
+          <p:nvPr/>
+        </p:nvSpPr>
+        <p:spPr>
+          <a:xfrm>
+            <a:off x="9991773" y="2031694"/>
+            <a:ext cx="2144807" cy="846742"/>
+          </a:xfrm>
+          <a:prstGeom prst="roundRect">
+            <a:avLst/>
+          </a:prstGeom>
+          <a:solidFill>
+            <a:srgbClr val="156082">
+              <a:alpha val="50196"/>
+            </a:srgbClr>
+          </a:solidFill>
+          <a:ln>
+            <a:solidFill>
+              <a:srgbClr val="FF0000"/>
+            </a:solidFill>
+            <a:prstDash val="dash"/>
+          </a:ln>
+        </p:spPr>
+        <p:style>
+          <a:lnRef idx="2">
+            <a:schemeClr val="accent1">
+              <a:shade val="15000"/>
+            </a:schemeClr>
+          </a:lnRef>
+          <a:fillRef idx="1">
+            <a:schemeClr val="accent1"/>
+          </a:fillRef>
+          <a:effectRef idx="0">
+            <a:schemeClr val="accent1"/>
+          </a:effectRef>
+          <a:fontRef idx="minor">
+            <a:schemeClr val="lt1"/>
+          </a:fontRef>
+        </p:style>
+        <p:txBody>
+          <a:bodyPr rtlCol="0" anchor="ctr"/>
+          <a:lstStyle/>
+          <a:p>
+            <a:pPr algn="ctr"/>
+            <a:r>
+              <a:rPr lang="en-CA" sz="2800" b="1" noProof="0" dirty="0">
+                <a:latin typeface="Avenir Next LT Pro" panose="020B0504020202020204" pitchFamily="34" charset="77"/>
+              </a:rPr>
+              <a:t>Population dynamics</a:t>
+            </a:r>
+            <a:endParaRPr lang="en-CA" sz="2000" b="1" noProof="0" dirty="0"/>
+          </a:p>
+        </p:txBody>
+      </p:sp>
+    </p:spTree>
+    <p:extLst>
+      <p:ext uri="{BB962C8B-B14F-4D97-AF65-F5344CB8AC3E}">
+        <p14:creationId xmlns:p14="http://schemas.microsoft.com/office/powerpoint/2010/main" val="3925228889"/>
+      </p:ext>
+    </p:extLst>
+  </p:cSld>
+  <p:clrMapOvr>
+    <a:masterClrMapping/>
+  </p:clrMapOvr>
+</p:sld>
+</file>
+
+<file path=ppt/slides/slide4.xml><?xml version="1.0" encoding="utf-8"?>
 <p:sld xmlns:a="http://schemas.openxmlformats.org/drawingml/2006/main" xmlns:r="http://schemas.openxmlformats.org/officeDocument/2006/relationships" xmlns:p="http://schemas.openxmlformats.org/presentationml/2006/main">
   <p:cSld>
     <p:spTree>

</xml_diff>

<commit_message>
life history trait section
</commit_message>
<xml_diff>
--- a/figures/illustrations.pptx
+++ b/figures/illustrations.pptx
@@ -9,6 +9,7 @@
     <p:sldId id="258" r:id="rId3"/>
     <p:sldId id="259" r:id="rId4"/>
     <p:sldId id="256" r:id="rId5"/>
+    <p:sldId id="260" r:id="rId6"/>
   </p:sldIdLst>
   <p:sldSz cx="12192000" cy="6858000"/>
   <p:notesSz cx="6858000" cy="9144000"/>
@@ -115,6 +116,959 @@
 </p:presentation>
 </file>
 
+<file path=ppt/charts/chart1.xml><?xml version="1.0" encoding="utf-8"?>
+<c:chartSpace xmlns:c="http://schemas.openxmlformats.org/drawingml/2006/chart" xmlns:a="http://schemas.openxmlformats.org/drawingml/2006/main" xmlns:r="http://schemas.openxmlformats.org/officeDocument/2006/relationships" xmlns:c16r2="http://schemas.microsoft.com/office/drawing/2015/06/chart">
+  <c:date1904 val="0"/>
+  <c:lang val="en-US"/>
+  <c:roundedCorners val="0"/>
+  <mc:AlternateContent xmlns:mc="http://schemas.openxmlformats.org/markup-compatibility/2006">
+    <mc:Choice xmlns:c14="http://schemas.microsoft.com/office/drawing/2007/8/2/chart" Requires="c14">
+      <c14:style val="102"/>
+    </mc:Choice>
+    <mc:Fallback>
+      <c:style val="2"/>
+    </mc:Fallback>
+  </mc:AlternateContent>
+  <c:clrMapOvr bg1="lt1" tx1="dk1" bg2="lt2" tx2="dk2" accent1="accent1" accent2="accent2" accent3="accent3" accent4="accent4" accent5="accent5" accent6="accent6" hlink="hlink" folHlink="folHlink"/>
+  <c:chart>
+    <c:autoTitleDeleted val="1"/>
+    <c:plotArea>
+      <c:layout/>
+      <c:doughnutChart>
+        <c:varyColors val="1"/>
+        <c:ser>
+          <c:idx val="0"/>
+          <c:order val="0"/>
+          <c:tx>
+            <c:strRef>
+              <c:f>Feuil1!$B$1</c:f>
+              <c:strCache>
+                <c:ptCount val="1"/>
+                <c:pt idx="0">
+                  <c:v> </c:v>
+                </c:pt>
+              </c:strCache>
+            </c:strRef>
+          </c:tx>
+          <c:dPt>
+            <c:idx val="0"/>
+            <c:bubble3D val="0"/>
+            <c:spPr>
+              <a:solidFill>
+                <a:schemeClr val="accent2"/>
+              </a:solidFill>
+              <a:ln w="19050">
+                <a:solidFill>
+                  <a:schemeClr val="lt1"/>
+                </a:solidFill>
+              </a:ln>
+              <a:effectLst/>
+            </c:spPr>
+            <c:extLst>
+              <c:ext xmlns:c16="http://schemas.microsoft.com/office/drawing/2014/chart" uri="{C3380CC4-5D6E-409C-BE32-E72D297353CC}">
+                <c16:uniqueId val="{00000001-CA57-3344-9BBA-4D3F19CCB6BD}"/>
+              </c:ext>
+            </c:extLst>
+          </c:dPt>
+          <c:dPt>
+            <c:idx val="1"/>
+            <c:bubble3D val="0"/>
+            <c:spPr>
+              <a:solidFill>
+                <a:schemeClr val="accent1"/>
+              </a:solidFill>
+              <a:ln w="19050">
+                <a:solidFill>
+                  <a:schemeClr val="lt1"/>
+                </a:solidFill>
+              </a:ln>
+              <a:effectLst/>
+            </c:spPr>
+            <c:extLst>
+              <c:ext xmlns:c16="http://schemas.microsoft.com/office/drawing/2014/chart" uri="{C3380CC4-5D6E-409C-BE32-E72D297353CC}">
+                <c16:uniqueId val="{00000003-CA57-3344-9BBA-4D3F19CCB6BD}"/>
+              </c:ext>
+            </c:extLst>
+          </c:dPt>
+          <c:dLbls>
+            <c:dLbl>
+              <c:idx val="0"/>
+              <c:tx>
+                <c:rich>
+                  <a:bodyPr rot="0" spcFirstLastPara="1" vertOverflow="ellipsis" vert="horz" wrap="square" lIns="38100" tIns="19050" rIns="38100" bIns="19050" anchor="ctr" anchorCtr="1">
+                    <a:noAutofit/>
+                  </a:bodyPr>
+                  <a:lstStyle/>
+                  <a:p>
+                    <a:pPr>
+                      <a:defRPr sz="2400" b="1" i="0" u="none" strike="noStrike" kern="1200" baseline="0">
+                        <a:solidFill>
+                          <a:schemeClr val="tx1">
+                            <a:lumMod val="75000"/>
+                            <a:lumOff val="25000"/>
+                          </a:schemeClr>
+                        </a:solidFill>
+                        <a:latin typeface="+mn-lt"/>
+                        <a:ea typeface="+mn-ea"/>
+                        <a:cs typeface="+mn-cs"/>
+                      </a:defRPr>
+                    </a:pPr>
+                    <a:fld id="{7272FF7C-8A4D-C344-BC8C-57DB4FC8664A}" type="CATEGORYNAME">
+                      <a:rPr lang="en-US" sz="2400" b="1" smtClean="0">
+                        <a:latin typeface="Avenir Next LT Pro" panose="020B0504020202020204" pitchFamily="34" charset="77"/>
+                      </a:rPr>
+                      <a:pPr>
+                        <a:defRPr sz="2400" b="1"/>
+                      </a:pPr>
+                      <a:t>[CATEGORY NAME]</a:t>
+                    </a:fld>
+                    <a:endParaRPr lang="en-CA"/>
+                  </a:p>
+                </c:rich>
+              </c:tx>
+              <c:spPr>
+                <a:solidFill>
+                  <a:srgbClr val="F7F2EE">
+                    <a:alpha val="50980"/>
+                  </a:srgbClr>
+                </a:solidFill>
+                <a:ln>
+                  <a:noFill/>
+                </a:ln>
+                <a:effectLst/>
+              </c:spPr>
+              <c:txPr>
+                <a:bodyPr rot="0" spcFirstLastPara="1" vertOverflow="ellipsis" vert="horz" wrap="square" lIns="38100" tIns="19050" rIns="38100" bIns="19050" anchor="ctr" anchorCtr="1">
+                  <a:noAutofit/>
+                </a:bodyPr>
+                <a:lstStyle/>
+                <a:p>
+                  <a:pPr>
+                    <a:defRPr sz="2400" b="1" i="0" u="none" strike="noStrike" kern="1200" baseline="0">
+                      <a:solidFill>
+                        <a:schemeClr val="tx1">
+                          <a:lumMod val="75000"/>
+                          <a:lumOff val="25000"/>
+                        </a:schemeClr>
+                      </a:solidFill>
+                      <a:latin typeface="+mn-lt"/>
+                      <a:ea typeface="+mn-ea"/>
+                      <a:cs typeface="+mn-cs"/>
+                    </a:defRPr>
+                  </a:pPr>
+                  <a:endParaRPr lang="en-CA"/>
+                </a:p>
+              </c:txPr>
+              <c:showLegendKey val="0"/>
+              <c:showVal val="1"/>
+              <c:showCatName val="1"/>
+              <c:showSerName val="0"/>
+              <c:showPercent val="0"/>
+              <c:showBubbleSize val="0"/>
+              <c:extLst>
+                <c:ext xmlns:c15="http://schemas.microsoft.com/office/drawing/2012/chart" uri="{CE6537A1-D6FC-4f65-9D91-7224C49458BB}">
+                  <c15:layout>
+                    <c:manualLayout>
+                      <c:w val="0.23113248527064575"/>
+                      <c:h val="5.5443569553805763E-2"/>
+                    </c:manualLayout>
+                  </c15:layout>
+                  <c15:dlblFieldTable/>
+                  <c15:showDataLabelsRange val="0"/>
+                </c:ext>
+                <c:ext xmlns:c16="http://schemas.microsoft.com/office/drawing/2014/chart" uri="{C3380CC4-5D6E-409C-BE32-E72D297353CC}">
+                  <c16:uniqueId val="{00000001-CA57-3344-9BBA-4D3F19CCB6BD}"/>
+                </c:ext>
+              </c:extLst>
+            </c:dLbl>
+            <c:dLbl>
+              <c:idx val="1"/>
+              <c:tx>
+                <c:rich>
+                  <a:bodyPr rot="0" spcFirstLastPara="1" vertOverflow="ellipsis" vert="horz" wrap="square" lIns="38100" tIns="19050" rIns="38100" bIns="19050" anchor="ctr" anchorCtr="1">
+                    <a:noAutofit/>
+                  </a:bodyPr>
+                  <a:lstStyle/>
+                  <a:p>
+                    <a:pPr>
+                      <a:defRPr sz="2400" b="1" i="0" u="none" strike="noStrike" kern="1200" baseline="0">
+                        <a:solidFill>
+                          <a:schemeClr val="tx1">
+                            <a:lumMod val="75000"/>
+                            <a:lumOff val="25000"/>
+                          </a:schemeClr>
+                        </a:solidFill>
+                        <a:latin typeface="+mn-lt"/>
+                        <a:ea typeface="+mn-ea"/>
+                        <a:cs typeface="+mn-cs"/>
+                      </a:defRPr>
+                    </a:pPr>
+                    <a:r>
+                      <a:rPr lang="en-US" sz="2400" b="1" dirty="0">
+                        <a:latin typeface="Avenir Next LT Pro" panose="020B0504020202020204" pitchFamily="34" charset="77"/>
+                      </a:rPr>
+                      <a:t>Active season</a:t>
+                    </a:r>
+                    <a:endParaRPr lang="en-US" dirty="0"/>
+                  </a:p>
+                </c:rich>
+              </c:tx>
+              <c:spPr>
+                <a:solidFill>
+                  <a:schemeClr val="bg2">
+                    <a:alpha val="50980"/>
+                  </a:schemeClr>
+                </a:solidFill>
+                <a:ln>
+                  <a:noFill/>
+                </a:ln>
+                <a:effectLst/>
+              </c:spPr>
+              <c:txPr>
+                <a:bodyPr rot="0" spcFirstLastPara="1" vertOverflow="ellipsis" vert="horz" wrap="square" lIns="38100" tIns="19050" rIns="38100" bIns="19050" anchor="ctr" anchorCtr="1">
+                  <a:noAutofit/>
+                </a:bodyPr>
+                <a:lstStyle/>
+                <a:p>
+                  <a:pPr>
+                    <a:defRPr sz="2400" b="1" i="0" u="none" strike="noStrike" kern="1200" baseline="0">
+                      <a:solidFill>
+                        <a:schemeClr val="tx1">
+                          <a:lumMod val="75000"/>
+                          <a:lumOff val="25000"/>
+                        </a:schemeClr>
+                      </a:solidFill>
+                      <a:latin typeface="+mn-lt"/>
+                      <a:ea typeface="+mn-ea"/>
+                      <a:cs typeface="+mn-cs"/>
+                    </a:defRPr>
+                  </a:pPr>
+                  <a:endParaRPr lang="en-CA"/>
+                </a:p>
+              </c:txPr>
+              <c:showLegendKey val="0"/>
+              <c:showVal val="1"/>
+              <c:showCatName val="1"/>
+              <c:showSerName val="0"/>
+              <c:showPercent val="0"/>
+              <c:showBubbleSize val="0"/>
+              <c:extLst>
+                <c:ext xmlns:c15="http://schemas.microsoft.com/office/drawing/2012/chart" uri="{CE6537A1-D6FC-4f65-9D91-7224C49458BB}">
+                  <c15:layout>
+                    <c:manualLayout>
+                      <c:w val="0.15584857591604459"/>
+                      <c:h val="0.13216418780985711"/>
+                    </c:manualLayout>
+                  </c15:layout>
+                  <c15:showDataLabelsRange val="0"/>
+                </c:ext>
+                <c:ext xmlns:c16="http://schemas.microsoft.com/office/drawing/2014/chart" uri="{C3380CC4-5D6E-409C-BE32-E72D297353CC}">
+                  <c16:uniqueId val="{00000003-CA57-3344-9BBA-4D3F19CCB6BD}"/>
+                </c:ext>
+              </c:extLst>
+            </c:dLbl>
+            <c:spPr>
+              <a:noFill/>
+              <a:ln>
+                <a:noFill/>
+              </a:ln>
+              <a:effectLst/>
+            </c:spPr>
+            <c:txPr>
+              <a:bodyPr rot="0" spcFirstLastPara="1" vertOverflow="ellipsis" vert="horz" wrap="square" lIns="38100" tIns="19050" rIns="38100" bIns="19050" anchor="ctr" anchorCtr="1">
+                <a:spAutoFit/>
+              </a:bodyPr>
+              <a:lstStyle/>
+              <a:p>
+                <a:pPr>
+                  <a:defRPr sz="2400" b="0" i="0" u="none" strike="noStrike" kern="1200" baseline="0">
+                    <a:solidFill>
+                      <a:schemeClr val="tx1">
+                        <a:lumMod val="75000"/>
+                        <a:lumOff val="25000"/>
+                      </a:schemeClr>
+                    </a:solidFill>
+                    <a:latin typeface="+mn-lt"/>
+                    <a:ea typeface="+mn-ea"/>
+                    <a:cs typeface="+mn-cs"/>
+                  </a:defRPr>
+                </a:pPr>
+                <a:endParaRPr lang="en-FR"/>
+              </a:p>
+            </c:txPr>
+            <c:showLegendKey val="0"/>
+            <c:showVal val="1"/>
+            <c:showCatName val="1"/>
+            <c:showSerName val="0"/>
+            <c:showPercent val="0"/>
+            <c:showBubbleSize val="0"/>
+            <c:showLeaderLines val="1"/>
+            <c:leaderLines>
+              <c:spPr>
+                <a:ln w="9525" cap="flat" cmpd="sng" algn="ctr">
+                  <a:solidFill>
+                    <a:schemeClr val="tx1">
+                      <a:lumMod val="35000"/>
+                      <a:lumOff val="65000"/>
+                    </a:schemeClr>
+                  </a:solidFill>
+                  <a:round/>
+                </a:ln>
+                <a:effectLst/>
+              </c:spPr>
+            </c:leaderLines>
+            <c:extLst>
+              <c:ext xmlns:c15="http://schemas.microsoft.com/office/drawing/2012/chart" uri="{CE6537A1-D6FC-4f65-9D91-7224C49458BB}"/>
+            </c:extLst>
+          </c:dLbls>
+          <c:cat>
+            <c:strRef>
+              <c:f>Feuil1!$A$2:$A$3</c:f>
+              <c:strCache>
+                <c:ptCount val="2"/>
+                <c:pt idx="0">
+                  <c:v>Hibernation</c:v>
+                </c:pt>
+                <c:pt idx="1">
+                  <c:v>Saison active</c:v>
+                </c:pt>
+              </c:strCache>
+            </c:strRef>
+          </c:cat>
+          <c:val>
+            <c:numRef>
+              <c:f>Feuil1!$B$2:$B$3</c:f>
+              <c:numCache>
+                <c:formatCode>General</c:formatCode>
+                <c:ptCount val="2"/>
+                <c:pt idx="0">
+                  <c:v>7</c:v>
+                </c:pt>
+                <c:pt idx="1">
+                  <c:v>5</c:v>
+                </c:pt>
+              </c:numCache>
+            </c:numRef>
+          </c:val>
+          <c:extLst>
+            <c:ext xmlns:c16="http://schemas.microsoft.com/office/drawing/2014/chart" uri="{C3380CC4-5D6E-409C-BE32-E72D297353CC}">
+              <c16:uniqueId val="{00000004-CA57-3344-9BBA-4D3F19CCB6BD}"/>
+            </c:ext>
+          </c:extLst>
+        </c:ser>
+        <c:dLbls>
+          <c:showLegendKey val="0"/>
+          <c:showVal val="1"/>
+          <c:showCatName val="1"/>
+          <c:showSerName val="0"/>
+          <c:showPercent val="0"/>
+          <c:showBubbleSize val="0"/>
+          <c:showLeaderLines val="1"/>
+        </c:dLbls>
+        <c:firstSliceAng val="0"/>
+        <c:holeSize val="50"/>
+      </c:doughnutChart>
+      <c:spPr>
+        <a:noFill/>
+        <a:ln>
+          <a:noFill/>
+        </a:ln>
+        <a:effectLst/>
+      </c:spPr>
+    </c:plotArea>
+    <c:plotVisOnly val="1"/>
+    <c:dispBlanksAs val="gap"/>
+    <c:showDLblsOverMax val="0"/>
+    <c:extLst>
+      <c:ext xmlns:c16r3="http://schemas.microsoft.com/office/drawing/2017/03/chart" uri="{56B9EC1D-385E-4148-901F-78D8002777C0}">
+        <c16r3:dataDisplayOptions16>
+          <c16r3:dispNaAsBlank val="1"/>
+        </c16r3:dataDisplayOptions16>
+      </c:ext>
+    </c:extLst>
+  </c:chart>
+  <c:spPr>
+    <a:noFill/>
+    <a:ln>
+      <a:noFill/>
+    </a:ln>
+    <a:effectLst/>
+  </c:spPr>
+  <c:txPr>
+    <a:bodyPr/>
+    <a:lstStyle/>
+    <a:p>
+      <a:pPr>
+        <a:defRPr/>
+      </a:pPr>
+      <a:endParaRPr lang="en-FR"/>
+    </a:p>
+  </c:txPr>
+  <c:externalData r:id="rId4">
+    <c:autoUpdate val="0"/>
+  </c:externalData>
+</c:chartSpace>
+</file>
+
+<file path=ppt/charts/colors1.xml><?xml version="1.0" encoding="utf-8"?>
+<cs:colorStyle xmlns:cs="http://schemas.microsoft.com/office/drawing/2012/chartStyle" xmlns:a="http://schemas.openxmlformats.org/drawingml/2006/main" meth="cycle" id="10">
+  <a:schemeClr val="accent1"/>
+  <a:schemeClr val="accent2"/>
+  <a:schemeClr val="accent3"/>
+  <a:schemeClr val="accent4"/>
+  <a:schemeClr val="accent5"/>
+  <a:schemeClr val="accent6"/>
+  <cs:variation/>
+  <cs:variation>
+    <a:lumMod val="60000"/>
+  </cs:variation>
+  <cs:variation>
+    <a:lumMod val="80000"/>
+    <a:lumOff val="20000"/>
+  </cs:variation>
+  <cs:variation>
+    <a:lumMod val="80000"/>
+  </cs:variation>
+  <cs:variation>
+    <a:lumMod val="60000"/>
+    <a:lumOff val="40000"/>
+  </cs:variation>
+  <cs:variation>
+    <a:lumMod val="50000"/>
+  </cs:variation>
+  <cs:variation>
+    <a:lumMod val="70000"/>
+    <a:lumOff val="30000"/>
+  </cs:variation>
+  <cs:variation>
+    <a:lumMod val="70000"/>
+  </cs:variation>
+  <cs:variation>
+    <a:lumMod val="50000"/>
+    <a:lumOff val="50000"/>
+  </cs:variation>
+</cs:colorStyle>
+</file>
+
+<file path=ppt/charts/style1.xml><?xml version="1.0" encoding="utf-8"?>
+<cs:chartStyle xmlns:cs="http://schemas.microsoft.com/office/drawing/2012/chartStyle" xmlns:a="http://schemas.openxmlformats.org/drawingml/2006/main" id="251">
+  <cs:axisTitle>
+    <cs:lnRef idx="0"/>
+    <cs:fillRef idx="0"/>
+    <cs:effectRef idx="0"/>
+    <cs:fontRef idx="minor">
+      <a:schemeClr val="tx1">
+        <a:lumMod val="65000"/>
+        <a:lumOff val="35000"/>
+      </a:schemeClr>
+    </cs:fontRef>
+    <cs:defRPr sz="1330" kern="1200"/>
+  </cs:axisTitle>
+  <cs:categoryAxis>
+    <cs:lnRef idx="0"/>
+    <cs:fillRef idx="0"/>
+    <cs:effectRef idx="0"/>
+    <cs:fontRef idx="minor">
+      <a:schemeClr val="tx1">
+        <a:lumMod val="65000"/>
+        <a:lumOff val="35000"/>
+      </a:schemeClr>
+    </cs:fontRef>
+    <cs:spPr>
+      <a:ln w="9525" cap="flat" cmpd="sng" algn="ctr">
+        <a:solidFill>
+          <a:schemeClr val="tx1">
+            <a:lumMod val="15000"/>
+            <a:lumOff val="85000"/>
+          </a:schemeClr>
+        </a:solidFill>
+        <a:round/>
+      </a:ln>
+    </cs:spPr>
+    <cs:defRPr sz="1197" kern="1200"/>
+  </cs:categoryAxis>
+  <cs:chartArea mods="allowNoFillOverride allowNoLineOverride">
+    <cs:lnRef idx="0"/>
+    <cs:fillRef idx="0"/>
+    <cs:effectRef idx="0"/>
+    <cs:fontRef idx="minor">
+      <a:schemeClr val="tx1"/>
+    </cs:fontRef>
+    <cs:spPr>
+      <a:solidFill>
+        <a:schemeClr val="bg1"/>
+      </a:solidFill>
+      <a:ln w="9525" cap="flat" cmpd="sng" algn="ctr">
+        <a:solidFill>
+          <a:schemeClr val="tx1">
+            <a:lumMod val="15000"/>
+            <a:lumOff val="85000"/>
+          </a:schemeClr>
+        </a:solidFill>
+        <a:round/>
+      </a:ln>
+    </cs:spPr>
+    <cs:defRPr sz="1197" kern="1200"/>
+  </cs:chartArea>
+  <cs:dataLabel>
+    <cs:lnRef idx="0"/>
+    <cs:fillRef idx="0"/>
+    <cs:effectRef idx="0"/>
+    <cs:fontRef idx="minor">
+      <a:schemeClr val="tx1">
+        <a:lumMod val="75000"/>
+        <a:lumOff val="25000"/>
+      </a:schemeClr>
+    </cs:fontRef>
+    <cs:defRPr sz="1197" kern="1200"/>
+  </cs:dataLabel>
+  <cs:dataLabelCallout>
+    <cs:lnRef idx="0"/>
+    <cs:fillRef idx="0"/>
+    <cs:effectRef idx="0"/>
+    <cs:fontRef idx="minor">
+      <a:schemeClr val="dk1">
+        <a:lumMod val="65000"/>
+        <a:lumOff val="35000"/>
+      </a:schemeClr>
+    </cs:fontRef>
+    <cs:spPr>
+      <a:solidFill>
+        <a:schemeClr val="lt1"/>
+      </a:solidFill>
+      <a:ln>
+        <a:solidFill>
+          <a:schemeClr val="dk1">
+            <a:lumMod val="25000"/>
+            <a:lumOff val="75000"/>
+          </a:schemeClr>
+        </a:solidFill>
+      </a:ln>
+    </cs:spPr>
+    <cs:defRPr sz="1197" kern="1200"/>
+    <cs:bodyPr rot="0" spcFirstLastPara="1" vertOverflow="clip" horzOverflow="clip" vert="horz" wrap="square" lIns="36576" tIns="18288" rIns="36576" bIns="18288" anchor="ctr" anchorCtr="1">
+      <a:spAutoFit/>
+    </cs:bodyPr>
+  </cs:dataLabelCallout>
+  <cs:dataPoint>
+    <cs:lnRef idx="0"/>
+    <cs:fillRef idx="1">
+      <cs:styleClr val="auto"/>
+    </cs:fillRef>
+    <cs:effectRef idx="0"/>
+    <cs:fontRef idx="minor">
+      <a:schemeClr val="tx1"/>
+    </cs:fontRef>
+    <cs:spPr>
+      <a:ln w="19050">
+        <a:solidFill>
+          <a:schemeClr val="lt1"/>
+        </a:solidFill>
+      </a:ln>
+    </cs:spPr>
+  </cs:dataPoint>
+  <cs:dataPoint3D>
+    <cs:lnRef idx="0"/>
+    <cs:fillRef idx="1">
+      <cs:styleClr val="auto"/>
+    </cs:fillRef>
+    <cs:effectRef idx="0"/>
+    <cs:fontRef idx="minor">
+      <a:schemeClr val="tx1"/>
+    </cs:fontRef>
+    <cs:spPr>
+      <a:ln w="25400">
+        <a:solidFill>
+          <a:schemeClr val="lt1"/>
+        </a:solidFill>
+      </a:ln>
+    </cs:spPr>
+  </cs:dataPoint3D>
+  <cs:dataPointLine>
+    <cs:lnRef idx="0">
+      <cs:styleClr val="auto"/>
+    </cs:lnRef>
+    <cs:fillRef idx="0"/>
+    <cs:effectRef idx="0"/>
+    <cs:fontRef idx="minor">
+      <a:schemeClr val="tx1"/>
+    </cs:fontRef>
+    <cs:spPr>
+      <a:ln w="28575" cap="rnd">
+        <a:solidFill>
+          <a:schemeClr val="phClr"/>
+        </a:solidFill>
+        <a:round/>
+      </a:ln>
+    </cs:spPr>
+  </cs:dataPointLine>
+  <cs:dataPointMarker>
+    <cs:lnRef idx="0">
+      <cs:styleClr val="auto"/>
+    </cs:lnRef>
+    <cs:fillRef idx="1">
+      <cs:styleClr val="auto"/>
+    </cs:fillRef>
+    <cs:effectRef idx="0"/>
+    <cs:fontRef idx="minor">
+      <a:schemeClr val="tx1"/>
+    </cs:fontRef>
+    <cs:spPr>
+      <a:ln w="9525">
+        <a:solidFill>
+          <a:schemeClr val="phClr"/>
+        </a:solidFill>
+      </a:ln>
+    </cs:spPr>
+  </cs:dataPointMarker>
+  <cs:dataPointMarkerLayout symbol="circle" size="5"/>
+  <cs:dataPointWireframe>
+    <cs:lnRef idx="0">
+      <cs:styleClr val="auto"/>
+    </cs:lnRef>
+    <cs:fillRef idx="0"/>
+    <cs:effectRef idx="0"/>
+    <cs:fontRef idx="minor">
+      <a:schemeClr val="tx1"/>
+    </cs:fontRef>
+    <cs:spPr>
+      <a:ln w="9525" cap="rnd">
+        <a:solidFill>
+          <a:schemeClr val="phClr"/>
+        </a:solidFill>
+        <a:round/>
+      </a:ln>
+    </cs:spPr>
+  </cs:dataPointWireframe>
+  <cs:dataTable>
+    <cs:lnRef idx="0"/>
+    <cs:fillRef idx="0"/>
+    <cs:effectRef idx="0"/>
+    <cs:fontRef idx="minor">
+      <a:schemeClr val="tx1">
+        <a:lumMod val="65000"/>
+        <a:lumOff val="35000"/>
+      </a:schemeClr>
+    </cs:fontRef>
+    <cs:spPr>
+      <a:noFill/>
+      <a:ln w="9525" cap="flat" cmpd="sng" algn="ctr">
+        <a:solidFill>
+          <a:schemeClr val="tx1">
+            <a:lumMod val="15000"/>
+            <a:lumOff val="85000"/>
+          </a:schemeClr>
+        </a:solidFill>
+        <a:round/>
+      </a:ln>
+    </cs:spPr>
+    <cs:defRPr sz="1197" kern="1200"/>
+  </cs:dataTable>
+  <cs:downBar>
+    <cs:lnRef idx="0"/>
+    <cs:fillRef idx="0"/>
+    <cs:effectRef idx="0"/>
+    <cs:fontRef idx="minor">
+      <a:schemeClr val="tx1"/>
+    </cs:fontRef>
+    <cs:spPr>
+      <a:solidFill>
+        <a:schemeClr val="dk1">
+          <a:lumMod val="75000"/>
+          <a:lumOff val="25000"/>
+        </a:schemeClr>
+      </a:solidFill>
+      <a:ln w="9525" cap="flat" cmpd="sng" algn="ctr">
+        <a:solidFill>
+          <a:schemeClr val="tx1">
+            <a:lumMod val="65000"/>
+            <a:lumOff val="35000"/>
+          </a:schemeClr>
+        </a:solidFill>
+        <a:round/>
+      </a:ln>
+    </cs:spPr>
+  </cs:downBar>
+  <cs:dropLine>
+    <cs:lnRef idx="0"/>
+    <cs:fillRef idx="0"/>
+    <cs:effectRef idx="0"/>
+    <cs:fontRef idx="minor">
+      <a:schemeClr val="tx1"/>
+    </cs:fontRef>
+    <cs:spPr>
+      <a:ln w="9525" cap="flat" cmpd="sng" algn="ctr">
+        <a:solidFill>
+          <a:schemeClr val="tx1">
+            <a:lumMod val="35000"/>
+            <a:lumOff val="65000"/>
+          </a:schemeClr>
+        </a:solidFill>
+        <a:round/>
+      </a:ln>
+    </cs:spPr>
+  </cs:dropLine>
+  <cs:errorBar>
+    <cs:lnRef idx="0"/>
+    <cs:fillRef idx="0"/>
+    <cs:effectRef idx="0"/>
+    <cs:fontRef idx="minor">
+      <a:schemeClr val="tx1"/>
+    </cs:fontRef>
+    <cs:spPr>
+      <a:ln w="9525" cap="flat" cmpd="sng" algn="ctr">
+        <a:solidFill>
+          <a:schemeClr val="tx1">
+            <a:lumMod val="65000"/>
+            <a:lumOff val="35000"/>
+          </a:schemeClr>
+        </a:solidFill>
+        <a:round/>
+      </a:ln>
+    </cs:spPr>
+  </cs:errorBar>
+  <cs:floor>
+    <cs:lnRef idx="0"/>
+    <cs:fillRef idx="0"/>
+    <cs:effectRef idx="0"/>
+    <cs:fontRef idx="minor">
+      <a:schemeClr val="tx1"/>
+    </cs:fontRef>
+    <cs:spPr>
+      <a:noFill/>
+      <a:ln>
+        <a:noFill/>
+      </a:ln>
+    </cs:spPr>
+  </cs:floor>
+  <cs:gridlineMajor>
+    <cs:lnRef idx="0"/>
+    <cs:fillRef idx="0"/>
+    <cs:effectRef idx="0"/>
+    <cs:fontRef idx="minor">
+      <a:schemeClr val="tx1"/>
+    </cs:fontRef>
+    <cs:spPr>
+      <a:ln w="9525" cap="flat" cmpd="sng" algn="ctr">
+        <a:solidFill>
+          <a:schemeClr val="tx1">
+            <a:lumMod val="15000"/>
+            <a:lumOff val="85000"/>
+          </a:schemeClr>
+        </a:solidFill>
+        <a:round/>
+      </a:ln>
+    </cs:spPr>
+  </cs:gridlineMajor>
+  <cs:gridlineMinor>
+    <cs:lnRef idx="0"/>
+    <cs:fillRef idx="0"/>
+    <cs:effectRef idx="0"/>
+    <cs:fontRef idx="minor">
+      <a:schemeClr val="tx1"/>
+    </cs:fontRef>
+    <cs:spPr>
+      <a:ln w="9525" cap="flat" cmpd="sng" algn="ctr">
+        <a:solidFill>
+          <a:schemeClr val="tx1">
+            <a:lumMod val="5000"/>
+            <a:lumOff val="95000"/>
+          </a:schemeClr>
+        </a:solidFill>
+        <a:round/>
+      </a:ln>
+    </cs:spPr>
+  </cs:gridlineMinor>
+  <cs:hiLoLine>
+    <cs:lnRef idx="0"/>
+    <cs:fillRef idx="0"/>
+    <cs:effectRef idx="0"/>
+    <cs:fontRef idx="minor">
+      <a:schemeClr val="tx1"/>
+    </cs:fontRef>
+    <cs:spPr>
+      <a:ln w="9525" cap="flat" cmpd="sng" algn="ctr">
+        <a:solidFill>
+          <a:schemeClr val="tx1">
+            <a:lumMod val="50000"/>
+            <a:lumOff val="50000"/>
+          </a:schemeClr>
+        </a:solidFill>
+        <a:round/>
+      </a:ln>
+    </cs:spPr>
+  </cs:hiLoLine>
+  <cs:leaderLine>
+    <cs:lnRef idx="0"/>
+    <cs:fillRef idx="0"/>
+    <cs:effectRef idx="0"/>
+    <cs:fontRef idx="minor">
+      <a:schemeClr val="tx1"/>
+    </cs:fontRef>
+    <cs:spPr>
+      <a:ln w="9525" cap="flat" cmpd="sng" algn="ctr">
+        <a:solidFill>
+          <a:schemeClr val="tx1">
+            <a:lumMod val="35000"/>
+            <a:lumOff val="65000"/>
+          </a:schemeClr>
+        </a:solidFill>
+        <a:round/>
+      </a:ln>
+    </cs:spPr>
+  </cs:leaderLine>
+  <cs:legend>
+    <cs:lnRef idx="0"/>
+    <cs:fillRef idx="0"/>
+    <cs:effectRef idx="0"/>
+    <cs:fontRef idx="minor">
+      <a:schemeClr val="tx1">
+        <a:lumMod val="65000"/>
+        <a:lumOff val="35000"/>
+      </a:schemeClr>
+    </cs:fontRef>
+    <cs:defRPr sz="1197" kern="1200"/>
+  </cs:legend>
+  <cs:plotArea mods="allowNoFillOverride allowNoLineOverride">
+    <cs:lnRef idx="0"/>
+    <cs:fillRef idx="0"/>
+    <cs:effectRef idx="0"/>
+    <cs:fontRef idx="minor">
+      <a:schemeClr val="tx1"/>
+    </cs:fontRef>
+  </cs:plotArea>
+  <cs:plotArea3D mods="allowNoFillOverride allowNoLineOverride">
+    <cs:lnRef idx="0"/>
+    <cs:fillRef idx="0"/>
+    <cs:effectRef idx="0"/>
+    <cs:fontRef idx="minor">
+      <a:schemeClr val="tx1"/>
+    </cs:fontRef>
+  </cs:plotArea3D>
+  <cs:seriesAxis>
+    <cs:lnRef idx="0"/>
+    <cs:fillRef idx="0"/>
+    <cs:effectRef idx="0"/>
+    <cs:fontRef idx="minor">
+      <a:schemeClr val="tx1">
+        <a:lumMod val="65000"/>
+        <a:lumOff val="35000"/>
+      </a:schemeClr>
+    </cs:fontRef>
+    <cs:defRPr sz="1197" kern="1200"/>
+  </cs:seriesAxis>
+  <cs:seriesLine>
+    <cs:lnRef idx="0"/>
+    <cs:fillRef idx="0"/>
+    <cs:effectRef idx="0"/>
+    <cs:fontRef idx="minor">
+      <a:schemeClr val="tx1"/>
+    </cs:fontRef>
+    <cs:spPr>
+      <a:ln w="9525" cap="flat" cmpd="sng" algn="ctr">
+        <a:solidFill>
+          <a:schemeClr val="tx1">
+            <a:lumMod val="35000"/>
+            <a:lumOff val="65000"/>
+          </a:schemeClr>
+        </a:solidFill>
+        <a:round/>
+      </a:ln>
+    </cs:spPr>
+  </cs:seriesLine>
+  <cs:title>
+    <cs:lnRef idx="0"/>
+    <cs:fillRef idx="0"/>
+    <cs:effectRef idx="0"/>
+    <cs:fontRef idx="minor">
+      <a:schemeClr val="tx1">
+        <a:lumMod val="65000"/>
+        <a:lumOff val="35000"/>
+      </a:schemeClr>
+    </cs:fontRef>
+    <cs:defRPr sz="1862" b="0" kern="1200" spc="0" baseline="0"/>
+  </cs:title>
+  <cs:trendline>
+    <cs:lnRef idx="0">
+      <cs:styleClr val="auto"/>
+    </cs:lnRef>
+    <cs:fillRef idx="0"/>
+    <cs:effectRef idx="0"/>
+    <cs:fontRef idx="minor">
+      <a:schemeClr val="tx1"/>
+    </cs:fontRef>
+    <cs:spPr>
+      <a:ln w="19050" cap="rnd">
+        <a:solidFill>
+          <a:schemeClr val="phClr"/>
+        </a:solidFill>
+        <a:prstDash val="sysDot"/>
+      </a:ln>
+    </cs:spPr>
+  </cs:trendline>
+  <cs:trendlineLabel>
+    <cs:lnRef idx="0"/>
+    <cs:fillRef idx="0"/>
+    <cs:effectRef idx="0"/>
+    <cs:fontRef idx="minor">
+      <a:schemeClr val="tx1">
+        <a:lumMod val="65000"/>
+        <a:lumOff val="35000"/>
+      </a:schemeClr>
+    </cs:fontRef>
+    <cs:defRPr sz="1197" kern="1200"/>
+  </cs:trendlineLabel>
+  <cs:upBar>
+    <cs:lnRef idx="0"/>
+    <cs:fillRef idx="0"/>
+    <cs:effectRef idx="0"/>
+    <cs:fontRef idx="minor">
+      <a:schemeClr val="tx1"/>
+    </cs:fontRef>
+    <cs:spPr>
+      <a:solidFill>
+        <a:schemeClr val="lt1"/>
+      </a:solidFill>
+      <a:ln w="9525" cap="flat" cmpd="sng" algn="ctr">
+        <a:solidFill>
+          <a:schemeClr val="tx1">
+            <a:lumMod val="65000"/>
+            <a:lumOff val="35000"/>
+          </a:schemeClr>
+        </a:solidFill>
+        <a:round/>
+      </a:ln>
+    </cs:spPr>
+  </cs:upBar>
+  <cs:valueAxis>
+    <cs:lnRef idx="0"/>
+    <cs:fillRef idx="0"/>
+    <cs:effectRef idx="0"/>
+    <cs:fontRef idx="minor">
+      <a:schemeClr val="tx1">
+        <a:lumMod val="65000"/>
+        <a:lumOff val="35000"/>
+      </a:schemeClr>
+    </cs:fontRef>
+    <cs:defRPr sz="1197" kern="1200"/>
+  </cs:valueAxis>
+  <cs:wall>
+    <cs:lnRef idx="0"/>
+    <cs:fillRef idx="0"/>
+    <cs:effectRef idx="0"/>
+    <cs:fontRef idx="minor">
+      <a:schemeClr val="tx1"/>
+    </cs:fontRef>
+    <cs:spPr>
+      <a:noFill/>
+      <a:ln>
+        <a:noFill/>
+      </a:ln>
+    </cs:spPr>
+  </cs:wall>
+</cs:chartStyle>
+</file>
+
 <file path=ppt/slideLayouts/slideLayout1.xml><?xml version="1.0" encoding="utf-8"?>
 <p:sldLayout xmlns:a="http://schemas.openxmlformats.org/drawingml/2006/main" xmlns:r="http://schemas.openxmlformats.org/officeDocument/2006/relationships" xmlns:p="http://schemas.openxmlformats.org/presentationml/2006/main" type="title" preserve="1">
   <p:cSld name="Title Slide">
@@ -262,7 +1216,7 @@
           <a:p>
             <a:fld id="{E0E97E3A-7EAE-AE47-B84C-E0DE5DFF029A}" type="datetimeFigureOut">
               <a:rPr lang="en-US" smtClean="0"/>
-              <a:t>3/5/25</a:t>
+              <a:t>7/17/25</a:t>
             </a:fld>
             <a:endParaRPr lang="en-US"/>
           </a:p>
@@ -460,7 +1414,7 @@
           <a:p>
             <a:fld id="{E0E97E3A-7EAE-AE47-B84C-E0DE5DFF029A}" type="datetimeFigureOut">
               <a:rPr lang="en-US" smtClean="0"/>
-              <a:t>3/5/25</a:t>
+              <a:t>7/17/25</a:t>
             </a:fld>
             <a:endParaRPr lang="en-US"/>
           </a:p>
@@ -668,7 +1622,7 @@
           <a:p>
             <a:fld id="{E0E97E3A-7EAE-AE47-B84C-E0DE5DFF029A}" type="datetimeFigureOut">
               <a:rPr lang="en-US" smtClean="0"/>
-              <a:t>3/5/25</a:t>
+              <a:t>7/17/25</a:t>
             </a:fld>
             <a:endParaRPr lang="en-US"/>
           </a:p>
@@ -866,7 +1820,7 @@
           <a:p>
             <a:fld id="{E0E97E3A-7EAE-AE47-B84C-E0DE5DFF029A}" type="datetimeFigureOut">
               <a:rPr lang="en-US" smtClean="0"/>
-              <a:t>3/5/25</a:t>
+              <a:t>7/17/25</a:t>
             </a:fld>
             <a:endParaRPr lang="en-US"/>
           </a:p>
@@ -1141,7 +2095,7 @@
           <a:p>
             <a:fld id="{E0E97E3A-7EAE-AE47-B84C-E0DE5DFF029A}" type="datetimeFigureOut">
               <a:rPr lang="en-US" smtClean="0"/>
-              <a:t>3/5/25</a:t>
+              <a:t>7/17/25</a:t>
             </a:fld>
             <a:endParaRPr lang="en-US"/>
           </a:p>
@@ -1406,7 +2360,7 @@
           <a:p>
             <a:fld id="{E0E97E3A-7EAE-AE47-B84C-E0DE5DFF029A}" type="datetimeFigureOut">
               <a:rPr lang="en-US" smtClean="0"/>
-              <a:t>3/5/25</a:t>
+              <a:t>7/17/25</a:t>
             </a:fld>
             <a:endParaRPr lang="en-US"/>
           </a:p>
@@ -1818,7 +2772,7 @@
           <a:p>
             <a:fld id="{E0E97E3A-7EAE-AE47-B84C-E0DE5DFF029A}" type="datetimeFigureOut">
               <a:rPr lang="en-US" smtClean="0"/>
-              <a:t>3/5/25</a:t>
+              <a:t>7/17/25</a:t>
             </a:fld>
             <a:endParaRPr lang="en-US"/>
           </a:p>
@@ -1959,7 +2913,7 @@
           <a:p>
             <a:fld id="{E0E97E3A-7EAE-AE47-B84C-E0DE5DFF029A}" type="datetimeFigureOut">
               <a:rPr lang="en-US" smtClean="0"/>
-              <a:t>3/5/25</a:t>
+              <a:t>7/17/25</a:t>
             </a:fld>
             <a:endParaRPr lang="en-US"/>
           </a:p>
@@ -2072,7 +3026,7 @@
           <a:p>
             <a:fld id="{E0E97E3A-7EAE-AE47-B84C-E0DE5DFF029A}" type="datetimeFigureOut">
               <a:rPr lang="en-US" smtClean="0"/>
-              <a:t>3/5/25</a:t>
+              <a:t>7/17/25</a:t>
             </a:fld>
             <a:endParaRPr lang="en-US"/>
           </a:p>
@@ -2383,7 +3337,7 @@
           <a:p>
             <a:fld id="{E0E97E3A-7EAE-AE47-B84C-E0DE5DFF029A}" type="datetimeFigureOut">
               <a:rPr lang="en-US" smtClean="0"/>
-              <a:t>3/5/25</a:t>
+              <a:t>7/17/25</a:t>
             </a:fld>
             <a:endParaRPr lang="en-US"/>
           </a:p>
@@ -2671,7 +3625,7 @@
           <a:p>
             <a:fld id="{E0E97E3A-7EAE-AE47-B84C-E0DE5DFF029A}" type="datetimeFigureOut">
               <a:rPr lang="en-US" smtClean="0"/>
-              <a:t>3/5/25</a:t>
+              <a:t>7/17/25</a:t>
             </a:fld>
             <a:endParaRPr lang="en-US"/>
           </a:p>
@@ -2912,7 +3866,7 @@
           <a:p>
             <a:fld id="{E0E97E3A-7EAE-AE47-B84C-E0DE5DFF029A}" type="datetimeFigureOut">
               <a:rPr lang="en-US" smtClean="0"/>
-              <a:t>3/5/25</a:t>
+              <a:t>7/17/25</a:t>
             </a:fld>
             <a:endParaRPr lang="en-US"/>
           </a:p>
@@ -8555,8 +9509,8 @@
           </a:p>
         </p:txBody>
       </p:sp>
-      <mc:AlternateContent xmlns:mc="http://schemas.openxmlformats.org/markup-compatibility/2006">
-        <mc:Choice xmlns:a14="http://schemas.microsoft.com/office/drawing/2010/main" Requires="a14">
+      <mc:AlternateContent xmlns:mc="http://schemas.openxmlformats.org/markup-compatibility/2006" xmlns:a14="http://schemas.microsoft.com/office/drawing/2010/main">
+        <mc:Choice Requires="a14">
           <p:sp>
             <p:nvSpPr>
               <p:cNvPr id="15" name="Rectangle : coins arrondis 4">
@@ -8629,7 +9583,7 @@
             </p:txBody>
           </p:sp>
         </mc:Choice>
-        <mc:Fallback>
+        <mc:Fallback xmlns="">
           <p:sp>
             <p:nvSpPr>
               <p:cNvPr id="15" name="Rectangle : coins arrondis 4">
@@ -12782,6 +13736,309 @@
     <p:extLst>
       <p:ext uri="{BB962C8B-B14F-4D97-AF65-F5344CB8AC3E}">
         <p14:creationId xmlns:p14="http://schemas.microsoft.com/office/powerpoint/2010/main" val="2226311445"/>
+      </p:ext>
+    </p:extLst>
+  </p:cSld>
+  <p:clrMapOvr>
+    <a:masterClrMapping/>
+  </p:clrMapOvr>
+</p:sld>
+</file>
+
+<file path=ppt/slides/slide5.xml><?xml version="1.0" encoding="utf-8"?>
+<p:sld xmlns:a="http://schemas.openxmlformats.org/drawingml/2006/main" xmlns:r="http://schemas.openxmlformats.org/officeDocument/2006/relationships" xmlns:p="http://schemas.openxmlformats.org/presentationml/2006/main">
+  <p:cSld>
+    <p:spTree>
+      <p:nvGrpSpPr>
+        <p:cNvPr id="1" name=""/>
+        <p:cNvGrpSpPr/>
+        <p:nvPr/>
+      </p:nvGrpSpPr>
+      <p:grpSpPr>
+        <a:xfrm>
+          <a:off x="0" y="0"/>
+          <a:ext cx="0" cy="0"/>
+          <a:chOff x="0" y="0"/>
+          <a:chExt cx="0" cy="0"/>
+        </a:xfrm>
+      </p:grpSpPr>
+      <p:grpSp>
+        <p:nvGrpSpPr>
+          <p:cNvPr id="10" name="Groupe 18">
+            <a:extLst>
+              <a:ext uri="{FF2B5EF4-FFF2-40B4-BE49-F238E27FC236}">
+                <a16:creationId xmlns:a16="http://schemas.microsoft.com/office/drawing/2014/main" id="{BB2CF0A8-B1CA-24B2-F129-594A73631D69}"/>
+              </a:ext>
+            </a:extLst>
+          </p:cNvPr>
+          <p:cNvGrpSpPr>
+            <a:grpSpLocks noChangeAspect="1"/>
+          </p:cNvGrpSpPr>
+          <p:nvPr/>
+        </p:nvGrpSpPr>
+        <p:grpSpPr>
+          <a:xfrm>
+            <a:off x="1698998" y="0"/>
+            <a:ext cx="8794004" cy="6858000"/>
+            <a:chOff x="8305800" y="2743200"/>
+            <a:chExt cx="4114799" cy="3208924"/>
+          </a:xfrm>
+        </p:grpSpPr>
+        <p:graphicFrame>
+          <p:nvGraphicFramePr>
+            <p:cNvPr id="11" name="Graphique 11">
+              <a:extLst>
+                <a:ext uri="{FF2B5EF4-FFF2-40B4-BE49-F238E27FC236}">
+                  <a16:creationId xmlns:a16="http://schemas.microsoft.com/office/drawing/2014/main" id="{616C3F75-149E-B789-CF3A-186912BEC770}"/>
+                </a:ext>
+              </a:extLst>
+            </p:cNvPr>
+            <p:cNvGraphicFramePr/>
+            <p:nvPr>
+              <p:extLst>
+                <p:ext uri="{D42A27DB-BD31-4B8C-83A1-F6EECF244321}">
+                  <p14:modId xmlns:p14="http://schemas.microsoft.com/office/powerpoint/2010/main" val="3986465635"/>
+                </p:ext>
+              </p:extLst>
+            </p:nvPr>
+          </p:nvGraphicFramePr>
+          <p:xfrm>
+            <a:off x="8305800" y="2743200"/>
+            <a:ext cx="4114799" cy="3208924"/>
+          </p:xfrm>
+          <a:graphic>
+            <a:graphicData uri="http://schemas.openxmlformats.org/drawingml/2006/chart">
+              <c:chart xmlns:c="http://schemas.openxmlformats.org/drawingml/2006/chart" xmlns:r="http://schemas.openxmlformats.org/officeDocument/2006/relationships" r:id="rId2"/>
+            </a:graphicData>
+          </a:graphic>
+        </p:graphicFrame>
+        <p:pic>
+          <p:nvPicPr>
+            <p:cNvPr id="12" name="Graphique 7" descr="Réduit (soleil moyen) avec un remplissage uni">
+              <a:extLst>
+                <a:ext uri="{FF2B5EF4-FFF2-40B4-BE49-F238E27FC236}">
+                  <a16:creationId xmlns:a16="http://schemas.microsoft.com/office/drawing/2014/main" id="{B664E5D4-DEB4-8AE2-21A0-4632B340CC18}"/>
+                </a:ext>
+              </a:extLst>
+            </p:cNvPr>
+            <p:cNvPicPr>
+              <a:picLocks noChangeAspect="1"/>
+            </p:cNvPicPr>
+            <p:nvPr/>
+          </p:nvPicPr>
+          <p:blipFill>
+            <a:blip r:embed="rId3">
+              <a:extLst>
+                <a:ext uri="{96DAC541-7B7A-43D3-8B79-37D633B846F1}">
+                  <asvg:svgBlip xmlns:asvg="http://schemas.microsoft.com/office/drawing/2016/SVG/main" r:embed="rId4"/>
+                </a:ext>
+              </a:extLst>
+            </a:blip>
+            <a:stretch>
+              <a:fillRect/>
+            </a:stretch>
+          </p:blipFill>
+          <p:spPr>
+            <a:xfrm>
+              <a:off x="8550357" y="3001009"/>
+              <a:ext cx="805677" cy="805677"/>
+            </a:xfrm>
+            <a:prstGeom prst="rect">
+              <a:avLst/>
+            </a:prstGeom>
+          </p:spPr>
+        </p:pic>
+        <p:pic>
+          <p:nvPicPr>
+            <p:cNvPr id="13" name="Graphique 12" descr="Neige avec un remplissage uni">
+              <a:extLst>
+                <a:ext uri="{FF2B5EF4-FFF2-40B4-BE49-F238E27FC236}">
+                  <a16:creationId xmlns:a16="http://schemas.microsoft.com/office/drawing/2014/main" id="{4778A9D4-8B9A-30F4-3E78-7607CAE7A13E}"/>
+                </a:ext>
+              </a:extLst>
+            </p:cNvPr>
+            <p:cNvPicPr>
+              <a:picLocks noChangeAspect="1"/>
+            </p:cNvPicPr>
+            <p:nvPr/>
+          </p:nvPicPr>
+          <p:blipFill>
+            <a:blip r:embed="rId5">
+              <a:extLst>
+                <a:ext uri="{96DAC541-7B7A-43D3-8B79-37D633B846F1}">
+                  <asvg:svgBlip xmlns:asvg="http://schemas.microsoft.com/office/drawing/2016/SVG/main" r:embed="rId6"/>
+                </a:ext>
+              </a:extLst>
+            </a:blip>
+            <a:stretch>
+              <a:fillRect/>
+            </a:stretch>
+          </p:blipFill>
+          <p:spPr>
+            <a:xfrm>
+              <a:off x="11387161" y="4890932"/>
+              <a:ext cx="806400" cy="806400"/>
+            </a:xfrm>
+            <a:prstGeom prst="rect">
+              <a:avLst/>
+            </a:prstGeom>
+          </p:spPr>
+        </p:pic>
+        <p:sp>
+          <p:nvSpPr>
+            <p:cNvPr id="14" name="ZoneTexte 14">
+              <a:extLst>
+                <a:ext uri="{FF2B5EF4-FFF2-40B4-BE49-F238E27FC236}">
+                  <a16:creationId xmlns:a16="http://schemas.microsoft.com/office/drawing/2014/main" id="{CF22F777-5F9F-A691-EE64-3445E3793971}"/>
+                </a:ext>
+              </a:extLst>
+            </p:cNvPr>
+            <p:cNvSpPr txBox="1"/>
+            <p:nvPr/>
+          </p:nvSpPr>
+          <p:spPr>
+            <a:xfrm>
+              <a:off x="9277600" y="5431218"/>
+              <a:ext cx="737056" cy="328960"/>
+            </a:xfrm>
+            <a:prstGeom prst="rect">
+              <a:avLst/>
+            </a:prstGeom>
+            <a:noFill/>
+          </p:spPr>
+          <p:txBody>
+            <a:bodyPr wrap="square" rtlCol="0">
+              <a:spAutoFit/>
+            </a:bodyPr>
+            <a:lstStyle/>
+            <a:p>
+              <a:pPr marL="0" marR="0" lvl="0" indent="0" defTabSz="457200" eaLnBrk="1" fontAlgn="auto" latinLnBrk="0" hangingPunct="1">
+                <a:lnSpc>
+                  <a:spcPct val="100000"/>
+                </a:lnSpc>
+                <a:spcBef>
+                  <a:spcPts val="0"/>
+                </a:spcBef>
+                <a:spcAft>
+                  <a:spcPts val="0"/>
+                </a:spcAft>
+                <a:buClrTx/>
+                <a:buSzTx/>
+                <a:buFontTx/>
+                <a:buNone/>
+                <a:tabLst/>
+                <a:defRPr/>
+              </a:pPr>
+              <a:r>
+                <a:rPr kumimoji="0" lang="fr-FR" sz="2400" b="0" i="0" u="none" strike="noStrike" kern="0" cap="none" spc="0" normalizeH="0" baseline="0" noProof="0" dirty="0">
+                  <a:ln>
+                    <a:noFill/>
+                  </a:ln>
+                  <a:solidFill>
+                    <a:sysClr val="windowText" lastClr="000000"/>
+                  </a:solidFill>
+                  <a:effectLst/>
+                  <a:uLnTx/>
+                  <a:uFillTx/>
+                  <a:latin typeface="Avenir Next LT Pro Light"/>
+                </a:rPr>
+                <a:t>May</a:t>
+              </a:r>
+              <a:endParaRPr kumimoji="0" lang="fr-FR" sz="6000" b="0" i="0" u="none" strike="noStrike" kern="0" cap="none" spc="0" normalizeH="0" baseline="0" noProof="0" dirty="0">
+                <a:ln>
+                  <a:noFill/>
+                </a:ln>
+                <a:solidFill>
+                  <a:prstClr val="black"/>
+                </a:solidFill>
+                <a:effectLst/>
+                <a:uLnTx/>
+                <a:uFillTx/>
+                <a:latin typeface="Avenir Next LT Pro Light"/>
+              </a:endParaRPr>
+            </a:p>
+          </p:txBody>
+        </p:sp>
+        <p:sp>
+          <p:nvSpPr>
+            <p:cNvPr id="15" name="ZoneTexte 15">
+              <a:extLst>
+                <a:ext uri="{FF2B5EF4-FFF2-40B4-BE49-F238E27FC236}">
+                  <a16:creationId xmlns:a16="http://schemas.microsoft.com/office/drawing/2014/main" id="{078DB461-8EC2-8A82-8DE6-A49F6CD83676}"/>
+                </a:ext>
+              </a:extLst>
+            </p:cNvPr>
+            <p:cNvSpPr txBox="1"/>
+            <p:nvPr/>
+          </p:nvSpPr>
+          <p:spPr>
+            <a:xfrm>
+              <a:off x="9770761" y="2755903"/>
+              <a:ext cx="1616400" cy="328960"/>
+            </a:xfrm>
+            <a:prstGeom prst="rect">
+              <a:avLst/>
+            </a:prstGeom>
+            <a:noFill/>
+          </p:spPr>
+          <p:txBody>
+            <a:bodyPr wrap="square" rtlCol="0">
+              <a:spAutoFit/>
+            </a:bodyPr>
+            <a:lstStyle/>
+            <a:p>
+              <a:pPr marL="0" marR="0" lvl="0" indent="0" defTabSz="457200" eaLnBrk="1" fontAlgn="auto" latinLnBrk="0" hangingPunct="1">
+                <a:lnSpc>
+                  <a:spcPct val="100000"/>
+                </a:lnSpc>
+                <a:spcBef>
+                  <a:spcPts val="0"/>
+                </a:spcBef>
+                <a:spcAft>
+                  <a:spcPts val="0"/>
+                </a:spcAft>
+                <a:buClrTx/>
+                <a:buSzTx/>
+                <a:buFontTx/>
+                <a:buNone/>
+                <a:tabLst/>
+                <a:defRPr/>
+              </a:pPr>
+              <a:r>
+                <a:rPr kumimoji="0" lang="fr-FR" sz="2400" b="0" i="0" u="none" strike="noStrike" kern="0" cap="none" spc="0" normalizeH="0" baseline="0" noProof="0" dirty="0">
+                  <a:ln>
+                    <a:noFill/>
+                  </a:ln>
+                  <a:solidFill>
+                    <a:sysClr val="windowText" lastClr="000000"/>
+                  </a:solidFill>
+                  <a:effectLst/>
+                  <a:uLnTx/>
+                  <a:uFillTx/>
+                  <a:latin typeface="Avenir Next LT Pro Light"/>
+                </a:rPr>
+                <a:t>September</a:t>
+              </a:r>
+              <a:endParaRPr kumimoji="0" lang="fr-FR" sz="4000" b="0" i="0" u="none" strike="noStrike" kern="0" cap="none" spc="0" normalizeH="0" baseline="0" noProof="0" dirty="0">
+                <a:ln>
+                  <a:noFill/>
+                </a:ln>
+                <a:solidFill>
+                  <a:prstClr val="black"/>
+                </a:solidFill>
+                <a:effectLst/>
+                <a:uLnTx/>
+                <a:uFillTx/>
+                <a:latin typeface="Avenir Next LT Pro Light"/>
+              </a:endParaRPr>
+            </a:p>
+          </p:txBody>
+        </p:sp>
+      </p:grpSp>
+    </p:spTree>
+    <p:extLst>
+      <p:ext uri="{BB962C8B-B14F-4D97-AF65-F5344CB8AC3E}">
+        <p14:creationId xmlns:p14="http://schemas.microsoft.com/office/powerpoint/2010/main" val="928183543"/>
       </p:ext>
     </p:extLst>
   </p:cSld>
@@ -13104,4 +14361,196 @@
     </a:ext>
   </a:extLst>
 </a:theme>
+</file>
+
+<file path=ppt/theme/themeOverride1.xml><?xml version="1.0" encoding="utf-8"?>
+<a:themeOverride xmlns:a="http://schemas.openxmlformats.org/drawingml/2006/main">
+  <a:clrScheme name="Alignment">
+    <a:dk1>
+      <a:sysClr val="windowText" lastClr="000000"/>
+    </a:dk1>
+    <a:lt1>
+      <a:sysClr val="window" lastClr="FFFFFF"/>
+    </a:lt1>
+    <a:dk2>
+      <a:srgbClr val="3B3D38"/>
+    </a:dk2>
+    <a:lt2>
+      <a:srgbClr val="F7F2EE"/>
+    </a:lt2>
+    <a:accent1>
+      <a:srgbClr val="928A63"/>
+    </a:accent1>
+    <a:accent2>
+      <a:srgbClr val="B57B6B"/>
+    </a:accent2>
+    <a:accent3>
+      <a:srgbClr val="9E8484"/>
+    </a:accent3>
+    <a:accent4>
+      <a:srgbClr val="7C8A75"/>
+    </a:accent4>
+    <a:accent5>
+      <a:srgbClr val="8C8578"/>
+    </a:accent5>
+    <a:accent6>
+      <a:srgbClr val="A18563"/>
+    </a:accent6>
+    <a:hlink>
+      <a:srgbClr val="B57B6B"/>
+    </a:hlink>
+    <a:folHlink>
+      <a:srgbClr val="7C8A75"/>
+    </a:folHlink>
+  </a:clrScheme>
+  <a:fontScheme name="Custom 1">
+    <a:majorFont>
+      <a:latin typeface="Batang"/>
+      <a:ea typeface=""/>
+      <a:cs typeface=""/>
+    </a:majorFont>
+    <a:minorFont>
+      <a:latin typeface="Avenir Next LT Pro Light"/>
+      <a:ea typeface=""/>
+      <a:cs typeface=""/>
+    </a:minorFont>
+  </a:fontScheme>
+  <a:fmtScheme name="Office">
+    <a:fillStyleLst>
+      <a:solidFill>
+        <a:schemeClr val="phClr"/>
+      </a:solidFill>
+      <a:gradFill rotWithShape="1">
+        <a:gsLst>
+          <a:gs pos="0">
+            <a:schemeClr val="phClr">
+              <a:lumMod val="110000"/>
+              <a:satMod val="105000"/>
+              <a:tint val="67000"/>
+            </a:schemeClr>
+          </a:gs>
+          <a:gs pos="50000">
+            <a:schemeClr val="phClr">
+              <a:lumMod val="105000"/>
+              <a:satMod val="103000"/>
+              <a:tint val="73000"/>
+            </a:schemeClr>
+          </a:gs>
+          <a:gs pos="100000">
+            <a:schemeClr val="phClr">
+              <a:lumMod val="105000"/>
+              <a:satMod val="109000"/>
+              <a:tint val="81000"/>
+            </a:schemeClr>
+          </a:gs>
+        </a:gsLst>
+        <a:lin ang="5400000" scaled="0"/>
+      </a:gradFill>
+      <a:gradFill rotWithShape="1">
+        <a:gsLst>
+          <a:gs pos="0">
+            <a:schemeClr val="phClr">
+              <a:satMod val="103000"/>
+              <a:lumMod val="102000"/>
+              <a:tint val="94000"/>
+            </a:schemeClr>
+          </a:gs>
+          <a:gs pos="50000">
+            <a:schemeClr val="phClr">
+              <a:satMod val="110000"/>
+              <a:lumMod val="100000"/>
+              <a:shade val="100000"/>
+            </a:schemeClr>
+          </a:gs>
+          <a:gs pos="100000">
+            <a:schemeClr val="phClr">
+              <a:lumMod val="99000"/>
+              <a:satMod val="120000"/>
+              <a:shade val="78000"/>
+            </a:schemeClr>
+          </a:gs>
+        </a:gsLst>
+        <a:lin ang="5400000" scaled="0"/>
+      </a:gradFill>
+    </a:fillStyleLst>
+    <a:lnStyleLst>
+      <a:ln w="6350" cap="flat" cmpd="sng" algn="ctr">
+        <a:solidFill>
+          <a:schemeClr val="phClr"/>
+        </a:solidFill>
+        <a:prstDash val="solid"/>
+        <a:miter lim="800000"/>
+      </a:ln>
+      <a:ln w="12700" cap="flat" cmpd="sng" algn="ctr">
+        <a:solidFill>
+          <a:schemeClr val="phClr"/>
+        </a:solidFill>
+        <a:prstDash val="solid"/>
+        <a:miter lim="800000"/>
+      </a:ln>
+      <a:ln w="19050" cap="flat" cmpd="sng" algn="ctr">
+        <a:solidFill>
+          <a:schemeClr val="phClr"/>
+        </a:solidFill>
+        <a:prstDash val="solid"/>
+        <a:miter lim="800000"/>
+      </a:ln>
+    </a:lnStyleLst>
+    <a:effectStyleLst>
+      <a:effectStyle>
+        <a:effectLst/>
+      </a:effectStyle>
+      <a:effectStyle>
+        <a:effectLst/>
+      </a:effectStyle>
+      <a:effectStyle>
+        <a:effectLst>
+          <a:outerShdw blurRad="57150" dist="19050" dir="5400000" algn="ctr" rotWithShape="0">
+            <a:srgbClr val="000000">
+              <a:alpha val="63000"/>
+            </a:srgbClr>
+          </a:outerShdw>
+        </a:effectLst>
+      </a:effectStyle>
+    </a:effectStyleLst>
+    <a:bgFillStyleLst>
+      <a:solidFill>
+        <a:schemeClr val="phClr"/>
+      </a:solidFill>
+      <a:solidFill>
+        <a:schemeClr val="phClr">
+          <a:tint val="95000"/>
+          <a:satMod val="170000"/>
+        </a:schemeClr>
+      </a:solidFill>
+      <a:gradFill rotWithShape="1">
+        <a:gsLst>
+          <a:gs pos="0">
+            <a:schemeClr val="phClr">
+              <a:tint val="93000"/>
+              <a:satMod val="150000"/>
+              <a:shade val="98000"/>
+              <a:lumMod val="102000"/>
+            </a:schemeClr>
+          </a:gs>
+          <a:gs pos="50000">
+            <a:schemeClr val="phClr">
+              <a:tint val="98000"/>
+              <a:satMod val="130000"/>
+              <a:shade val="90000"/>
+              <a:lumMod val="103000"/>
+            </a:schemeClr>
+          </a:gs>
+          <a:gs pos="100000">
+            <a:schemeClr val="phClr">
+              <a:shade val="63000"/>
+              <a:satMod val="120000"/>
+            </a:schemeClr>
+          </a:gs>
+        </a:gsLst>
+        <a:lin ang="5400000" scaled="0"/>
+      </a:gradFill>
+    </a:bgFillStyleLst>
+  </a:fmtScheme>
+</a:themeOverride>
 </file>
</xml_diff>